<commit_message>
Research PPT template - john
</commit_message>
<xml_diff>
--- a/reseach_question_presentation_template.pptx
+++ b/reseach_question_presentation_template.pptx
@@ -179,7 +179,7 @@
           <p:cNvPr id="2" name="Header Placeholder 1">
             <a:extLst>
               <a:ext uri="{FF2B5EF4-FFF2-40B4-BE49-F238E27FC236}">
-                <a16:creationId xmlns:a16="http://schemas.microsoft.com/office/drawing/2014/main" id="{898966F2-21A1-4B2B-ADA6-AD0BB447B7CB}"/>
+                <a16:creationId xmlns:a16="http://schemas.microsoft.com/office/drawing/2014/main" xmlns="" id="{898966F2-21A1-4B2B-ADA6-AD0BB447B7CB}"/>
               </a:ext>
             </a:extLst>
           </p:cNvPr>
@@ -216,7 +216,7 @@
           <p:cNvPr id="3" name="Date Placeholder 2">
             <a:extLst>
               <a:ext uri="{FF2B5EF4-FFF2-40B4-BE49-F238E27FC236}">
-                <a16:creationId xmlns:a16="http://schemas.microsoft.com/office/drawing/2014/main" id="{751468BB-CDF2-4507-B4EF-7B369D307A4D}"/>
+                <a16:creationId xmlns:a16="http://schemas.microsoft.com/office/drawing/2014/main" xmlns="" id="{751468BB-CDF2-4507-B4EF-7B369D307A4D}"/>
               </a:ext>
             </a:extLst>
           </p:cNvPr>
@@ -247,7 +247,7 @@
             <a:fld id="{93FAAC3A-BD1F-4A00-9099-74B95789FE00}" type="datetimeFigureOut">
               <a:rPr lang="en-GB" smtClean="0"/>
               <a:pPr/>
-              <a:t>08/11/2024</a:t>
+              <a:t>10/11/2024</a:t>
             </a:fld>
             <a:endParaRPr lang="en-GB"/>
           </a:p>
@@ -258,7 +258,7 @@
           <p:cNvPr id="4" name="Footer Placeholder 3">
             <a:extLst>
               <a:ext uri="{FF2B5EF4-FFF2-40B4-BE49-F238E27FC236}">
-                <a16:creationId xmlns:a16="http://schemas.microsoft.com/office/drawing/2014/main" id="{904BCF7D-6037-48D3-84E5-56B8B0552143}"/>
+                <a16:creationId xmlns:a16="http://schemas.microsoft.com/office/drawing/2014/main" xmlns="" id="{904BCF7D-6037-48D3-84E5-56B8B0552143}"/>
               </a:ext>
             </a:extLst>
           </p:cNvPr>
@@ -295,7 +295,7 @@
           <p:cNvPr id="5" name="Slide Number Placeholder 4">
             <a:extLst>
               <a:ext uri="{FF2B5EF4-FFF2-40B4-BE49-F238E27FC236}">
-                <a16:creationId xmlns:a16="http://schemas.microsoft.com/office/drawing/2014/main" id="{D619E732-656C-4BB5-ACCB-1568C5C66DD7}"/>
+                <a16:creationId xmlns:a16="http://schemas.microsoft.com/office/drawing/2014/main" xmlns="" id="{D619E732-656C-4BB5-ACCB-1568C5C66DD7}"/>
               </a:ext>
             </a:extLst>
           </p:cNvPr>
@@ -426,7 +426,7 @@
             <a:fld id="{8E359C8A-39F6-4045-9163-4042C4C26B15}" type="datetimeFigureOut">
               <a:rPr lang="en-GB" smtClean="0"/>
               <a:pPr/>
-              <a:t>08/11/2024</a:t>
+              <a:t>10/11/2024</a:t>
             </a:fld>
             <a:endParaRPr lang="en-GB"/>
           </a:p>
@@ -1006,7 +1006,7 @@
           <p:cNvPr id="4" name="Picture 3" descr="University of Hertfordshire logo">
             <a:extLst>
               <a:ext uri="{FF2B5EF4-FFF2-40B4-BE49-F238E27FC236}">
-                <a16:creationId xmlns:a16="http://schemas.microsoft.com/office/drawing/2014/main" id="{16E4BB13-0D32-AA4A-BF91-2B76A7C18242}"/>
+                <a16:creationId xmlns:a16="http://schemas.microsoft.com/office/drawing/2014/main" xmlns="" id="{16E4BB13-0D32-AA4A-BF91-2B76A7C18242}"/>
               </a:ext>
             </a:extLst>
           </p:cNvPr>
@@ -1080,7 +1080,7 @@
           <p:cNvPr id="3" name="Picture Placeholder 2">
             <a:extLst>
               <a:ext uri="{FF2B5EF4-FFF2-40B4-BE49-F238E27FC236}">
-                <a16:creationId xmlns:a16="http://schemas.microsoft.com/office/drawing/2014/main" id="{A307C322-846C-9045-AD91-A93C82FC5AAF}"/>
+                <a16:creationId xmlns:a16="http://schemas.microsoft.com/office/drawing/2014/main" xmlns="" id="{A307C322-846C-9045-AD91-A93C82FC5AAF}"/>
               </a:ext>
             </a:extLst>
           </p:cNvPr>
@@ -1159,7 +1159,7 @@
           <p:cNvPr id="9" name="Media Placeholder 8">
             <a:extLst>
               <a:ext uri="{FF2B5EF4-FFF2-40B4-BE49-F238E27FC236}">
-                <a16:creationId xmlns:a16="http://schemas.microsoft.com/office/drawing/2014/main" id="{9ABCF9A5-761F-434B-BBB5-D788CB1E79D8}"/>
+                <a16:creationId xmlns:a16="http://schemas.microsoft.com/office/drawing/2014/main" xmlns="" id="{9ABCF9A5-761F-434B-BBB5-D788CB1E79D8}"/>
               </a:ext>
             </a:extLst>
           </p:cNvPr>
@@ -1230,7 +1230,7 @@
           <p:cNvPr id="5" name="Footer Placeholder 4">
             <a:extLst>
               <a:ext uri="{FF2B5EF4-FFF2-40B4-BE49-F238E27FC236}">
-                <a16:creationId xmlns:a16="http://schemas.microsoft.com/office/drawing/2014/main" id="{962B6D5D-0892-4B4E-86D9-894852B1242C}"/>
+                <a16:creationId xmlns:a16="http://schemas.microsoft.com/office/drawing/2014/main" xmlns="" id="{962B6D5D-0892-4B4E-86D9-894852B1242C}"/>
               </a:ext>
             </a:extLst>
           </p:cNvPr>
@@ -1258,7 +1258,7 @@
           <p:cNvPr id="6" name="Slide Number Placeholder 5">
             <a:extLst>
               <a:ext uri="{FF2B5EF4-FFF2-40B4-BE49-F238E27FC236}">
-                <a16:creationId xmlns:a16="http://schemas.microsoft.com/office/drawing/2014/main" id="{3B7428FC-C061-4730-9EA5-A52A00413991}"/>
+                <a16:creationId xmlns:a16="http://schemas.microsoft.com/office/drawing/2014/main" xmlns="" id="{3B7428FC-C061-4730-9EA5-A52A00413991}"/>
               </a:ext>
             </a:extLst>
           </p:cNvPr>
@@ -1288,7 +1288,7 @@
           <p:cNvPr id="7" name="Rectangle 6">
             <a:extLst>
               <a:ext uri="{FF2B5EF4-FFF2-40B4-BE49-F238E27FC236}">
-                <a16:creationId xmlns:a16="http://schemas.microsoft.com/office/drawing/2014/main" id="{850AA271-B0BA-42CD-A544-17AAB1FA2EEA}"/>
+                <a16:creationId xmlns:a16="http://schemas.microsoft.com/office/drawing/2014/main" xmlns="" id="{850AA271-B0BA-42CD-A544-17AAB1FA2EEA}"/>
               </a:ext>
             </a:extLst>
           </p:cNvPr>
@@ -1340,7 +1340,7 @@
           <p:cNvPr id="16" name="Content Placeholder 2">
             <a:extLst>
               <a:ext uri="{FF2B5EF4-FFF2-40B4-BE49-F238E27FC236}">
-                <a16:creationId xmlns:a16="http://schemas.microsoft.com/office/drawing/2014/main" id="{699880E3-4DE3-A642-9738-DF49DDCC9AC5}"/>
+                <a16:creationId xmlns:a16="http://schemas.microsoft.com/office/drawing/2014/main" xmlns="" id="{699880E3-4DE3-A642-9738-DF49DDCC9AC5}"/>
               </a:ext>
             </a:extLst>
           </p:cNvPr>
@@ -1397,7 +1397,7 @@
           <p:cNvPr id="17" name="Content Placeholder 2">
             <a:extLst>
               <a:ext uri="{FF2B5EF4-FFF2-40B4-BE49-F238E27FC236}">
-                <a16:creationId xmlns:a16="http://schemas.microsoft.com/office/drawing/2014/main" id="{CF37D495-D835-8E4B-A177-5E12F893DDCA}"/>
+                <a16:creationId xmlns:a16="http://schemas.microsoft.com/office/drawing/2014/main" xmlns="" id="{CF37D495-D835-8E4B-A177-5E12F893DDCA}"/>
               </a:ext>
             </a:extLst>
           </p:cNvPr>
@@ -1489,7 +1489,7 @@
           <p:cNvPr id="18" name="Content Placeholder 2">
             <a:extLst>
               <a:ext uri="{FF2B5EF4-FFF2-40B4-BE49-F238E27FC236}">
-                <a16:creationId xmlns:a16="http://schemas.microsoft.com/office/drawing/2014/main" id="{A6804C7E-983C-9246-90C0-AF8A0CE2CA84}"/>
+                <a16:creationId xmlns:a16="http://schemas.microsoft.com/office/drawing/2014/main" xmlns="" id="{A6804C7E-983C-9246-90C0-AF8A0CE2CA84}"/>
               </a:ext>
             </a:extLst>
           </p:cNvPr>
@@ -1580,7 +1580,7 @@
           <p:cNvPr id="8" name="Picture Placeholder 7">
             <a:extLst>
               <a:ext uri="{FF2B5EF4-FFF2-40B4-BE49-F238E27FC236}">
-                <a16:creationId xmlns:a16="http://schemas.microsoft.com/office/drawing/2014/main" id="{84410427-8F1D-7541-9C05-AFDD3531678D}"/>
+                <a16:creationId xmlns:a16="http://schemas.microsoft.com/office/drawing/2014/main" xmlns="" id="{84410427-8F1D-7541-9C05-AFDD3531678D}"/>
               </a:ext>
             </a:extLst>
           </p:cNvPr>
@@ -1610,7 +1610,7 @@
           <p:cNvPr id="20" name="Picture Placeholder 7">
             <a:extLst>
               <a:ext uri="{FF2B5EF4-FFF2-40B4-BE49-F238E27FC236}">
-                <a16:creationId xmlns:a16="http://schemas.microsoft.com/office/drawing/2014/main" id="{8B7D5964-7A97-5742-8717-CCB747F84A08}"/>
+                <a16:creationId xmlns:a16="http://schemas.microsoft.com/office/drawing/2014/main" xmlns="" id="{8B7D5964-7A97-5742-8717-CCB747F84A08}"/>
               </a:ext>
             </a:extLst>
           </p:cNvPr>
@@ -1640,7 +1640,7 @@
           <p:cNvPr id="21" name="Picture Placeholder 7">
             <a:extLst>
               <a:ext uri="{FF2B5EF4-FFF2-40B4-BE49-F238E27FC236}">
-                <a16:creationId xmlns:a16="http://schemas.microsoft.com/office/drawing/2014/main" id="{344933FE-A401-A841-9AC3-B75285AA32D2}"/>
+                <a16:creationId xmlns:a16="http://schemas.microsoft.com/office/drawing/2014/main" xmlns="" id="{344933FE-A401-A841-9AC3-B75285AA32D2}"/>
               </a:ext>
             </a:extLst>
           </p:cNvPr>
@@ -1708,7 +1708,7 @@
           <p:cNvPr id="7" name="Picture 6">
             <a:extLst>
               <a:ext uri="{FF2B5EF4-FFF2-40B4-BE49-F238E27FC236}">
-                <a16:creationId xmlns:a16="http://schemas.microsoft.com/office/drawing/2014/main" id="{EE2CE188-32E7-4242-9E44-E8055FC030CC}"/>
+                <a16:creationId xmlns:a16="http://schemas.microsoft.com/office/drawing/2014/main" xmlns="" id="{EE2CE188-32E7-4242-9E44-E8055FC030CC}"/>
               </a:ext>
             </a:extLst>
           </p:cNvPr>
@@ -1743,7 +1743,7 @@
           <p:cNvPr id="2" name="Title 1">
             <a:extLst>
               <a:ext uri="{FF2B5EF4-FFF2-40B4-BE49-F238E27FC236}">
-                <a16:creationId xmlns:a16="http://schemas.microsoft.com/office/drawing/2014/main" id="{7381B53D-9933-445F-9B68-E730EB38A5A9}"/>
+                <a16:creationId xmlns:a16="http://schemas.microsoft.com/office/drawing/2014/main" xmlns="" id="{7381B53D-9933-445F-9B68-E730EB38A5A9}"/>
               </a:ext>
             </a:extLst>
           </p:cNvPr>
@@ -1795,7 +1795,7 @@
           <p:cNvPr id="5" name="Footer Placeholder 4">
             <a:extLst>
               <a:ext uri="{FF2B5EF4-FFF2-40B4-BE49-F238E27FC236}">
-                <a16:creationId xmlns:a16="http://schemas.microsoft.com/office/drawing/2014/main" id="{CA2BE80A-BFEC-E24A-B510-73A571F1F04F}"/>
+                <a16:creationId xmlns:a16="http://schemas.microsoft.com/office/drawing/2014/main" xmlns="" id="{CA2BE80A-BFEC-E24A-B510-73A571F1F04F}"/>
               </a:ext>
             </a:extLst>
           </p:cNvPr>
@@ -1843,7 +1843,7 @@
           <p:cNvPr id="6" name="Slide Number Placeholder 5">
             <a:extLst>
               <a:ext uri="{FF2B5EF4-FFF2-40B4-BE49-F238E27FC236}">
-                <a16:creationId xmlns:a16="http://schemas.microsoft.com/office/drawing/2014/main" id="{8E5B25B4-144A-5B4A-8EAD-2022412DF2F1}"/>
+                <a16:creationId xmlns:a16="http://schemas.microsoft.com/office/drawing/2014/main" xmlns="" id="{8E5B25B4-144A-5B4A-8EAD-2022412DF2F1}"/>
               </a:ext>
             </a:extLst>
           </p:cNvPr>
@@ -1926,7 +1926,7 @@
           <p:cNvPr id="2" name="Title 1">
             <a:extLst>
               <a:ext uri="{FF2B5EF4-FFF2-40B4-BE49-F238E27FC236}">
-                <a16:creationId xmlns:a16="http://schemas.microsoft.com/office/drawing/2014/main" id="{7381B53D-9933-445F-9B68-E730EB38A5A9}"/>
+                <a16:creationId xmlns:a16="http://schemas.microsoft.com/office/drawing/2014/main" xmlns="" id="{7381B53D-9933-445F-9B68-E730EB38A5A9}"/>
               </a:ext>
             </a:extLst>
           </p:cNvPr>
@@ -1973,7 +1973,7 @@
           <p:cNvPr id="3" name="Subtitle 2">
             <a:extLst>
               <a:ext uri="{FF2B5EF4-FFF2-40B4-BE49-F238E27FC236}">
-                <a16:creationId xmlns:a16="http://schemas.microsoft.com/office/drawing/2014/main" id="{E2C6B9F5-608F-4534-96F0-C3A5E1A638A6}"/>
+                <a16:creationId xmlns:a16="http://schemas.microsoft.com/office/drawing/2014/main" xmlns="" id="{E2C6B9F5-608F-4534-96F0-C3A5E1A638A6}"/>
               </a:ext>
             </a:extLst>
           </p:cNvPr>
@@ -2050,7 +2050,7 @@
           <p:cNvPr id="5" name="Footer Placeholder 4">
             <a:extLst>
               <a:ext uri="{FF2B5EF4-FFF2-40B4-BE49-F238E27FC236}">
-                <a16:creationId xmlns:a16="http://schemas.microsoft.com/office/drawing/2014/main" id="{0540E7B9-9AC6-4E42-A931-6FF91E6494A1}"/>
+                <a16:creationId xmlns:a16="http://schemas.microsoft.com/office/drawing/2014/main" xmlns="" id="{0540E7B9-9AC6-4E42-A931-6FF91E6494A1}"/>
               </a:ext>
             </a:extLst>
           </p:cNvPr>
@@ -2098,7 +2098,7 @@
           <p:cNvPr id="6" name="Slide Number Placeholder 5">
             <a:extLst>
               <a:ext uri="{FF2B5EF4-FFF2-40B4-BE49-F238E27FC236}">
-                <a16:creationId xmlns:a16="http://schemas.microsoft.com/office/drawing/2014/main" id="{FB16D645-6420-4785-8316-43EF780FA589}"/>
+                <a16:creationId xmlns:a16="http://schemas.microsoft.com/office/drawing/2014/main" xmlns="" id="{FB16D645-6420-4785-8316-43EF780FA589}"/>
               </a:ext>
             </a:extLst>
           </p:cNvPr>
@@ -2143,7 +2143,7 @@
           <p:cNvPr id="8" name="Picture 7" descr="A picture containing drawing&#10;&#10;Description automatically generated">
             <a:extLst>
               <a:ext uri="{FF2B5EF4-FFF2-40B4-BE49-F238E27FC236}">
-                <a16:creationId xmlns:a16="http://schemas.microsoft.com/office/drawing/2014/main" id="{BCCF2CA0-CCE3-4304-8F31-4D1CC50BCBDE}"/>
+                <a16:creationId xmlns:a16="http://schemas.microsoft.com/office/drawing/2014/main" xmlns="" id="{BCCF2CA0-CCE3-4304-8F31-4D1CC50BCBDE}"/>
               </a:ext>
             </a:extLst>
           </p:cNvPr>
@@ -2217,7 +2217,7 @@
           <p:cNvPr id="3" name="Subtitle 2">
             <a:extLst>
               <a:ext uri="{FF2B5EF4-FFF2-40B4-BE49-F238E27FC236}">
-                <a16:creationId xmlns:a16="http://schemas.microsoft.com/office/drawing/2014/main" id="{E2C6B9F5-608F-4534-96F0-C3A5E1A638A6}"/>
+                <a16:creationId xmlns:a16="http://schemas.microsoft.com/office/drawing/2014/main" xmlns="" id="{E2C6B9F5-608F-4534-96F0-C3A5E1A638A6}"/>
               </a:ext>
             </a:extLst>
           </p:cNvPr>
@@ -2294,7 +2294,7 @@
           <p:cNvPr id="5" name="Footer Placeholder 4">
             <a:extLst>
               <a:ext uri="{FF2B5EF4-FFF2-40B4-BE49-F238E27FC236}">
-                <a16:creationId xmlns:a16="http://schemas.microsoft.com/office/drawing/2014/main" id="{0540E7B9-9AC6-4E42-A931-6FF91E6494A1}"/>
+                <a16:creationId xmlns:a16="http://schemas.microsoft.com/office/drawing/2014/main" xmlns="" id="{0540E7B9-9AC6-4E42-A931-6FF91E6494A1}"/>
               </a:ext>
             </a:extLst>
           </p:cNvPr>
@@ -2337,7 +2337,7 @@
           <p:cNvPr id="6" name="Slide Number Placeholder 5">
             <a:extLst>
               <a:ext uri="{FF2B5EF4-FFF2-40B4-BE49-F238E27FC236}">
-                <a16:creationId xmlns:a16="http://schemas.microsoft.com/office/drawing/2014/main" id="{FB16D645-6420-4785-8316-43EF780FA589}"/>
+                <a16:creationId xmlns:a16="http://schemas.microsoft.com/office/drawing/2014/main" xmlns="" id="{FB16D645-6420-4785-8316-43EF780FA589}"/>
               </a:ext>
             </a:extLst>
           </p:cNvPr>
@@ -2382,7 +2382,7 @@
           <p:cNvPr id="9" name="Title 1">
             <a:extLst>
               <a:ext uri="{FF2B5EF4-FFF2-40B4-BE49-F238E27FC236}">
-                <a16:creationId xmlns:a16="http://schemas.microsoft.com/office/drawing/2014/main" id="{E9449821-0D0D-644D-97A3-D56097A9C6DA}"/>
+                <a16:creationId xmlns:a16="http://schemas.microsoft.com/office/drawing/2014/main" xmlns="" id="{E9449821-0D0D-644D-97A3-D56097A9C6DA}"/>
               </a:ext>
             </a:extLst>
           </p:cNvPr>
@@ -2429,7 +2429,7 @@
           <p:cNvPr id="10" name="Rectangle 9">
             <a:extLst>
               <a:ext uri="{FF2B5EF4-FFF2-40B4-BE49-F238E27FC236}">
-                <a16:creationId xmlns:a16="http://schemas.microsoft.com/office/drawing/2014/main" id="{44F6EB17-8019-7B4E-B53C-76B057A7C31F}"/>
+                <a16:creationId xmlns:a16="http://schemas.microsoft.com/office/drawing/2014/main" xmlns="" id="{44F6EB17-8019-7B4E-B53C-76B057A7C31F}"/>
               </a:ext>
             </a:extLst>
           </p:cNvPr>
@@ -2485,7 +2485,7 @@
           <p:cNvPr id="11" name="Picture 10">
             <a:extLst>
               <a:ext uri="{FF2B5EF4-FFF2-40B4-BE49-F238E27FC236}">
-                <a16:creationId xmlns:a16="http://schemas.microsoft.com/office/drawing/2014/main" id="{0503EF50-F00F-9643-BE53-F0A5272FC4B2}"/>
+                <a16:creationId xmlns:a16="http://schemas.microsoft.com/office/drawing/2014/main" xmlns="" id="{0503EF50-F00F-9643-BE53-F0A5272FC4B2}"/>
               </a:ext>
             </a:extLst>
           </p:cNvPr>
@@ -2553,7 +2553,7 @@
           <p:cNvPr id="2" name="Title 1">
             <a:extLst>
               <a:ext uri="{FF2B5EF4-FFF2-40B4-BE49-F238E27FC236}">
-                <a16:creationId xmlns:a16="http://schemas.microsoft.com/office/drawing/2014/main" id="{A1AAFE49-0143-472F-897B-A7DAB87AB4E4}"/>
+                <a16:creationId xmlns:a16="http://schemas.microsoft.com/office/drawing/2014/main" xmlns="" id="{A1AAFE49-0143-472F-897B-A7DAB87AB4E4}"/>
               </a:ext>
             </a:extLst>
           </p:cNvPr>
@@ -2582,7 +2582,7 @@
           <p:cNvPr id="3" name="Content Placeholder 2">
             <a:extLst>
               <a:ext uri="{FF2B5EF4-FFF2-40B4-BE49-F238E27FC236}">
-                <a16:creationId xmlns:a16="http://schemas.microsoft.com/office/drawing/2014/main" id="{981FBDFA-876B-4255-A301-F62F1EDD8D66}"/>
+                <a16:creationId xmlns:a16="http://schemas.microsoft.com/office/drawing/2014/main" xmlns="" id="{981FBDFA-876B-4255-A301-F62F1EDD8D66}"/>
               </a:ext>
             </a:extLst>
           </p:cNvPr>
@@ -2642,7 +2642,7 @@
           <p:cNvPr id="4" name="Content Placeholder 3">
             <a:extLst>
               <a:ext uri="{FF2B5EF4-FFF2-40B4-BE49-F238E27FC236}">
-                <a16:creationId xmlns:a16="http://schemas.microsoft.com/office/drawing/2014/main" id="{46F0C709-1F3D-4B13-A290-4041A33FB10E}"/>
+                <a16:creationId xmlns:a16="http://schemas.microsoft.com/office/drawing/2014/main" xmlns="" id="{46F0C709-1F3D-4B13-A290-4041A33FB10E}"/>
               </a:ext>
             </a:extLst>
           </p:cNvPr>
@@ -2733,7 +2733,7 @@
           <p:cNvPr id="6" name="Footer Placeholder 5">
             <a:extLst>
               <a:ext uri="{FF2B5EF4-FFF2-40B4-BE49-F238E27FC236}">
-                <a16:creationId xmlns:a16="http://schemas.microsoft.com/office/drawing/2014/main" id="{60A8C9C5-E913-47B9-82DE-196768E6D657}"/>
+                <a16:creationId xmlns:a16="http://schemas.microsoft.com/office/drawing/2014/main" xmlns="" id="{60A8C9C5-E913-47B9-82DE-196768E6D657}"/>
               </a:ext>
             </a:extLst>
           </p:cNvPr>
@@ -2761,7 +2761,7 @@
           <p:cNvPr id="7" name="Slide Number Placeholder 6">
             <a:extLst>
               <a:ext uri="{FF2B5EF4-FFF2-40B4-BE49-F238E27FC236}">
-                <a16:creationId xmlns:a16="http://schemas.microsoft.com/office/drawing/2014/main" id="{E1558F66-ECA3-4B00-A383-8D2B86217C93}"/>
+                <a16:creationId xmlns:a16="http://schemas.microsoft.com/office/drawing/2014/main" xmlns="" id="{E1558F66-ECA3-4B00-A383-8D2B86217C93}"/>
               </a:ext>
             </a:extLst>
           </p:cNvPr>
@@ -2791,7 +2791,7 @@
           <p:cNvPr id="8" name="Rectangle 7">
             <a:extLst>
               <a:ext uri="{FF2B5EF4-FFF2-40B4-BE49-F238E27FC236}">
-                <a16:creationId xmlns:a16="http://schemas.microsoft.com/office/drawing/2014/main" id="{62A19DAE-53D8-4F04-A4B9-B6EDFC23886D}"/>
+                <a16:creationId xmlns:a16="http://schemas.microsoft.com/office/drawing/2014/main" xmlns="" id="{62A19DAE-53D8-4F04-A4B9-B6EDFC23886D}"/>
               </a:ext>
             </a:extLst>
           </p:cNvPr>
@@ -2906,7 +2906,7 @@
           <p:cNvPr id="2" name="Title 1">
             <a:extLst>
               <a:ext uri="{FF2B5EF4-FFF2-40B4-BE49-F238E27FC236}">
-                <a16:creationId xmlns:a16="http://schemas.microsoft.com/office/drawing/2014/main" id="{A4DE70B5-BA04-4DB3-853D-A1C05ADF828C}"/>
+                <a16:creationId xmlns:a16="http://schemas.microsoft.com/office/drawing/2014/main" xmlns="" id="{A4DE70B5-BA04-4DB3-853D-A1C05ADF828C}"/>
               </a:ext>
             </a:extLst>
           </p:cNvPr>
@@ -2935,7 +2935,7 @@
           <p:cNvPr id="3" name="Content Placeholder 2">
             <a:extLst>
               <a:ext uri="{FF2B5EF4-FFF2-40B4-BE49-F238E27FC236}">
-                <a16:creationId xmlns:a16="http://schemas.microsoft.com/office/drawing/2014/main" id="{70440712-862D-4568-80A4-86117B896766}"/>
+                <a16:creationId xmlns:a16="http://schemas.microsoft.com/office/drawing/2014/main" xmlns="" id="{70440712-862D-4568-80A4-86117B896766}"/>
               </a:ext>
             </a:extLst>
           </p:cNvPr>
@@ -2992,7 +2992,7 @@
           <p:cNvPr id="5" name="Footer Placeholder 4">
             <a:extLst>
               <a:ext uri="{FF2B5EF4-FFF2-40B4-BE49-F238E27FC236}">
-                <a16:creationId xmlns:a16="http://schemas.microsoft.com/office/drawing/2014/main" id="{962B6D5D-0892-4B4E-86D9-894852B1242C}"/>
+                <a16:creationId xmlns:a16="http://schemas.microsoft.com/office/drawing/2014/main" xmlns="" id="{962B6D5D-0892-4B4E-86D9-894852B1242C}"/>
               </a:ext>
             </a:extLst>
           </p:cNvPr>
@@ -3020,7 +3020,7 @@
           <p:cNvPr id="6" name="Slide Number Placeholder 5">
             <a:extLst>
               <a:ext uri="{FF2B5EF4-FFF2-40B4-BE49-F238E27FC236}">
-                <a16:creationId xmlns:a16="http://schemas.microsoft.com/office/drawing/2014/main" id="{3B7428FC-C061-4730-9EA5-A52A00413991}"/>
+                <a16:creationId xmlns:a16="http://schemas.microsoft.com/office/drawing/2014/main" xmlns="" id="{3B7428FC-C061-4730-9EA5-A52A00413991}"/>
               </a:ext>
             </a:extLst>
           </p:cNvPr>
@@ -3050,7 +3050,7 @@
           <p:cNvPr id="7" name="Rectangle 6">
             <a:extLst>
               <a:ext uri="{FF2B5EF4-FFF2-40B4-BE49-F238E27FC236}">
-                <a16:creationId xmlns:a16="http://schemas.microsoft.com/office/drawing/2014/main" id="{850AA271-B0BA-42CD-A544-17AAB1FA2EEA}"/>
+                <a16:creationId xmlns:a16="http://schemas.microsoft.com/office/drawing/2014/main" xmlns="" id="{850AA271-B0BA-42CD-A544-17AAB1FA2EEA}"/>
               </a:ext>
             </a:extLst>
           </p:cNvPr>
@@ -3140,7 +3140,7 @@
           <p:cNvPr id="2" name="Title 1">
             <a:extLst>
               <a:ext uri="{FF2B5EF4-FFF2-40B4-BE49-F238E27FC236}">
-                <a16:creationId xmlns:a16="http://schemas.microsoft.com/office/drawing/2014/main" id="{A4DE70B5-BA04-4DB3-853D-A1C05ADF828C}"/>
+                <a16:creationId xmlns:a16="http://schemas.microsoft.com/office/drawing/2014/main" xmlns="" id="{A4DE70B5-BA04-4DB3-853D-A1C05ADF828C}"/>
               </a:ext>
             </a:extLst>
           </p:cNvPr>
@@ -3174,7 +3174,7 @@
           <p:cNvPr id="3" name="Content Placeholder 2">
             <a:extLst>
               <a:ext uri="{FF2B5EF4-FFF2-40B4-BE49-F238E27FC236}">
-                <a16:creationId xmlns:a16="http://schemas.microsoft.com/office/drawing/2014/main" id="{70440712-862D-4568-80A4-86117B896766}"/>
+                <a16:creationId xmlns:a16="http://schemas.microsoft.com/office/drawing/2014/main" xmlns="" id="{70440712-862D-4568-80A4-86117B896766}"/>
               </a:ext>
             </a:extLst>
           </p:cNvPr>
@@ -3231,7 +3231,7 @@
           <p:cNvPr id="6" name="Slide Number Placeholder 5">
             <a:extLst>
               <a:ext uri="{FF2B5EF4-FFF2-40B4-BE49-F238E27FC236}">
-                <a16:creationId xmlns:a16="http://schemas.microsoft.com/office/drawing/2014/main" id="{3B7428FC-C061-4730-9EA5-A52A00413991}"/>
+                <a16:creationId xmlns:a16="http://schemas.microsoft.com/office/drawing/2014/main" xmlns="" id="{3B7428FC-C061-4730-9EA5-A52A00413991}"/>
               </a:ext>
             </a:extLst>
           </p:cNvPr>
@@ -3261,7 +3261,7 @@
           <p:cNvPr id="7" name="Rectangle 6">
             <a:extLst>
               <a:ext uri="{FF2B5EF4-FFF2-40B4-BE49-F238E27FC236}">
-                <a16:creationId xmlns:a16="http://schemas.microsoft.com/office/drawing/2014/main" id="{850AA271-B0BA-42CD-A544-17AAB1FA2EEA}"/>
+                <a16:creationId xmlns:a16="http://schemas.microsoft.com/office/drawing/2014/main" xmlns="" id="{850AA271-B0BA-42CD-A544-17AAB1FA2EEA}"/>
               </a:ext>
             </a:extLst>
           </p:cNvPr>
@@ -3351,7 +3351,7 @@
           <p:cNvPr id="6" name="Slide Number Placeholder 5">
             <a:extLst>
               <a:ext uri="{FF2B5EF4-FFF2-40B4-BE49-F238E27FC236}">
-                <a16:creationId xmlns:a16="http://schemas.microsoft.com/office/drawing/2014/main" id="{3B7428FC-C061-4730-9EA5-A52A00413991}"/>
+                <a16:creationId xmlns:a16="http://schemas.microsoft.com/office/drawing/2014/main" xmlns="" id="{3B7428FC-C061-4730-9EA5-A52A00413991}"/>
               </a:ext>
             </a:extLst>
           </p:cNvPr>
@@ -3389,7 +3389,7 @@
           <p:cNvPr id="8" name="Content Placeholder 2">
             <a:extLst>
               <a:ext uri="{FF2B5EF4-FFF2-40B4-BE49-F238E27FC236}">
-                <a16:creationId xmlns:a16="http://schemas.microsoft.com/office/drawing/2014/main" id="{B09D4C03-E8B1-644E-949B-F7AF91181833}"/>
+                <a16:creationId xmlns:a16="http://schemas.microsoft.com/office/drawing/2014/main" xmlns="" id="{B09D4C03-E8B1-644E-949B-F7AF91181833}"/>
               </a:ext>
             </a:extLst>
           </p:cNvPr>
@@ -3462,7 +3462,7 @@
           <p:cNvPr id="5" name="Title 1">
             <a:extLst>
               <a:ext uri="{FF2B5EF4-FFF2-40B4-BE49-F238E27FC236}">
-                <a16:creationId xmlns:a16="http://schemas.microsoft.com/office/drawing/2014/main" id="{02EDA17D-AAE6-954F-93C6-90B8D7B80BD1}"/>
+                <a16:creationId xmlns:a16="http://schemas.microsoft.com/office/drawing/2014/main" xmlns="" id="{02EDA17D-AAE6-954F-93C6-90B8D7B80BD1}"/>
               </a:ext>
             </a:extLst>
           </p:cNvPr>
@@ -3542,7 +3542,7 @@
           <p:cNvPr id="2" name="Title 1">
             <a:extLst>
               <a:ext uri="{FF2B5EF4-FFF2-40B4-BE49-F238E27FC236}">
-                <a16:creationId xmlns:a16="http://schemas.microsoft.com/office/drawing/2014/main" id="{A1AAFE49-0143-472F-897B-A7DAB87AB4E4}"/>
+                <a16:creationId xmlns:a16="http://schemas.microsoft.com/office/drawing/2014/main" xmlns="" id="{A1AAFE49-0143-472F-897B-A7DAB87AB4E4}"/>
               </a:ext>
             </a:extLst>
           </p:cNvPr>
@@ -3571,7 +3571,7 @@
           <p:cNvPr id="4" name="Content Placeholder 3">
             <a:extLst>
               <a:ext uri="{FF2B5EF4-FFF2-40B4-BE49-F238E27FC236}">
-                <a16:creationId xmlns:a16="http://schemas.microsoft.com/office/drawing/2014/main" id="{46F0C709-1F3D-4B13-A290-4041A33FB10E}"/>
+                <a16:creationId xmlns:a16="http://schemas.microsoft.com/office/drawing/2014/main" xmlns="" id="{46F0C709-1F3D-4B13-A290-4041A33FB10E}"/>
               </a:ext>
             </a:extLst>
           </p:cNvPr>
@@ -3632,7 +3632,7 @@
           <p:cNvPr id="6" name="Footer Placeholder 5">
             <a:extLst>
               <a:ext uri="{FF2B5EF4-FFF2-40B4-BE49-F238E27FC236}">
-                <a16:creationId xmlns:a16="http://schemas.microsoft.com/office/drawing/2014/main" id="{60A8C9C5-E913-47B9-82DE-196768E6D657}"/>
+                <a16:creationId xmlns:a16="http://schemas.microsoft.com/office/drawing/2014/main" xmlns="" id="{60A8C9C5-E913-47B9-82DE-196768E6D657}"/>
               </a:ext>
             </a:extLst>
           </p:cNvPr>
@@ -3660,7 +3660,7 @@
           <p:cNvPr id="7" name="Slide Number Placeholder 6">
             <a:extLst>
               <a:ext uri="{FF2B5EF4-FFF2-40B4-BE49-F238E27FC236}">
-                <a16:creationId xmlns:a16="http://schemas.microsoft.com/office/drawing/2014/main" id="{E1558F66-ECA3-4B00-A383-8D2B86217C93}"/>
+                <a16:creationId xmlns:a16="http://schemas.microsoft.com/office/drawing/2014/main" xmlns="" id="{E1558F66-ECA3-4B00-A383-8D2B86217C93}"/>
               </a:ext>
             </a:extLst>
           </p:cNvPr>
@@ -3690,7 +3690,7 @@
           <p:cNvPr id="10" name="Picture Placeholder 9">
             <a:extLst>
               <a:ext uri="{FF2B5EF4-FFF2-40B4-BE49-F238E27FC236}">
-                <a16:creationId xmlns:a16="http://schemas.microsoft.com/office/drawing/2014/main" id="{874043F1-6F14-49BD-83CA-12B559ABC101}"/>
+                <a16:creationId xmlns:a16="http://schemas.microsoft.com/office/drawing/2014/main" xmlns="" id="{874043F1-6F14-49BD-83CA-12B559ABC101}"/>
               </a:ext>
             </a:extLst>
           </p:cNvPr>
@@ -3720,7 +3720,7 @@
           <p:cNvPr id="11" name="Rectangle 10">
             <a:extLst>
               <a:ext uri="{FF2B5EF4-FFF2-40B4-BE49-F238E27FC236}">
-                <a16:creationId xmlns:a16="http://schemas.microsoft.com/office/drawing/2014/main" id="{4B51C537-0174-43E5-8B81-C80AF1D06831}"/>
+                <a16:creationId xmlns:a16="http://schemas.microsoft.com/office/drawing/2014/main" xmlns="" id="{4B51C537-0174-43E5-8B81-C80AF1D06831}"/>
               </a:ext>
             </a:extLst>
           </p:cNvPr>
@@ -3810,7 +3810,7 @@
           <p:cNvPr id="2" name="Title 1">
             <a:extLst>
               <a:ext uri="{FF2B5EF4-FFF2-40B4-BE49-F238E27FC236}">
-                <a16:creationId xmlns:a16="http://schemas.microsoft.com/office/drawing/2014/main" id="{A1AAFE49-0143-472F-897B-A7DAB87AB4E4}"/>
+                <a16:creationId xmlns:a16="http://schemas.microsoft.com/office/drawing/2014/main" xmlns="" id="{A1AAFE49-0143-472F-897B-A7DAB87AB4E4}"/>
               </a:ext>
             </a:extLst>
           </p:cNvPr>
@@ -3839,7 +3839,7 @@
           <p:cNvPr id="6" name="Footer Placeholder 5">
             <a:extLst>
               <a:ext uri="{FF2B5EF4-FFF2-40B4-BE49-F238E27FC236}">
-                <a16:creationId xmlns:a16="http://schemas.microsoft.com/office/drawing/2014/main" id="{60A8C9C5-E913-47B9-82DE-196768E6D657}"/>
+                <a16:creationId xmlns:a16="http://schemas.microsoft.com/office/drawing/2014/main" xmlns="" id="{60A8C9C5-E913-47B9-82DE-196768E6D657}"/>
               </a:ext>
             </a:extLst>
           </p:cNvPr>
@@ -3867,7 +3867,7 @@
           <p:cNvPr id="7" name="Slide Number Placeholder 6">
             <a:extLst>
               <a:ext uri="{FF2B5EF4-FFF2-40B4-BE49-F238E27FC236}">
-                <a16:creationId xmlns:a16="http://schemas.microsoft.com/office/drawing/2014/main" id="{E1558F66-ECA3-4B00-A383-8D2B86217C93}"/>
+                <a16:creationId xmlns:a16="http://schemas.microsoft.com/office/drawing/2014/main" xmlns="" id="{E1558F66-ECA3-4B00-A383-8D2B86217C93}"/>
               </a:ext>
             </a:extLst>
           </p:cNvPr>
@@ -3897,7 +3897,7 @@
           <p:cNvPr id="8" name="Rectangle 7">
             <a:extLst>
               <a:ext uri="{FF2B5EF4-FFF2-40B4-BE49-F238E27FC236}">
-                <a16:creationId xmlns:a16="http://schemas.microsoft.com/office/drawing/2014/main" id="{039FCF96-B7D6-4CCD-A4AE-46A67249D3BD}"/>
+                <a16:creationId xmlns:a16="http://schemas.microsoft.com/office/drawing/2014/main" xmlns="" id="{039FCF96-B7D6-4CCD-A4AE-46A67249D3BD}"/>
               </a:ext>
             </a:extLst>
           </p:cNvPr>
@@ -3949,7 +3949,7 @@
           <p:cNvPr id="10" name="Content Placeholder 9">
             <a:extLst>
               <a:ext uri="{FF2B5EF4-FFF2-40B4-BE49-F238E27FC236}">
-                <a16:creationId xmlns:a16="http://schemas.microsoft.com/office/drawing/2014/main" id="{741F3B7A-B2BF-40FC-8EB2-F1C37D316488}"/>
+                <a16:creationId xmlns:a16="http://schemas.microsoft.com/office/drawing/2014/main" xmlns="" id="{741F3B7A-B2BF-40FC-8EB2-F1C37D316488}"/>
               </a:ext>
             </a:extLst>
           </p:cNvPr>
@@ -4010,7 +4010,7 @@
           <p:cNvPr id="9" name="Content Placeholder 9">
             <a:extLst>
               <a:ext uri="{FF2B5EF4-FFF2-40B4-BE49-F238E27FC236}">
-                <a16:creationId xmlns:a16="http://schemas.microsoft.com/office/drawing/2014/main" id="{75B7A667-B99F-7A41-AAC3-ED24B9B1D92E}"/>
+                <a16:creationId xmlns:a16="http://schemas.microsoft.com/office/drawing/2014/main" xmlns="" id="{75B7A667-B99F-7A41-AAC3-ED24B9B1D92E}"/>
               </a:ext>
             </a:extLst>
           </p:cNvPr>
@@ -4071,7 +4071,7 @@
           <p:cNvPr id="11" name="Content Placeholder 9">
             <a:extLst>
               <a:ext uri="{FF2B5EF4-FFF2-40B4-BE49-F238E27FC236}">
-                <a16:creationId xmlns:a16="http://schemas.microsoft.com/office/drawing/2014/main" id="{93C1FF47-695D-B348-AF37-1ADF5736FA9E}"/>
+                <a16:creationId xmlns:a16="http://schemas.microsoft.com/office/drawing/2014/main" xmlns="" id="{93C1FF47-695D-B348-AF37-1ADF5736FA9E}"/>
               </a:ext>
             </a:extLst>
           </p:cNvPr>
@@ -4167,7 +4167,7 @@
           <p:cNvPr id="2" name="Title Placeholder 1">
             <a:extLst>
               <a:ext uri="{FF2B5EF4-FFF2-40B4-BE49-F238E27FC236}">
-                <a16:creationId xmlns:a16="http://schemas.microsoft.com/office/drawing/2014/main" id="{DB1A62CF-E2B4-496D-829D-DCE37260977D}"/>
+                <a16:creationId xmlns:a16="http://schemas.microsoft.com/office/drawing/2014/main" xmlns="" id="{DB1A62CF-E2B4-496D-829D-DCE37260977D}"/>
               </a:ext>
             </a:extLst>
           </p:cNvPr>
@@ -4206,7 +4206,7 @@
           <p:cNvPr id="3" name="Text Placeholder 2">
             <a:extLst>
               <a:ext uri="{FF2B5EF4-FFF2-40B4-BE49-F238E27FC236}">
-                <a16:creationId xmlns:a16="http://schemas.microsoft.com/office/drawing/2014/main" id="{DFD84EF4-0E07-4BF3-A4AB-3E8632AA79AD}"/>
+                <a16:creationId xmlns:a16="http://schemas.microsoft.com/office/drawing/2014/main" xmlns="" id="{DFD84EF4-0E07-4BF3-A4AB-3E8632AA79AD}"/>
               </a:ext>
             </a:extLst>
           </p:cNvPr>
@@ -4274,7 +4274,7 @@
           <p:cNvPr id="5" name="Footer Placeholder 4">
             <a:extLst>
               <a:ext uri="{FF2B5EF4-FFF2-40B4-BE49-F238E27FC236}">
-                <a16:creationId xmlns:a16="http://schemas.microsoft.com/office/drawing/2014/main" id="{3B527A5D-B761-4C2F-97E6-5D8254424B8B}"/>
+                <a16:creationId xmlns:a16="http://schemas.microsoft.com/office/drawing/2014/main" xmlns="" id="{3B527A5D-B761-4C2F-97E6-5D8254424B8B}"/>
               </a:ext>
             </a:extLst>
           </p:cNvPr>
@@ -4322,7 +4322,7 @@
           <p:cNvPr id="6" name="Slide Number Placeholder 5">
             <a:extLst>
               <a:ext uri="{FF2B5EF4-FFF2-40B4-BE49-F238E27FC236}">
-                <a16:creationId xmlns:a16="http://schemas.microsoft.com/office/drawing/2014/main" id="{9CD661B1-4E4B-4F85-ACA3-C34023D70282}"/>
+                <a16:creationId xmlns:a16="http://schemas.microsoft.com/office/drawing/2014/main" xmlns="" id="{9CD661B1-4E4B-4F85-ACA3-C34023D70282}"/>
               </a:ext>
             </a:extLst>
           </p:cNvPr>
@@ -4730,7 +4730,7 @@
 </file>
 
 <file path=ppt/slides/slide1.xml><?xml version="1.0" encoding="utf-8"?>
-<p:sld xmlns:a="http://schemas.openxmlformats.org/drawingml/2006/main" xmlns:r="http://schemas.openxmlformats.org/officeDocument/2006/relationships" xmlns:p="http://schemas.openxmlformats.org/presentationml/2006/main">
+<p:sld xmlns:a="http://schemas.openxmlformats.org/drawingml/2006/main" xmlns:r="http://schemas.openxmlformats.org/officeDocument/2006/relationships" xmlns:p="http://schemas.openxmlformats.org/presentationml/2006/main" show="0">
   <p:cSld>
     <p:spTree>
       <p:nvGrpSpPr>
@@ -4751,7 +4751,7 @@
           <p:cNvPr id="2" name="Subtitle 1">
             <a:extLst>
               <a:ext uri="{FF2B5EF4-FFF2-40B4-BE49-F238E27FC236}">
-                <a16:creationId xmlns:a16="http://schemas.microsoft.com/office/drawing/2014/main" id="{6A29D8FC-E32A-5566-0930-02B99F5763A6}"/>
+                <a16:creationId xmlns:a16="http://schemas.microsoft.com/office/drawing/2014/main" xmlns="" id="{6A29D8FC-E32A-5566-0930-02B99F5763A6}"/>
               </a:ext>
             </a:extLst>
           </p:cNvPr>
@@ -4784,7 +4784,7 @@
           <p:cNvPr id="4" name="Slide Number Placeholder 3">
             <a:extLst>
               <a:ext uri="{FF2B5EF4-FFF2-40B4-BE49-F238E27FC236}">
-                <a16:creationId xmlns:a16="http://schemas.microsoft.com/office/drawing/2014/main" id="{E143B824-C7FA-8427-0A8B-E8B5D7787B83}"/>
+                <a16:creationId xmlns:a16="http://schemas.microsoft.com/office/drawing/2014/main" xmlns="" id="{E143B824-C7FA-8427-0A8B-E8B5D7787B83}"/>
               </a:ext>
             </a:extLst>
           </p:cNvPr>
@@ -4814,7 +4814,7 @@
           <p:cNvPr id="6" name="TextBox 5">
             <a:extLst>
               <a:ext uri="{FF2B5EF4-FFF2-40B4-BE49-F238E27FC236}">
-                <a16:creationId xmlns:a16="http://schemas.microsoft.com/office/drawing/2014/main" id="{6DD9461E-8553-F8C3-E23F-FB71330E931F}"/>
+                <a16:creationId xmlns:a16="http://schemas.microsoft.com/office/drawing/2014/main" xmlns="" id="{6DD9461E-8553-F8C3-E23F-FB71330E931F}"/>
               </a:ext>
             </a:extLst>
           </p:cNvPr>
@@ -4894,6 +4894,21 @@
   <p:clrMapOvr>
     <a:masterClrMapping/>
   </p:clrMapOvr>
+  <mc:AlternateContent xmlns:mc="http://schemas.openxmlformats.org/markup-compatibility/2006">
+    <mc:Choice xmlns:p14="http://schemas.microsoft.com/office/powerpoint/2010/main" Requires="p14">
+      <p:transition spd="slow" p14:dur="2000"/>
+    </mc:Choice>
+    <mc:Fallback>
+      <p:transition spd="slow"/>
+    </mc:Fallback>
+  </mc:AlternateContent>
+  <p:timing>
+    <p:tnLst>
+      <p:par>
+        <p:cTn id="1" dur="indefinite" restart="never" nodeType="tmRoot"/>
+      </p:par>
+    </p:tnLst>
+  </p:timing>
 </p:sld>
 </file>
 
@@ -4933,7 +4948,7 @@
           <p:cNvPr id="2" name="Title 1">
             <a:extLst>
               <a:ext uri="{FF2B5EF4-FFF2-40B4-BE49-F238E27FC236}">
-                <a16:creationId xmlns:a16="http://schemas.microsoft.com/office/drawing/2014/main" id="{3440AEE4-CC66-FE42-B0C3-2CC7AFD37D1C}"/>
+                <a16:creationId xmlns:a16="http://schemas.microsoft.com/office/drawing/2014/main" xmlns="" id="{3440AEE4-CC66-FE42-B0C3-2CC7AFD37D1C}"/>
               </a:ext>
             </a:extLst>
           </p:cNvPr>
@@ -4969,6 +4984,10 @@
               <a:rPr lang="en-US" sz="2200" dirty="0"/>
               <a:t>Date: </a:t>
             </a:r>
+            <a:r>
+              <a:rPr lang="en-US" sz="8000" dirty="0"/>
+              <a:t/>
+            </a:r>
             <a:br>
               <a:rPr lang="en-US" sz="8000" dirty="0"/>
             </a:br>
@@ -4981,7 +5000,7 @@
           <p:cNvPr id="3" name="Subtitle 2">
             <a:extLst>
               <a:ext uri="{FF2B5EF4-FFF2-40B4-BE49-F238E27FC236}">
-                <a16:creationId xmlns:a16="http://schemas.microsoft.com/office/drawing/2014/main" id="{8275DA97-5166-7F4B-BC83-F50AC8BEDCD7}"/>
+                <a16:creationId xmlns:a16="http://schemas.microsoft.com/office/drawing/2014/main" xmlns="" id="{8275DA97-5166-7F4B-BC83-F50AC8BEDCD7}"/>
               </a:ext>
             </a:extLst>
           </p:cNvPr>
@@ -4999,8 +5018,36 @@
           <a:p>
             <a:r>
               <a:rPr lang="en-US" sz="2000" dirty="0"/>
-              <a:t>Group Name:                                                            Name of Student Presenting:</a:t>
-            </a:r>
+              <a:t>Group Name: </a:t>
+            </a:r>
+            <a:r>
+              <a:rPr lang="en-GB" sz="2000" dirty="0"/>
+              <a:t>A246</a:t>
+            </a:r>
+            <a:r>
+              <a:rPr lang="en-US" sz="2000" dirty="0" smtClean="0"/>
+              <a:t>                                Name </a:t>
+            </a:r>
+            <a:r>
+              <a:rPr lang="en-US" sz="2000" dirty="0"/>
+              <a:t>of Student </a:t>
+            </a:r>
+            <a:r>
+              <a:rPr lang="en-US" sz="2000" dirty="0" smtClean="0"/>
+              <a:t>Presenting: </a:t>
+            </a:r>
+            <a:r>
+              <a:rPr lang="en-GB" sz="2000" dirty="0" smtClean="0"/>
+              <a:t>Tilakeaswar </a:t>
+            </a:r>
+            <a:r>
+              <a:rPr lang="en-GB" sz="2000" dirty="0" err="1" smtClean="0"/>
+              <a:t>Balamurugan</a:t>
+            </a:r>
+            <a:endParaRPr lang="en-GB" sz="2000" dirty="0"/>
+          </a:p>
+          <a:p>
+            <a:endParaRPr lang="en-US" sz="2000" dirty="0"/>
           </a:p>
         </p:txBody>
       </p:sp>
@@ -5009,7 +5056,7 @@
           <p:cNvPr id="4" name="Footer Placeholder 3">
             <a:extLst>
               <a:ext uri="{FF2B5EF4-FFF2-40B4-BE49-F238E27FC236}">
-                <a16:creationId xmlns:a16="http://schemas.microsoft.com/office/drawing/2014/main" id="{6E7F4D14-5620-EC41-A86C-6CC3CFD691B4}"/>
+                <a16:creationId xmlns:a16="http://schemas.microsoft.com/office/drawing/2014/main" xmlns="" id="{6E7F4D14-5620-EC41-A86C-6CC3CFD691B4}"/>
               </a:ext>
             </a:extLst>
           </p:cNvPr>
@@ -5032,15 +5079,7 @@
           <a:p>
             <a:r>
               <a:rPr lang="en-GB" dirty="0"/>
-              <a:t>7COM1079-2024  Student Group No:   A246        Names of Student Attendees : </a:t>
-            </a:r>
-            <a:r>
-              <a:rPr lang="en-GB" dirty="0" err="1"/>
-              <a:t>Tilakeaswar</a:t>
-            </a:r>
-            <a:r>
-              <a:rPr lang="en-GB" dirty="0"/>
-              <a:t> Balamurugan</a:t>
+              <a:t>7COM1079-2024  Student Group No:   A246        Names of Student Attendees : Tilakeaswar Balamurugan</a:t>
             </a:r>
           </a:p>
           <a:p>
@@ -5052,21 +5091,8 @@
           <a:p>
             <a:r>
               <a:rPr lang="en-GB" dirty="0"/>
-              <a:t>							      John Paul </a:t>
-            </a:r>
-            <a:r>
-              <a:rPr lang="en-GB" dirty="0" err="1"/>
-              <a:t>Chirstopher</a:t>
-            </a:r>
-            <a:r>
-              <a:rPr lang="en-GB" dirty="0"/>
-              <a:t> </a:t>
-            </a:r>
-            <a:r>
-              <a:rPr lang="en-GB" dirty="0" err="1"/>
-              <a:t>Yesudian</a:t>
-            </a:r>
-            <a:endParaRPr lang="en-GB" dirty="0"/>
+              <a:t>							      John Paul Chirstopher Yesudian</a:t>
+            </a:r>
           </a:p>
           <a:p>
             <a:r>
@@ -5100,6 +5126,13 @@
   <p:clrMapOvr>
     <a:masterClrMapping/>
   </p:clrMapOvr>
+  <p:timing>
+    <p:tnLst>
+      <p:par>
+        <p:cTn id="1" dur="indefinite" restart="never" nodeType="tmRoot"/>
+      </p:par>
+    </p:tnLst>
+  </p:timing>
 </p:sld>
 </file>
 
@@ -5125,7 +5158,7 @@
           <p:cNvPr id="2" name="Subtitle 1">
             <a:extLst>
               <a:ext uri="{FF2B5EF4-FFF2-40B4-BE49-F238E27FC236}">
-                <a16:creationId xmlns:a16="http://schemas.microsoft.com/office/drawing/2014/main" id="{6EDF47CE-5D5A-6104-A73A-4C8E09C48DA4}"/>
+                <a16:creationId xmlns:a16="http://schemas.microsoft.com/office/drawing/2014/main" xmlns="" id="{6EDF47CE-5D5A-6104-A73A-4C8E09C48DA4}"/>
               </a:ext>
             </a:extLst>
           </p:cNvPr>
@@ -5185,7 +5218,7 @@
           <p:cNvPr id="3" name="Footer Placeholder 2">
             <a:extLst>
               <a:ext uri="{FF2B5EF4-FFF2-40B4-BE49-F238E27FC236}">
-                <a16:creationId xmlns:a16="http://schemas.microsoft.com/office/drawing/2014/main" id="{E6EB5BD4-BD08-7B73-D9D9-2582DDE1B3D9}"/>
+                <a16:creationId xmlns:a16="http://schemas.microsoft.com/office/drawing/2014/main" xmlns="" id="{E6EB5BD4-BD08-7B73-D9D9-2582DDE1B3D9}"/>
               </a:ext>
             </a:extLst>
           </p:cNvPr>
@@ -5202,8 +5235,8 @@
           <a:lstStyle/>
           <a:p>
             <a:r>
-              <a:rPr lang="en-GB"/>
-              <a:t>PRESENTATION TITLE (ADD VIA INSERT, HEADER &amp; FOOTER)</a:t>
+              <a:rPr lang="en-US" dirty="0"/>
+              <a:t>Research Question</a:t>
             </a:r>
             <a:endParaRPr lang="en-GB" dirty="0"/>
           </a:p>
@@ -5214,7 +5247,7 @@
           <p:cNvPr id="4" name="Slide Number Placeholder 3">
             <a:extLst>
               <a:ext uri="{FF2B5EF4-FFF2-40B4-BE49-F238E27FC236}">
-                <a16:creationId xmlns:a16="http://schemas.microsoft.com/office/drawing/2014/main" id="{D1098E3C-BAB5-8478-26BA-5CDF4FAEFC64}"/>
+                <a16:creationId xmlns:a16="http://schemas.microsoft.com/office/drawing/2014/main" xmlns="" id="{D1098E3C-BAB5-8478-26BA-5CDF4FAEFC64}"/>
               </a:ext>
             </a:extLst>
           </p:cNvPr>
@@ -5249,6 +5282,13 @@
   <p:clrMapOvr>
     <a:masterClrMapping/>
   </p:clrMapOvr>
+  <p:timing>
+    <p:tnLst>
+      <p:par>
+        <p:cTn id="1" dur="indefinite" restart="never" nodeType="tmRoot"/>
+      </p:par>
+    </p:tnLst>
+  </p:timing>
 </p:sld>
 </file>
 
@@ -5274,7 +5314,7 @@
           <p:cNvPr id="2" name="Subtitle 1">
             <a:extLst>
               <a:ext uri="{FF2B5EF4-FFF2-40B4-BE49-F238E27FC236}">
-                <a16:creationId xmlns:a16="http://schemas.microsoft.com/office/drawing/2014/main" id="{7D9D8228-727F-1E46-B5AD-91D158B8255E}"/>
+                <a16:creationId xmlns:a16="http://schemas.microsoft.com/office/drawing/2014/main" xmlns="" id="{7D9D8228-727F-1E46-B5AD-91D158B8255E}"/>
               </a:ext>
             </a:extLst>
           </p:cNvPr>
@@ -5312,19 +5352,63 @@
             <a:r>
               <a:rPr lang="en-US" sz="1600" dirty="0">
                 <a:solidFill>
-                  <a:srgbClr val="FF0000"/>
+                  <a:schemeClr val="accent2">
+                    <a:lumMod val="60000"/>
+                    <a:lumOff val="40000"/>
+                  </a:schemeClr>
                 </a:solidFill>
               </a:rPr>
-              <a:t>:   </a:t>
-            </a:r>
-            <a:r>
-              <a:rPr lang="en-US" sz="2400" dirty="0">
+              <a:t>:  </a:t>
+            </a:r>
+            <a:r>
+              <a:rPr lang="en-US" sz="1600" dirty="0">
                 <a:solidFill>
                   <a:srgbClr val="FF0000"/>
                 </a:solidFill>
               </a:rPr>
-              <a:t>(replace this text with your DSXXX number and filename)</a:t>
-            </a:r>
+              <a:t> </a:t>
+            </a:r>
+            <a:r>
+              <a:rPr lang="en-US" sz="2400" dirty="0" smtClean="0">
+                <a:solidFill>
+                  <a:schemeClr val="accent2">
+                    <a:lumMod val="60000"/>
+                    <a:lumOff val="40000"/>
+                  </a:schemeClr>
+                </a:solidFill>
+              </a:rPr>
+              <a:t>(DS327- </a:t>
+            </a:r>
+            <a:r>
+              <a:rPr lang="en-US" sz="2400" dirty="0" smtClean="0">
+                <a:solidFill>
+                  <a:schemeClr val="accent2">
+                    <a:lumMod val="60000"/>
+                    <a:lumOff val="40000"/>
+                  </a:schemeClr>
+                </a:solidFill>
+              </a:rPr>
+              <a:t>005380.KS</a:t>
+            </a:r>
+            <a:r>
+              <a:rPr lang="en-US" sz="2400" dirty="0">
+                <a:solidFill>
+                  <a:schemeClr val="accent2">
+                    <a:lumMod val="60000"/>
+                    <a:lumOff val="40000"/>
+                  </a:schemeClr>
+                </a:solidFill>
+              </a:rPr>
+              <a:t>)</a:t>
+            </a:r>
+            <a:endParaRPr lang="en-US" sz="2400" dirty="0">
+              <a:solidFill>
+                <a:schemeClr val="accent2">
+                  <a:lumMod val="60000"/>
+                  <a:lumOff val="40000"/>
+                </a:schemeClr>
+              </a:solidFill>
+            </a:endParaRPr>
           </a:p>
         </p:txBody>
       </p:sp>
@@ -5333,7 +5417,7 @@
           <p:cNvPr id="3" name="Footer Placeholder 2">
             <a:extLst>
               <a:ext uri="{FF2B5EF4-FFF2-40B4-BE49-F238E27FC236}">
-                <a16:creationId xmlns:a16="http://schemas.microsoft.com/office/drawing/2014/main" id="{00EBC183-8AA5-EC44-9987-D65F5C1892A1}"/>
+                <a16:creationId xmlns:a16="http://schemas.microsoft.com/office/drawing/2014/main" xmlns="" id="{00EBC183-8AA5-EC44-9987-D65F5C1892A1}"/>
               </a:ext>
             </a:extLst>
           </p:cNvPr>
@@ -5347,7 +5431,7 @@
         <p:spPr>
           <a:xfrm>
             <a:off x="965288" y="791022"/>
-            <a:ext cx="9129687" cy="230832"/>
+            <a:ext cx="10877088" cy="961072"/>
           </a:xfrm>
         </p:spPr>
         <p:txBody>
@@ -5356,8 +5440,45 @@
           <a:p>
             <a:r>
               <a:rPr lang="en-GB" dirty="0"/>
-              <a:t>7COM1079-2024  Student Group No:                    Names of Student Group Attendees: </a:t>
-            </a:r>
+              <a:t>7COM1079-2024  Student Group No: </a:t>
+            </a:r>
+            <a:r>
+              <a:rPr lang="en-GB" dirty="0"/>
+              <a:t>A246                 </a:t>
+            </a:r>
+            <a:r>
+              <a:rPr lang="en-GB" dirty="0"/>
+              <a:t>Names of Student Group Attendees: </a:t>
+            </a:r>
+            <a:r>
+              <a:rPr lang="en-GB" dirty="0"/>
+              <a:t>Abinaya Sri Arunkumar							     </a:t>
+            </a:r>
+            <a:r>
+              <a:rPr lang="en-GB" dirty="0" smtClean="0"/>
+              <a:t>                                    </a:t>
+            </a:r>
+            <a:r>
+              <a:rPr lang="en-GB" dirty="0"/>
+              <a:t>John Paul Chirstopher Yesudian							  </a:t>
+            </a:r>
+            <a:r>
+              <a:rPr lang="en-GB" dirty="0" smtClean="0"/>
+              <a:t>                      </a:t>
+            </a:r>
+            <a:r>
+              <a:rPr lang="en-GB" dirty="0"/>
+              <a:t>Vishnuvardhan Parasuraman							     </a:t>
+            </a:r>
+            <a:r>
+              <a:rPr lang="en-GB" dirty="0" smtClean="0"/>
+              <a:t>                   </a:t>
+            </a:r>
+            <a:r>
+              <a:rPr lang="en-GB" dirty="0"/>
+              <a:t>Mahesh Ramasubramania</a:t>
+            </a:r>
+            <a:endParaRPr lang="en-GB" dirty="0"/>
           </a:p>
         </p:txBody>
       </p:sp>
@@ -5366,7 +5487,7 @@
           <p:cNvPr id="4" name="Slide Number Placeholder 3">
             <a:extLst>
               <a:ext uri="{FF2B5EF4-FFF2-40B4-BE49-F238E27FC236}">
-                <a16:creationId xmlns:a16="http://schemas.microsoft.com/office/drawing/2014/main" id="{CC9D9611-42EE-7840-81EE-DD6B1A99CD7B}"/>
+                <a16:creationId xmlns:a16="http://schemas.microsoft.com/office/drawing/2014/main" xmlns="" id="{CC9D9611-42EE-7840-81EE-DD6B1A99CD7B}"/>
               </a:ext>
             </a:extLst>
           </p:cNvPr>
@@ -5400,7 +5521,7 @@
           <p:cNvPr id="5" name="Title 4">
             <a:extLst>
               <a:ext uri="{FF2B5EF4-FFF2-40B4-BE49-F238E27FC236}">
-                <a16:creationId xmlns:a16="http://schemas.microsoft.com/office/drawing/2014/main" id="{B3FA3829-F12C-214D-8FBA-7E1A740F65CA}"/>
+                <a16:creationId xmlns:a16="http://schemas.microsoft.com/office/drawing/2014/main" xmlns="" id="{B3FA3829-F12C-214D-8FBA-7E1A740F65CA}"/>
               </a:ext>
             </a:extLst>
           </p:cNvPr>
@@ -5413,7 +5534,7 @@
         </p:nvSpPr>
         <p:spPr>
           <a:xfrm>
-            <a:off x="965288" y="1698305"/>
+            <a:off x="785994" y="1752094"/>
             <a:ext cx="10974945" cy="2699181"/>
           </a:xfrm>
         </p:spPr>
@@ -5429,12 +5550,147 @@
               </a:lnSpc>
             </a:pPr>
             <a:r>
+              <a:rPr lang="en-US" sz="2400" b="0" dirty="0" smtClean="0">
+                <a:latin typeface="Calibri"/>
+                <a:cs typeface="Calibri"/>
+              </a:rPr>
+              <a:t/>
+            </a:r>
+            <a:br>
+              <a:rPr lang="en-US" sz="2400" b="0" dirty="0" smtClean="0">
+                <a:latin typeface="Calibri"/>
+                <a:cs typeface="Calibri"/>
+              </a:rPr>
+            </a:br>
+            <a:r>
+              <a:rPr lang="en-US" sz="2400" b="0" dirty="0" smtClean="0">
+                <a:latin typeface="Calibri"/>
+                <a:cs typeface="Calibri"/>
+              </a:rPr>
+              <a:t>This </a:t>
+            </a:r>
+            <a:r>
               <a:rPr lang="en-US" sz="2400" b="0" dirty="0">
                 <a:latin typeface="Calibri"/>
                 <a:cs typeface="Calibri"/>
               </a:rPr>
-              <a:t>This dataset is interesting to us because </a:t>
-            </a:r>
+              <a:t>dataset is interesting to us because Hyundai's stock data provides insights into </a:t>
+            </a:r>
+            <a:r>
+              <a:rPr lang="en-US" sz="2400" b="0" dirty="0">
+                <a:latin typeface="Calibri"/>
+                <a:cs typeface="Calibri"/>
+              </a:rPr>
+              <a:t>G</a:t>
+            </a:r>
+            <a:r>
+              <a:rPr lang="en-US" sz="2400" b="0" dirty="0" smtClean="0">
+                <a:latin typeface="Calibri"/>
+                <a:cs typeface="Calibri"/>
+              </a:rPr>
+              <a:t>lobal </a:t>
+            </a:r>
+            <a:r>
+              <a:rPr lang="en-US" sz="2400" b="0" dirty="0">
+                <a:latin typeface="Calibri"/>
+                <a:cs typeface="Calibri"/>
+              </a:rPr>
+              <a:t>financial market </a:t>
+            </a:r>
+            <a:r>
+              <a:rPr lang="en-US" sz="2400" b="0" dirty="0">
+                <a:latin typeface="Calibri"/>
+                <a:cs typeface="Calibri"/>
+              </a:rPr>
+              <a:t>A</a:t>
+            </a:r>
+            <a:r>
+              <a:rPr lang="en-US" sz="2400" b="0" dirty="0" smtClean="0">
+                <a:latin typeface="Calibri"/>
+                <a:cs typeface="Calibri"/>
+              </a:rPr>
+              <a:t>nalysis</a:t>
+            </a:r>
+            <a:r>
+              <a:rPr lang="en-US" sz="2400" b="0" dirty="0">
+                <a:latin typeface="Calibri"/>
+                <a:cs typeface="Calibri"/>
+              </a:rPr>
+              <a:t>.</a:t>
+            </a:r>
+            <a:r>
+              <a:rPr lang="en-US" sz="2400" b="0" dirty="0">
+                <a:latin typeface="Calibri" panose="020F0502020204030204" pitchFamily="34" charset="0"/>
+                <a:cs typeface="Calibri" panose="020F0502020204030204" pitchFamily="34" charset="0"/>
+              </a:rPr>
+              <a:t/>
+            </a:r>
+            <a:br>
+              <a:rPr lang="en-US" sz="2400" b="0" dirty="0">
+                <a:latin typeface="Calibri" panose="020F0502020204030204" pitchFamily="34" charset="0"/>
+                <a:cs typeface="Calibri" panose="020F0502020204030204" pitchFamily="34" charset="0"/>
+              </a:rPr>
+            </a:br>
+            <a:r>
+              <a:rPr lang="en-US" sz="2400" b="0" dirty="0">
+                <a:latin typeface="Calibri" panose="020F0502020204030204" pitchFamily="34" charset="0"/>
+                <a:cs typeface="Calibri" panose="020F0502020204030204" pitchFamily="34" charset="0"/>
+              </a:rPr>
+              <a:t/>
+            </a:r>
+            <a:br>
+              <a:rPr lang="en-US" sz="2400" b="0" dirty="0">
+                <a:latin typeface="Calibri" panose="020F0502020204030204" pitchFamily="34" charset="0"/>
+                <a:cs typeface="Calibri" panose="020F0502020204030204" pitchFamily="34" charset="0"/>
+              </a:rPr>
+            </a:br>
+            <a:r>
+              <a:rPr lang="en-US" sz="2400" b="0" dirty="0">
+                <a:latin typeface="Calibri" panose="020F0502020204030204" pitchFamily="34" charset="0"/>
+                <a:cs typeface="Calibri" panose="020F0502020204030204" pitchFamily="34" charset="0"/>
+              </a:rPr>
+              <a:t/>
+            </a:r>
+            <a:br>
+              <a:rPr lang="en-US" sz="2400" b="0" dirty="0">
+                <a:latin typeface="Calibri" panose="020F0502020204030204" pitchFamily="34" charset="0"/>
+                <a:cs typeface="Calibri" panose="020F0502020204030204" pitchFamily="34" charset="0"/>
+              </a:rPr>
+            </a:br>
+            <a:r>
+              <a:rPr lang="en-US" sz="2400" b="0" dirty="0">
+                <a:latin typeface="Calibri"/>
+                <a:cs typeface="Calibri"/>
+              </a:rPr>
+              <a:t>Our  Independent variable </a:t>
+            </a:r>
+            <a:r>
+              <a:rPr lang="en-US" sz="2400" b="0" dirty="0" smtClean="0">
+                <a:latin typeface="Calibri"/>
+                <a:cs typeface="Calibri"/>
+              </a:rPr>
+              <a:t>is CLOSE</a:t>
+            </a:r>
+            <a:r>
+              <a:rPr lang="en-US" sz="2400" b="0" dirty="0" smtClean="0">
+                <a:latin typeface="Calibri"/>
+                <a:cs typeface="Calibri"/>
+              </a:rPr>
+              <a:t> (SIMPLE MOVING AVERAGE)</a:t>
+            </a:r>
+            <a:r>
+              <a:rPr lang="en-US" sz="2400" b="0" dirty="0">
+                <a:latin typeface="Calibri" panose="020F0502020204030204" pitchFamily="34" charset="0"/>
+                <a:cs typeface="Calibri" panose="020F0502020204030204" pitchFamily="34" charset="0"/>
+              </a:rPr>
+              <a:t/>
+            </a:r>
+            <a:br>
+              <a:rPr lang="en-US" sz="2400" b="0" dirty="0">
+                <a:latin typeface="Calibri" panose="020F0502020204030204" pitchFamily="34" charset="0"/>
+                <a:cs typeface="Calibri" panose="020F0502020204030204" pitchFamily="34" charset="0"/>
+              </a:rPr>
+            </a:br>
             <a:r>
               <a:rPr lang="en-US" sz="2400" b="0" dirty="0">
                 <a:solidFill>
@@ -5443,7 +5699,35 @@
                 <a:latin typeface="Calibri"/>
                 <a:cs typeface="Calibri"/>
               </a:rPr>
-              <a:t>(one sentence):</a:t>
+              <a:t>                   </a:t>
+            </a:r>
+            <a:r>
+              <a:rPr lang="en-US" sz="2400" b="0" dirty="0">
+                <a:latin typeface="Calibri"/>
+                <a:cs typeface="Calibri"/>
+              </a:rPr>
+              <a:t>This  Independent variable datatype is </a:t>
+            </a:r>
+            <a:r>
+              <a:rPr lang="en-US" sz="2400" b="0" dirty="0">
+                <a:latin typeface="Calibri"/>
+                <a:cs typeface="Calibri"/>
+              </a:rPr>
+              <a:t>:</a:t>
+            </a:r>
+            <a:r>
+              <a:rPr lang="en-US" sz="2400" b="0" dirty="0" smtClean="0">
+                <a:latin typeface="Calibri"/>
+                <a:cs typeface="Calibri"/>
+              </a:rPr>
+              <a:t> INTERVAL</a:t>
+            </a:r>
+            <a:r>
+              <a:rPr lang="en-US" sz="2400" b="0" dirty="0">
+                <a:latin typeface="Calibri" panose="020F0502020204030204" pitchFamily="34" charset="0"/>
+                <a:cs typeface="Calibri" panose="020F0502020204030204" pitchFamily="34" charset="0"/>
+              </a:rPr>
+              <a:t/>
             </a:r>
             <a:br>
               <a:rPr lang="en-US" sz="2400" b="0" dirty="0">
@@ -5451,37 +5735,33 @@
                 <a:cs typeface="Calibri" panose="020F0502020204030204" pitchFamily="34" charset="0"/>
               </a:rPr>
             </a:br>
+            <a:r>
+              <a:rPr lang="en-US" sz="2400" b="0" dirty="0">
+                <a:latin typeface="Calibri"/>
+                <a:cs typeface="Calibri"/>
+              </a:rPr>
+              <a:t>Our Dependent variable is: </a:t>
+            </a:r>
+            <a:r>
+              <a:rPr lang="en-US" sz="2400" b="0" dirty="0" smtClean="0">
+                <a:latin typeface="Calibri"/>
+                <a:cs typeface="Calibri"/>
+              </a:rPr>
+              <a:t>VOLUME</a:t>
+            </a:r>
+            <a:r>
+              <a:rPr lang="en-US" sz="2400" b="0" dirty="0">
+                <a:latin typeface="Calibri" panose="020F0502020204030204" pitchFamily="34" charset="0"/>
+                <a:cs typeface="Calibri" panose="020F0502020204030204" pitchFamily="34" charset="0"/>
+              </a:rPr>
+              <a:t/>
+            </a:r>
             <a:br>
               <a:rPr lang="en-US" sz="2400" b="0" dirty="0">
                 <a:latin typeface="Calibri" panose="020F0502020204030204" pitchFamily="34" charset="0"/>
                 <a:cs typeface="Calibri" panose="020F0502020204030204" pitchFamily="34" charset="0"/>
               </a:rPr>
             </a:br>
-            <a:r>
-              <a:rPr lang="en-US" sz="2400" b="0" i="1" dirty="0">
-                <a:solidFill>
-                  <a:schemeClr val="accent2">
-                    <a:lumMod val="75000"/>
-                  </a:schemeClr>
-                </a:solidFill>
-                <a:latin typeface="Calibri"/>
-                <a:cs typeface="Calibri"/>
-              </a:rPr>
-              <a:t>From the column headings in your dataset choose ONE independent * and ONE dependent variable . </a:t>
-            </a:r>
-            <a:br>
-              <a:rPr lang="en-US" sz="2400" b="0" dirty="0">
-                <a:latin typeface="Calibri" panose="020F0502020204030204" pitchFamily="34" charset="0"/>
-                <a:cs typeface="Calibri" panose="020F0502020204030204" pitchFamily="34" charset="0"/>
-              </a:rPr>
-            </a:br>
-            <a:r>
-              <a:rPr lang="en-US" sz="2400" b="0" dirty="0">
-                <a:latin typeface="Calibri"/>
-                <a:cs typeface="Calibri"/>
-              </a:rPr>
-              <a:t>Our  Independent variable is: (</a:t>
-            </a:r>
             <a:r>
               <a:rPr lang="en-US" sz="2400" b="0" dirty="0">
                 <a:solidFill>
@@ -5490,22 +5770,6 @@
                 <a:latin typeface="Calibri"/>
                 <a:cs typeface="Calibri"/>
               </a:rPr>
-              <a:t>the variable that remains constant /could cause an effect  on dep var)</a:t>
-            </a:r>
-            <a:br>
-              <a:rPr lang="en-US" sz="2400" b="0" dirty="0">
-                <a:latin typeface="Calibri" panose="020F0502020204030204" pitchFamily="34" charset="0"/>
-                <a:cs typeface="Calibri" panose="020F0502020204030204" pitchFamily="34" charset="0"/>
-              </a:rPr>
-            </a:br>
-            <a:r>
-              <a:rPr lang="en-US" sz="2400" b="0" dirty="0">
-                <a:solidFill>
-                  <a:srgbClr val="FF0000"/>
-                </a:solidFill>
-                <a:latin typeface="Calibri"/>
-                <a:cs typeface="Calibri"/>
-              </a:rPr>
               <a:t>                   </a:t>
             </a:r>
             <a:r>
@@ -5513,115 +5777,29 @@
                 <a:latin typeface="Calibri"/>
                 <a:cs typeface="Calibri"/>
               </a:rPr>
-              <a:t>This  Independent variable datatype is (select one): </a:t>
-            </a:r>
-            <a:r>
-              <a:rPr lang="en-US" sz="2400" b="0" dirty="0">
-                <a:solidFill>
-                  <a:srgbClr val="FF0000"/>
-                </a:solidFill>
+              <a:t>This Dependent variable datatype is  </a:t>
+            </a:r>
+            <a:r>
+              <a:rPr lang="en-US" sz="2400" b="0" dirty="0" smtClean="0">
                 <a:latin typeface="Calibri"/>
                 <a:cs typeface="Calibri"/>
               </a:rPr>
-              <a:t>Nominal/categorial  OR Ordinal OR Interval/measurement data.</a:t>
-            </a:r>
-            <a:br>
-              <a:rPr lang="en-US" sz="2400" b="0" dirty="0">
-                <a:latin typeface="Calibri" panose="020F0502020204030204" pitchFamily="34" charset="0"/>
-                <a:cs typeface="Calibri" panose="020F0502020204030204" pitchFamily="34" charset="0"/>
-              </a:rPr>
-            </a:br>
+              <a:t>: </a:t>
+            </a:r>
             <a:r>
               <a:rPr lang="en-US" sz="2400" b="0" dirty="0">
                 <a:latin typeface="Calibri"/>
                 <a:cs typeface="Calibri"/>
               </a:rPr>
-              <a:t>Our Dependent variable is: </a:t>
-            </a:r>
-            <a:r>
-              <a:rPr lang="en-US" sz="2400" b="0" dirty="0">
-                <a:solidFill>
-                  <a:srgbClr val="FF0000"/>
-                </a:solidFill>
-                <a:latin typeface="Calibri"/>
-                <a:cs typeface="Calibri"/>
-              </a:rPr>
-              <a:t>(your outcome variable that answers your RQ)</a:t>
-            </a:r>
-            <a:br>
-              <a:rPr lang="en-US" sz="2400" b="0" dirty="0">
-                <a:latin typeface="Calibri" panose="020F0502020204030204" pitchFamily="34" charset="0"/>
-                <a:cs typeface="Calibri" panose="020F0502020204030204" pitchFamily="34" charset="0"/>
-              </a:rPr>
-            </a:br>
-            <a:r>
-              <a:rPr lang="en-US" sz="2400" b="0" dirty="0">
-                <a:solidFill>
-                  <a:srgbClr val="FF0000"/>
-                </a:solidFill>
-                <a:latin typeface="Calibri"/>
-                <a:cs typeface="Calibri"/>
-              </a:rPr>
-              <a:t>                   </a:t>
-            </a:r>
-            <a:r>
-              <a:rPr lang="en-US" sz="2400" b="0" dirty="0">
-                <a:latin typeface="Calibri"/>
-                <a:cs typeface="Calibri"/>
-              </a:rPr>
-              <a:t>This Dependent variable datatype is  (select one): </a:t>
-            </a:r>
-            <a:r>
-              <a:rPr lang="en-US" sz="2400" b="0" dirty="0">
-                <a:solidFill>
-                  <a:srgbClr val="FF0000"/>
-                </a:solidFill>
-                <a:latin typeface="Calibri"/>
-                <a:cs typeface="Calibri"/>
-              </a:rPr>
-              <a:t>Nominal/categorial  OR Ordinal OR Interval/measurement data</a:t>
-            </a:r>
-          </a:p>
-        </p:txBody>
-      </p:sp>
-      <p:sp>
-        <p:nvSpPr>
-          <p:cNvPr id="6" name="TextBox 5">
-            <a:extLst>
-              <a:ext uri="{FF2B5EF4-FFF2-40B4-BE49-F238E27FC236}">
-                <a16:creationId xmlns:a16="http://schemas.microsoft.com/office/drawing/2014/main" id="{732D6C0D-D649-2AA9-7741-835F3E841A25}"/>
-              </a:ext>
-            </a:extLst>
-          </p:cNvPr>
-          <p:cNvSpPr txBox="1"/>
-          <p:nvPr/>
-        </p:nvSpPr>
-        <p:spPr>
-          <a:xfrm>
-            <a:off x="6766560" y="5385816"/>
-            <a:ext cx="4187952" cy="1200329"/>
-          </a:xfrm>
-          <a:prstGeom prst="rect">
-            <a:avLst/>
-          </a:prstGeom>
-          <a:noFill/>
-        </p:spPr>
-        <p:txBody>
-          <a:bodyPr wrap="square" rtlCol="0">
-            <a:spAutoFit/>
-          </a:bodyPr>
-          <a:lstStyle/>
-          <a:p>
-            <a:r>
-              <a:rPr lang="en-GB" dirty="0">
-                <a:solidFill>
-                  <a:schemeClr val="accent2">
-                    <a:lumMod val="75000"/>
-                  </a:schemeClr>
-                </a:solidFill>
-              </a:rPr>
-              <a:t>*For comparison of two nominal variables and for comparison of proportions you use two (or more) independent variables (see next slide)</a:t>
-            </a:r>
+              <a:t>INTERVAL</a:t>
+            </a:r>
+            <a:endParaRPr lang="en-US" sz="2400" b="0" dirty="0">
+              <a:solidFill>
+                <a:srgbClr val="FF0000"/>
+              </a:solidFill>
+              <a:latin typeface="Calibri"/>
+              <a:cs typeface="Calibri"/>
+            </a:endParaRPr>
           </a:p>
         </p:txBody>
       </p:sp>
@@ -5635,6 +5813,13 @@
   <p:clrMapOvr>
     <a:masterClrMapping/>
   </p:clrMapOvr>
+  <p:timing>
+    <p:tnLst>
+      <p:par>
+        <p:cTn id="1" dur="indefinite" restart="never" nodeType="tmRoot"/>
+      </p:par>
+    </p:tnLst>
+  </p:timing>
 </p:sld>
 </file>
 
@@ -5660,7 +5845,7 @@
           <p:cNvPr id="2" name="Subtitle 1">
             <a:extLst>
               <a:ext uri="{FF2B5EF4-FFF2-40B4-BE49-F238E27FC236}">
-                <a16:creationId xmlns:a16="http://schemas.microsoft.com/office/drawing/2014/main" id="{8E3CD731-5ACF-B002-247D-243F6E2149EC}"/>
+                <a16:creationId xmlns:a16="http://schemas.microsoft.com/office/drawing/2014/main" xmlns="" id="{8E3CD731-5ACF-B002-247D-243F6E2149EC}"/>
               </a:ext>
             </a:extLst>
           </p:cNvPr>
@@ -5688,16 +5873,17 @@
             </a:pPr>
             <a:r>
               <a:rPr lang="en-GB" dirty="0"/>
-              <a:t>Our Research Question is </a:t>
-            </a:r>
-            <a:r>
-              <a:rPr lang="en-GB" sz="1800" dirty="0">
-                <a:solidFill>
-                  <a:srgbClr val="FF0000"/>
-                </a:solidFill>
-              </a:rPr>
-              <a:t>Choose ONE of the three templates below replacing the blue text with your variables – then add hypotheses as shown in next slide:</a:t>
-            </a:r>
+              <a:t>Our Research Question </a:t>
+            </a:r>
+            <a:r>
+              <a:rPr lang="en-GB" dirty="0" smtClean="0"/>
+              <a:t>is</a:t>
+            </a:r>
+            <a:endParaRPr lang="en-GB" sz="1800" dirty="0">
+              <a:solidFill>
+                <a:srgbClr val="FF0000"/>
+              </a:solidFill>
+            </a:endParaRPr>
           </a:p>
         </p:txBody>
       </p:sp>
@@ -5706,7 +5892,7 @@
           <p:cNvPr id="3" name="Footer Placeholder 2">
             <a:extLst>
               <a:ext uri="{FF2B5EF4-FFF2-40B4-BE49-F238E27FC236}">
-                <a16:creationId xmlns:a16="http://schemas.microsoft.com/office/drawing/2014/main" id="{3C4D431B-7665-75B0-2D73-5BD588DCB766}"/>
+                <a16:creationId xmlns:a16="http://schemas.microsoft.com/office/drawing/2014/main" xmlns="" id="{3C4D431B-7665-75B0-2D73-5BD588DCB766}"/>
               </a:ext>
             </a:extLst>
           </p:cNvPr>
@@ -5724,8 +5910,13 @@
           <a:p>
             <a:r>
               <a:rPr lang="en-GB" dirty="0"/>
-              <a:t>PRE 7COM1079-2024  Student Group No:  ?????</a:t>
-            </a:r>
+              <a:t>PRE 7COM1079-2024  Student Group No: </a:t>
+            </a:r>
+            <a:r>
+              <a:rPr lang="en-GB" dirty="0"/>
+              <a:t>A246 </a:t>
+            </a:r>
+            <a:endParaRPr lang="en-GB" dirty="0"/>
           </a:p>
         </p:txBody>
       </p:sp>
@@ -5734,7 +5925,7 @@
           <p:cNvPr id="4" name="Slide Number Placeholder 3">
             <a:extLst>
               <a:ext uri="{FF2B5EF4-FFF2-40B4-BE49-F238E27FC236}">
-                <a16:creationId xmlns:a16="http://schemas.microsoft.com/office/drawing/2014/main" id="{1625FA15-B17F-387B-E383-5505647ABB89}"/>
+                <a16:creationId xmlns:a16="http://schemas.microsoft.com/office/drawing/2014/main" xmlns="" id="{1625FA15-B17F-387B-E383-5505647ABB89}"/>
               </a:ext>
             </a:extLst>
           </p:cNvPr>
@@ -5768,7 +5959,7 @@
           <p:cNvPr id="5" name="Title 4">
             <a:extLst>
               <a:ext uri="{FF2B5EF4-FFF2-40B4-BE49-F238E27FC236}">
-                <a16:creationId xmlns:a16="http://schemas.microsoft.com/office/drawing/2014/main" id="{3440DA25-F620-152B-DE9E-776F7B74DFF0}"/>
+                <a16:creationId xmlns:a16="http://schemas.microsoft.com/office/drawing/2014/main" xmlns="" id="{3440DA25-F620-152B-DE9E-776F7B74DFF0}"/>
               </a:ext>
             </a:extLst>
           </p:cNvPr>
@@ -5833,88 +6024,44 @@
               <a:t>Interval/Ordinal vs Interval/Ordinal: “Is there a correlation between </a:t>
             </a:r>
             <a:r>
-              <a:rPr lang="en-IE" sz="2400" b="0" dirty="0">
+              <a:rPr lang="en-IE" sz="2400" b="0" dirty="0" smtClean="0">
                 <a:solidFill>
                   <a:srgbClr val="0070C0"/>
                 </a:solidFill>
+                <a:latin typeface="Calibri" panose="020F0502020204030204" pitchFamily="34" charset="0"/>
+                <a:ea typeface="Calibri" panose="020F0502020204030204" pitchFamily="34" charset="0"/>
+                <a:cs typeface="Times New Roman" panose="02020603050405020304" pitchFamily="18" charset="0"/>
+              </a:rPr>
+              <a:t>simple moving average of Close </a:t>
+            </a:r>
+            <a:r>
+              <a:rPr lang="en-IE" sz="2400" b="0" dirty="0" smtClean="0">
                 <a:effectLst/>
                 <a:latin typeface="Calibri" panose="020F0502020204030204" pitchFamily="34" charset="0"/>
                 <a:ea typeface="Calibri" panose="020F0502020204030204" pitchFamily="34" charset="0"/>
                 <a:cs typeface="Times New Roman" panose="02020603050405020304" pitchFamily="18" charset="0"/>
               </a:rPr>
-              <a:t>[dependent interval </a:t>
-            </a:r>
-            <a:r>
-              <a:rPr lang="en-IE" sz="2400" b="0" dirty="0">
+              <a:t>and </a:t>
+            </a:r>
+            <a:r>
+              <a:rPr lang="en-IE" sz="2400" b="0" dirty="0" smtClean="0">
+                <a:solidFill>
+                  <a:srgbClr val="0070C0"/>
+                </a:solidFill>
+                <a:latin typeface="Calibri" panose="020F0502020204030204" pitchFamily="34" charset="0"/>
+                <a:ea typeface="Calibri" panose="020F0502020204030204" pitchFamily="34" charset="0"/>
+                <a:cs typeface="Times New Roman" panose="02020603050405020304" pitchFamily="18" charset="0"/>
+              </a:rPr>
+              <a:t>volume </a:t>
+            </a:r>
+            <a:r>
+              <a:rPr lang="en-IE" sz="2400" dirty="0">
                 <a:effectLst/>
                 <a:latin typeface="Calibri" panose="020F0502020204030204" pitchFamily="34" charset="0"/>
                 <a:ea typeface="Calibri" panose="020F0502020204030204" pitchFamily="34" charset="0"/>
                 <a:cs typeface="Times New Roman" panose="02020603050405020304" pitchFamily="18" charset="0"/>
               </a:rPr>
-              <a:t>or</a:t>
-            </a:r>
-            <a:r>
-              <a:rPr lang="en-IE" sz="2400" b="0" dirty="0">
-                <a:solidFill>
-                  <a:srgbClr val="0070C0"/>
-                </a:solidFill>
-                <a:effectLst/>
-                <a:latin typeface="Calibri" panose="020F0502020204030204" pitchFamily="34" charset="0"/>
-                <a:ea typeface="Calibri" panose="020F0502020204030204" pitchFamily="34" charset="0"/>
-                <a:cs typeface="Times New Roman" panose="02020603050405020304" pitchFamily="18" charset="0"/>
-              </a:rPr>
-              <a:t> ordinal variable] </a:t>
-            </a:r>
-            <a:r>
-              <a:rPr lang="en-IE" sz="2400" b="0" dirty="0">
-                <a:effectLst/>
-                <a:latin typeface="Calibri" panose="020F0502020204030204" pitchFamily="34" charset="0"/>
-                <a:ea typeface="Calibri" panose="020F0502020204030204" pitchFamily="34" charset="0"/>
-                <a:cs typeface="Times New Roman" panose="02020603050405020304" pitchFamily="18" charset="0"/>
-              </a:rPr>
-              <a:t>and </a:t>
-            </a:r>
-            <a:r>
-              <a:rPr lang="en-IE" sz="2400" b="0" dirty="0">
-                <a:solidFill>
-                  <a:srgbClr val="0070C0"/>
-                </a:solidFill>
-                <a:effectLst/>
-                <a:latin typeface="Calibri" panose="020F0502020204030204" pitchFamily="34" charset="0"/>
-                <a:ea typeface="Calibri" panose="020F0502020204030204" pitchFamily="34" charset="0"/>
-                <a:cs typeface="Times New Roman" panose="02020603050405020304" pitchFamily="18" charset="0"/>
-              </a:rPr>
-              <a:t>[independent interval </a:t>
-            </a:r>
-            <a:r>
-              <a:rPr lang="en-IE" sz="2400" b="0" dirty="0">
-                <a:effectLst/>
-                <a:latin typeface="Calibri" panose="020F0502020204030204" pitchFamily="34" charset="0"/>
-                <a:ea typeface="Calibri" panose="020F0502020204030204" pitchFamily="34" charset="0"/>
-                <a:cs typeface="Times New Roman" panose="02020603050405020304" pitchFamily="18" charset="0"/>
-              </a:rPr>
-              <a:t>or</a:t>
-            </a:r>
-            <a:r>
-              <a:rPr lang="en-IE" sz="2400" b="0" dirty="0">
-                <a:solidFill>
-                  <a:srgbClr val="0070C0"/>
-                </a:solidFill>
-                <a:effectLst/>
-                <a:latin typeface="Calibri" panose="020F0502020204030204" pitchFamily="34" charset="0"/>
-                <a:ea typeface="Calibri" panose="020F0502020204030204" pitchFamily="34" charset="0"/>
-                <a:cs typeface="Times New Roman" panose="02020603050405020304" pitchFamily="18" charset="0"/>
-              </a:rPr>
-              <a:t> ordinal variable?]”</a:t>
-            </a:r>
-            <a:r>
-              <a:rPr lang="en-IE" sz="2400" b="0" dirty="0">
-                <a:effectLst/>
-                <a:latin typeface="Calibri" panose="020F0502020204030204" pitchFamily="34" charset="0"/>
-                <a:ea typeface="Calibri" panose="020F0502020204030204" pitchFamily="34" charset="0"/>
-                <a:cs typeface="Times New Roman" panose="02020603050405020304" pitchFamily="18" charset="0"/>
-              </a:rPr>
-              <a:t>. </a:t>
+              <a:t/>
             </a:r>
             <a:br>
               <a:rPr lang="en-IE" sz="2400" dirty="0">
@@ -5924,261 +6071,14 @@
                 <a:cs typeface="Times New Roman" panose="02020603050405020304" pitchFamily="18" charset="0"/>
               </a:rPr>
             </a:br>
-            <a:br>
-              <a:rPr lang="en-IE" sz="2400" dirty="0">
+            <a:r>
+              <a:rPr lang="en-GB" sz="2400" dirty="0">
                 <a:effectLst/>
                 <a:latin typeface="Calibri" panose="020F0502020204030204" pitchFamily="34" charset="0"/>
                 <a:ea typeface="Calibri" panose="020F0502020204030204" pitchFamily="34" charset="0"/>
                 <a:cs typeface="Times New Roman" panose="02020603050405020304" pitchFamily="18" charset="0"/>
               </a:rPr>
-            </a:br>
-            <a:r>
-              <a:rPr lang="en-IE" sz="2400" dirty="0">
-                <a:effectLst/>
-                <a:latin typeface="Calibri" panose="020F0502020204030204" pitchFamily="34" charset="0"/>
-                <a:ea typeface="Calibri" panose="020F0502020204030204" pitchFamily="34" charset="0"/>
-                <a:cs typeface="Times New Roman" panose="02020603050405020304" pitchFamily="18" charset="0"/>
-              </a:rPr>
-              <a:t>Template</a:t>
-            </a:r>
-            <a:r>
-              <a:rPr lang="en-IE" sz="2400" baseline="30000" dirty="0">
-                <a:effectLst/>
-                <a:latin typeface="Calibri" panose="020F0502020204030204" pitchFamily="34" charset="0"/>
-                <a:ea typeface="Calibri" panose="020F0502020204030204" pitchFamily="34" charset="0"/>
-                <a:cs typeface="Times New Roman" panose="02020603050405020304" pitchFamily="18" charset="0"/>
-              </a:rPr>
-              <a:t>2</a:t>
-            </a:r>
-            <a:r>
-              <a:rPr lang="en-IE" sz="2400" dirty="0">
-                <a:effectLst/>
-                <a:latin typeface="Calibri" panose="020F0502020204030204" pitchFamily="34" charset="0"/>
-                <a:ea typeface="Calibri" panose="020F0502020204030204" pitchFamily="34" charset="0"/>
-                <a:cs typeface="Times New Roman" panose="02020603050405020304" pitchFamily="18" charset="0"/>
-              </a:rPr>
-              <a:t> :</a:t>
-            </a:r>
-            <a:r>
-              <a:rPr lang="en-IE" sz="2400" b="0" dirty="0">
-                <a:effectLst/>
-                <a:latin typeface="Calibri" panose="020F0502020204030204" pitchFamily="34" charset="0"/>
-                <a:ea typeface="Calibri" panose="020F0502020204030204" pitchFamily="34" charset="0"/>
-                <a:cs typeface="Times New Roman" panose="02020603050405020304" pitchFamily="18" charset="0"/>
-              </a:rPr>
-              <a:t>Interval/Ordinal vs Nominal. data “Is there a difference in the mean of </a:t>
-            </a:r>
-            <a:r>
-              <a:rPr lang="en-IE" sz="2400" b="0" dirty="0">
-                <a:solidFill>
-                  <a:srgbClr val="0070C0"/>
-                </a:solidFill>
-                <a:effectLst/>
-                <a:latin typeface="Calibri" panose="020F0502020204030204" pitchFamily="34" charset="0"/>
-                <a:ea typeface="Calibri" panose="020F0502020204030204" pitchFamily="34" charset="0"/>
-                <a:cs typeface="Times New Roman" panose="02020603050405020304" pitchFamily="18" charset="0"/>
-              </a:rPr>
-              <a:t>[dependent interval variable </a:t>
-            </a:r>
-            <a:r>
-              <a:rPr lang="en-IE" sz="2400" b="0" dirty="0">
-                <a:solidFill>
-                  <a:srgbClr val="0070C0"/>
-                </a:solidFill>
-                <a:latin typeface="Calibri" panose="020F0502020204030204" pitchFamily="34" charset="0"/>
-                <a:ea typeface="Calibri" panose="020F0502020204030204" pitchFamily="34" charset="0"/>
-                <a:cs typeface="Times New Roman" panose="02020603050405020304" pitchFamily="18" charset="0"/>
-              </a:rPr>
-              <a:t> </a:t>
-            </a:r>
-            <a:r>
-              <a:rPr lang="en-IE" sz="2400" b="0" dirty="0">
-                <a:latin typeface="Calibri" panose="020F0502020204030204" pitchFamily="34" charset="0"/>
-                <a:ea typeface="Calibri" panose="020F0502020204030204" pitchFamily="34" charset="0"/>
-                <a:cs typeface="Times New Roman" panose="02020603050405020304" pitchFamily="18" charset="0"/>
-              </a:rPr>
-              <a:t>or</a:t>
-            </a:r>
-            <a:r>
-              <a:rPr lang="en-IE" sz="2400" b="0" dirty="0">
-                <a:effectLst/>
-                <a:latin typeface="Calibri" panose="020F0502020204030204" pitchFamily="34" charset="0"/>
-                <a:ea typeface="Calibri" panose="020F0502020204030204" pitchFamily="34" charset="0"/>
-                <a:cs typeface="Times New Roman" panose="02020603050405020304" pitchFamily="18" charset="0"/>
-              </a:rPr>
-              <a:t> </a:t>
-            </a:r>
-            <a:r>
-              <a:rPr lang="en-IE" sz="2400" b="0" dirty="0">
-                <a:solidFill>
-                  <a:srgbClr val="0070C0"/>
-                </a:solidFill>
-                <a:effectLst/>
-                <a:latin typeface="Calibri" panose="020F0502020204030204" pitchFamily="34" charset="0"/>
-                <a:ea typeface="Calibri" panose="020F0502020204030204" pitchFamily="34" charset="0"/>
-                <a:cs typeface="Times New Roman" panose="02020603050405020304" pitchFamily="18" charset="0"/>
-              </a:rPr>
-              <a:t> dependent ordinal variable] </a:t>
-            </a:r>
-            <a:r>
-              <a:rPr lang="en-IE" sz="2400" b="0" dirty="0">
-                <a:effectLst/>
-                <a:latin typeface="Calibri" panose="020F0502020204030204" pitchFamily="34" charset="0"/>
-                <a:ea typeface="Calibri" panose="020F0502020204030204" pitchFamily="34" charset="0"/>
-                <a:cs typeface="Times New Roman" panose="02020603050405020304" pitchFamily="18" charset="0"/>
-              </a:rPr>
-              <a:t>between </a:t>
-            </a:r>
-            <a:r>
-              <a:rPr lang="en-IE" sz="2400" b="0" dirty="0">
-                <a:solidFill>
-                  <a:srgbClr val="0070C0"/>
-                </a:solidFill>
-                <a:effectLst/>
-                <a:latin typeface="Calibri" panose="020F0502020204030204" pitchFamily="34" charset="0"/>
-                <a:ea typeface="Calibri" panose="020F0502020204030204" pitchFamily="34" charset="0"/>
-                <a:cs typeface="Times New Roman" panose="02020603050405020304" pitchFamily="18" charset="0"/>
-              </a:rPr>
-              <a:t>[independent nominal variable] and [independent nominal variable?]</a:t>
-            </a:r>
-            <a:r>
-              <a:rPr lang="en-IE" sz="2400" b="0" dirty="0">
-                <a:effectLst/>
-                <a:latin typeface="Calibri" panose="020F0502020204030204" pitchFamily="34" charset="0"/>
-                <a:ea typeface="Calibri" panose="020F0502020204030204" pitchFamily="34" charset="0"/>
-                <a:cs typeface="Times New Roman" panose="02020603050405020304" pitchFamily="18" charset="0"/>
-              </a:rPr>
-              <a:t>”.</a:t>
-            </a:r>
-            <a:br>
-              <a:rPr lang="en-GB" sz="2400" b="0" dirty="0">
-                <a:effectLst/>
-                <a:latin typeface="Calibri" panose="020F0502020204030204" pitchFamily="34" charset="0"/>
-                <a:ea typeface="Calibri" panose="020F0502020204030204" pitchFamily="34" charset="0"/>
-                <a:cs typeface="Times New Roman" panose="02020603050405020304" pitchFamily="18" charset="0"/>
-              </a:rPr>
-            </a:br>
-            <a:br>
-              <a:rPr lang="en-IE" sz="2400" dirty="0">
-                <a:solidFill>
-                  <a:srgbClr val="000000"/>
-                </a:solidFill>
-                <a:effectLst/>
-                <a:latin typeface="Calibri" panose="020F0502020204030204" pitchFamily="34" charset="0"/>
-                <a:ea typeface="Calibri" panose="020F0502020204030204" pitchFamily="34" charset="0"/>
-                <a:cs typeface="Times New Roman" panose="02020603050405020304" pitchFamily="18" charset="0"/>
-              </a:rPr>
-            </a:br>
-            <a:r>
-              <a:rPr lang="en-IE" sz="2400" dirty="0">
-                <a:solidFill>
-                  <a:srgbClr val="000000"/>
-                </a:solidFill>
-                <a:effectLst/>
-                <a:latin typeface="Calibri" panose="020F0502020204030204" pitchFamily="34" charset="0"/>
-                <a:ea typeface="Calibri" panose="020F0502020204030204" pitchFamily="34" charset="0"/>
-                <a:cs typeface="Times New Roman" panose="02020603050405020304" pitchFamily="18" charset="0"/>
-              </a:rPr>
-              <a:t>Template </a:t>
-            </a:r>
-            <a:r>
-              <a:rPr lang="en-IE" sz="2400" baseline="30000" dirty="0">
-                <a:solidFill>
-                  <a:srgbClr val="000000"/>
-                </a:solidFill>
-                <a:effectLst/>
-                <a:latin typeface="Calibri" panose="020F0502020204030204" pitchFamily="34" charset="0"/>
-                <a:ea typeface="Calibri" panose="020F0502020204030204" pitchFamily="34" charset="0"/>
-                <a:cs typeface="Times New Roman" panose="02020603050405020304" pitchFamily="18" charset="0"/>
-              </a:rPr>
-              <a:t>3</a:t>
-            </a:r>
-            <a:r>
-              <a:rPr lang="en-IE" sz="2400" dirty="0">
-                <a:solidFill>
-                  <a:srgbClr val="000000"/>
-                </a:solidFill>
-                <a:effectLst/>
-                <a:latin typeface="Calibri" panose="020F0502020204030204" pitchFamily="34" charset="0"/>
-                <a:ea typeface="Calibri" panose="020F0502020204030204" pitchFamily="34" charset="0"/>
-                <a:cs typeface="Times New Roman" panose="02020603050405020304" pitchFamily="18" charset="0"/>
-              </a:rPr>
-              <a:t>:  </a:t>
-            </a:r>
-            <a:r>
-              <a:rPr lang="en-IE" sz="2400" b="0" dirty="0">
-                <a:solidFill>
-                  <a:srgbClr val="000000"/>
-                </a:solidFill>
-                <a:effectLst/>
-                <a:latin typeface="Calibri" panose="020F0502020204030204" pitchFamily="34" charset="0"/>
-                <a:ea typeface="Calibri" panose="020F0502020204030204" pitchFamily="34" charset="0"/>
-                <a:cs typeface="Times New Roman" panose="02020603050405020304" pitchFamily="18" charset="0"/>
-              </a:rPr>
-              <a:t>Nominal vs Nominal  data (frequencies): “</a:t>
-            </a:r>
-            <a:r>
-              <a:rPr lang="en-IE" sz="2400" b="0" dirty="0">
-                <a:effectLst/>
-                <a:latin typeface="Calibri" panose="020F0502020204030204" pitchFamily="34" charset="0"/>
-                <a:ea typeface="Calibri" panose="020F0502020204030204" pitchFamily="34" charset="0"/>
-                <a:cs typeface="Times New Roman" panose="02020603050405020304" pitchFamily="18" charset="0"/>
-              </a:rPr>
-              <a:t>Is there a difference in proportions of </a:t>
-            </a:r>
-            <a:r>
-              <a:rPr lang="en-IE" sz="2400" b="0" dirty="0">
-                <a:solidFill>
-                  <a:srgbClr val="0070C0"/>
-                </a:solidFill>
-                <a:effectLst/>
-                <a:latin typeface="Calibri" panose="020F0502020204030204" pitchFamily="34" charset="0"/>
-                <a:ea typeface="Calibri" panose="020F0502020204030204" pitchFamily="34" charset="0"/>
-                <a:cs typeface="Times New Roman" panose="02020603050405020304" pitchFamily="18" charset="0"/>
-              </a:rPr>
-              <a:t>[dependent nominal variable] </a:t>
-            </a:r>
-            <a:r>
-              <a:rPr lang="en-IE" sz="2400" b="0" dirty="0">
-                <a:effectLst/>
-                <a:latin typeface="Calibri" panose="020F0502020204030204" pitchFamily="34" charset="0"/>
-                <a:ea typeface="Calibri" panose="020F0502020204030204" pitchFamily="34" charset="0"/>
-                <a:cs typeface="Times New Roman" panose="02020603050405020304" pitchFamily="18" charset="0"/>
-              </a:rPr>
-              <a:t>between </a:t>
-            </a:r>
-            <a:r>
-              <a:rPr lang="en-IE" sz="2400" b="0" dirty="0">
-                <a:solidFill>
-                  <a:srgbClr val="0070C0"/>
-                </a:solidFill>
-                <a:effectLst/>
-                <a:latin typeface="Calibri" panose="020F0502020204030204" pitchFamily="34" charset="0"/>
-                <a:ea typeface="Calibri" panose="020F0502020204030204" pitchFamily="34" charset="0"/>
-                <a:cs typeface="Times New Roman" panose="02020603050405020304" pitchFamily="18" charset="0"/>
-              </a:rPr>
-              <a:t>[independent nominal variable] </a:t>
-            </a:r>
-            <a:r>
-              <a:rPr lang="en-IE" sz="2400" b="0" dirty="0">
-                <a:effectLst/>
-                <a:latin typeface="Calibri" panose="020F0502020204030204" pitchFamily="34" charset="0"/>
-                <a:ea typeface="Calibri" panose="020F0502020204030204" pitchFamily="34" charset="0"/>
-                <a:cs typeface="Times New Roman" panose="02020603050405020304" pitchFamily="18" charset="0"/>
-              </a:rPr>
-              <a:t>and </a:t>
-            </a:r>
-            <a:r>
-              <a:rPr lang="en-IE" sz="2400" b="0" dirty="0">
-                <a:solidFill>
-                  <a:srgbClr val="0070C0"/>
-                </a:solidFill>
-                <a:effectLst/>
-                <a:latin typeface="Calibri" panose="020F0502020204030204" pitchFamily="34" charset="0"/>
-                <a:ea typeface="Calibri" panose="020F0502020204030204" pitchFamily="34" charset="0"/>
-                <a:cs typeface="Times New Roman" panose="02020603050405020304" pitchFamily="18" charset="0"/>
-              </a:rPr>
-              <a:t>[independent nominal variable]?”</a:t>
+              <a:t/>
             </a:r>
             <a:br>
               <a:rPr lang="en-GB" sz="2400" dirty="0">
@@ -6193,225 +6093,6 @@
                 <a:srgbClr val="FF0000"/>
               </a:solidFill>
             </a:endParaRPr>
-          </a:p>
-        </p:txBody>
-      </p:sp>
-      <p:sp>
-        <p:nvSpPr>
-          <p:cNvPr id="7" name="TextBox 6">
-            <a:extLst>
-              <a:ext uri="{FF2B5EF4-FFF2-40B4-BE49-F238E27FC236}">
-                <a16:creationId xmlns:a16="http://schemas.microsoft.com/office/drawing/2014/main" id="{F7FEA660-7B39-BC91-3B96-7298CCF66DE1}"/>
-              </a:ext>
-            </a:extLst>
-          </p:cNvPr>
-          <p:cNvSpPr txBox="1"/>
-          <p:nvPr/>
-        </p:nvSpPr>
-        <p:spPr>
-          <a:xfrm>
-            <a:off x="623945" y="5297755"/>
-            <a:ext cx="11440040" cy="1477328"/>
-          </a:xfrm>
-          <a:prstGeom prst="rect">
-            <a:avLst/>
-          </a:prstGeom>
-          <a:solidFill>
-            <a:schemeClr val="bg1">
-              <a:lumMod val="95000"/>
-            </a:schemeClr>
-          </a:solidFill>
-        </p:spPr>
-        <p:txBody>
-          <a:bodyPr wrap="square" lIns="91440" tIns="45720" rIns="91440" bIns="45720" rtlCol="0" anchor="t">
-            <a:spAutoFit/>
-          </a:bodyPr>
-          <a:lstStyle/>
-          <a:p>
-            <a:r>
-              <a:rPr lang="en-GB" baseline="30000" dirty="0"/>
-              <a:t>1</a:t>
-            </a:r>
-            <a:r>
-              <a:rPr lang="en-GB" b="1" dirty="0">
-                <a:latin typeface="Calibri"/>
-                <a:cs typeface="Calibri"/>
-              </a:rPr>
-              <a:t>Correlation</a:t>
-            </a:r>
-            <a:r>
-              <a:rPr lang="en-GB" dirty="0"/>
-              <a:t> (</a:t>
-            </a:r>
-            <a:r>
-              <a:rPr lang="en-IE" sz="1800" dirty="0">
-                <a:effectLst/>
-                <a:latin typeface="Calibri"/>
-                <a:ea typeface="Calibri" panose="020F0502020204030204" pitchFamily="34" charset="0"/>
-                <a:cs typeface="Times New Roman"/>
-              </a:rPr>
-              <a:t>Analysis of how </a:t>
-            </a:r>
-            <a:r>
-              <a:rPr lang="en-IE" sz="1800" dirty="0">
-                <a:solidFill>
-                  <a:srgbClr val="FF0000"/>
-                </a:solidFill>
-                <a:effectLst/>
-                <a:latin typeface="Calibri"/>
-                <a:ea typeface="Calibri" panose="020F0502020204030204" pitchFamily="34" charset="0"/>
-                <a:cs typeface="Times New Roman"/>
-              </a:rPr>
-              <a:t>ordinal</a:t>
-            </a:r>
-            <a:r>
-              <a:rPr lang="en-IE" dirty="0">
-                <a:solidFill>
-                  <a:srgbClr val="FF0000"/>
-                </a:solidFill>
-                <a:latin typeface="Calibri"/>
-                <a:ea typeface="Calibri" panose="020F0502020204030204" pitchFamily="34" charset="0"/>
-                <a:cs typeface="Times New Roman"/>
-              </a:rPr>
-              <a:t>/</a:t>
-            </a:r>
-            <a:r>
-              <a:rPr lang="en-IE" sz="1800" dirty="0">
-                <a:solidFill>
-                  <a:srgbClr val="FF0000"/>
-                </a:solidFill>
-                <a:effectLst/>
-                <a:latin typeface="Calibri"/>
-                <a:ea typeface="Calibri" panose="020F0502020204030204" pitchFamily="34" charset="0"/>
-                <a:cs typeface="Times New Roman"/>
-              </a:rPr>
-              <a:t>interval </a:t>
-            </a:r>
-            <a:r>
-              <a:rPr lang="en-IE" sz="1800" dirty="0">
-                <a:solidFill>
-                  <a:srgbClr val="00B050"/>
-                </a:solidFill>
-                <a:effectLst/>
-                <a:latin typeface="Calibri"/>
-                <a:ea typeface="Calibri" panose="020F0502020204030204" pitchFamily="34" charset="0"/>
-                <a:cs typeface="Times New Roman"/>
-              </a:rPr>
-              <a:t>dependent var</a:t>
-            </a:r>
-            <a:r>
-              <a:rPr lang="en-IE" sz="1800" dirty="0">
-                <a:effectLst/>
-                <a:latin typeface="Calibri"/>
-                <a:ea typeface="Calibri" panose="020F0502020204030204" pitchFamily="34" charset="0"/>
-                <a:cs typeface="Times New Roman"/>
-              </a:rPr>
-              <a:t> </a:t>
-            </a:r>
-            <a:r>
-              <a:rPr lang="en-IE" dirty="0">
-                <a:latin typeface="Calibri"/>
-                <a:ea typeface="Calibri" panose="020F0502020204030204" pitchFamily="34" charset="0"/>
-                <a:cs typeface="Times New Roman"/>
-              </a:rPr>
-              <a:t>correlates </a:t>
-            </a:r>
-            <a:r>
-              <a:rPr lang="en-IE" sz="1800" dirty="0">
-                <a:effectLst/>
-                <a:latin typeface="Calibri"/>
-                <a:ea typeface="Calibri" panose="020F0502020204030204" pitchFamily="34" charset="0"/>
-                <a:cs typeface="Times New Roman"/>
-              </a:rPr>
-              <a:t>to an </a:t>
-            </a:r>
-            <a:r>
-              <a:rPr lang="en-IE" sz="1800" dirty="0">
-                <a:solidFill>
-                  <a:srgbClr val="FF0000"/>
-                </a:solidFill>
-                <a:effectLst/>
-                <a:latin typeface="Calibri"/>
-                <a:ea typeface="Calibri" panose="020F0502020204030204" pitchFamily="34" charset="0"/>
-                <a:cs typeface="Times New Roman"/>
-              </a:rPr>
-              <a:t>ordinal/interval </a:t>
-            </a:r>
-            <a:r>
-              <a:rPr lang="en-IE" sz="1800" dirty="0">
-                <a:solidFill>
-                  <a:srgbClr val="00B050"/>
-                </a:solidFill>
-                <a:effectLst/>
-                <a:latin typeface="Calibri"/>
-                <a:ea typeface="Calibri" panose="020F0502020204030204" pitchFamily="34" charset="0"/>
-                <a:cs typeface="Times New Roman"/>
-              </a:rPr>
-              <a:t>independent variable)</a:t>
-            </a:r>
-            <a:endParaRPr lang="en-GB" dirty="0">
-              <a:latin typeface="Calibri"/>
-              <a:cs typeface="Times New Roman"/>
-            </a:endParaRPr>
-          </a:p>
-          <a:p>
-            <a:r>
-              <a:rPr lang="en-IE" sz="1800" b="1" baseline="30000" dirty="0">
-                <a:effectLst/>
-                <a:latin typeface="Calibri" panose="020F0502020204030204" pitchFamily="34" charset="0"/>
-                <a:ea typeface="Calibri" panose="020F0502020204030204" pitchFamily="34" charset="0"/>
-                <a:cs typeface="Times New Roman" panose="02020603050405020304" pitchFamily="18" charset="0"/>
-              </a:rPr>
-              <a:t>2</a:t>
-            </a:r>
-            <a:r>
-              <a:rPr lang="en-IE" sz="1800" b="1" dirty="0">
-                <a:effectLst/>
-                <a:latin typeface="Calibri" panose="020F0502020204030204" pitchFamily="34" charset="0"/>
-                <a:ea typeface="Calibri" panose="020F0502020204030204" pitchFamily="34" charset="0"/>
-                <a:cs typeface="Times New Roman" panose="02020603050405020304" pitchFamily="18" charset="0"/>
-              </a:rPr>
-              <a:t>Comparison of means</a:t>
-            </a:r>
-            <a:r>
-              <a:rPr lang="en-IE" sz="1800" dirty="0">
-                <a:effectLst/>
-                <a:latin typeface="Calibri" panose="020F0502020204030204" pitchFamily="34" charset="0"/>
-                <a:ea typeface="Calibri" panose="020F0502020204030204" pitchFamily="34" charset="0"/>
-                <a:cs typeface="Times New Roman" panose="02020603050405020304" pitchFamily="18" charset="0"/>
-              </a:rPr>
-              <a:t> (or medians): Analysis of the difference between the mean (or median) value of a characteristic shared by members of two different populations.</a:t>
-            </a:r>
-          </a:p>
-          <a:p>
-            <a:r>
-              <a:rPr lang="en-IE" sz="1800" b="1" baseline="30000" dirty="0">
-                <a:effectLst/>
-                <a:latin typeface="Calibri" panose="020F0502020204030204" pitchFamily="34" charset="0"/>
-                <a:ea typeface="Calibri" panose="020F0502020204030204" pitchFamily="34" charset="0"/>
-                <a:cs typeface="Times New Roman" panose="02020603050405020304" pitchFamily="18" charset="0"/>
-              </a:rPr>
-              <a:t>3</a:t>
-            </a:r>
-            <a:r>
-              <a:rPr lang="en-IE" sz="1800" b="1" dirty="0">
-                <a:effectLst/>
-                <a:latin typeface="Calibri" panose="020F0502020204030204" pitchFamily="34" charset="0"/>
-                <a:ea typeface="Calibri" panose="020F0502020204030204" pitchFamily="34" charset="0"/>
-                <a:cs typeface="Times New Roman" panose="02020603050405020304" pitchFamily="18" charset="0"/>
-              </a:rPr>
-              <a:t>Comparison of proportions:</a:t>
-            </a:r>
-            <a:r>
-              <a:rPr lang="en-IE" sz="1800" dirty="0">
-                <a:effectLst/>
-                <a:latin typeface="Calibri" panose="020F0502020204030204" pitchFamily="34" charset="0"/>
-                <a:ea typeface="Calibri" panose="020F0502020204030204" pitchFamily="34" charset="0"/>
-                <a:cs typeface="Times New Roman" panose="02020603050405020304" pitchFamily="18" charset="0"/>
-              </a:rPr>
-              <a:t> Analysis of the difference in proportions of a characteristic shared by members of two different populations. </a:t>
-            </a:r>
-            <a:endParaRPr lang="en-GB" dirty="0"/>
           </a:p>
         </p:txBody>
       </p:sp>
@@ -6425,6 +6106,13 @@
   <p:clrMapOvr>
     <a:masterClrMapping/>
   </p:clrMapOvr>
+  <p:timing>
+    <p:tnLst>
+      <p:par>
+        <p:cTn id="1" dur="indefinite" restart="never" nodeType="tmRoot"/>
+      </p:par>
+    </p:tnLst>
+  </p:timing>
 </p:sld>
 </file>
 
@@ -6450,7 +6138,7 @@
           <p:cNvPr id="2" name="Subtitle 1">
             <a:extLst>
               <a:ext uri="{FF2B5EF4-FFF2-40B4-BE49-F238E27FC236}">
-                <a16:creationId xmlns:a16="http://schemas.microsoft.com/office/drawing/2014/main" id="{6B64221B-D6D4-E382-A91A-99FF908D5475}"/>
+                <a16:creationId xmlns:a16="http://schemas.microsoft.com/office/drawing/2014/main" xmlns="" id="{6B64221B-D6D4-E382-A91A-99FF908D5475}"/>
               </a:ext>
             </a:extLst>
           </p:cNvPr>
@@ -6463,7 +6151,7 @@
         </p:nvSpPr>
         <p:spPr>
           <a:xfrm>
-            <a:off x="521219" y="284375"/>
+            <a:off x="862962" y="1799410"/>
             <a:ext cx="10406581" cy="1391600"/>
           </a:xfrm>
         </p:spPr>
@@ -6472,62 +6160,6 @@
             <a:noAutofit/>
           </a:bodyPr>
           <a:lstStyle/>
-          <a:p>
-            <a:pPr>
-              <a:lnSpc>
-                <a:spcPct val="100000"/>
-              </a:lnSpc>
-            </a:pPr>
-            <a:r>
-              <a:rPr lang="en-GB" sz="2400" b="0" dirty="0">
-                <a:latin typeface="Calibri"/>
-                <a:cs typeface="Calibri"/>
-              </a:rPr>
-              <a:t>Add your </a:t>
-            </a:r>
-            <a:r>
-              <a:rPr lang="en-GB" sz="2400" dirty="0">
-                <a:latin typeface="Calibri"/>
-                <a:cs typeface="Calibri"/>
-              </a:rPr>
-              <a:t>Hypotheses</a:t>
-            </a:r>
-            <a:r>
-              <a:rPr lang="en-GB" sz="2400" b="0" dirty="0">
-                <a:latin typeface="Calibri"/>
-                <a:cs typeface="Calibri"/>
-              </a:rPr>
-              <a:t> to the previous RQ Slide  (both the Null and Alternative Hypotheses).  Here are definitions and examples. </a:t>
-            </a:r>
-            <a:r>
-              <a:rPr lang="en-GB" sz="2400" dirty="0">
-                <a:latin typeface="Calibri"/>
-                <a:cs typeface="Calibri"/>
-              </a:rPr>
-              <a:t>Your wording will come directly from your RQ</a:t>
-            </a:r>
-            <a:r>
-              <a:rPr lang="en-GB" sz="2400" b="0" dirty="0">
-                <a:latin typeface="Calibri"/>
-                <a:cs typeface="Calibri"/>
-              </a:rPr>
-              <a:t>. This is the formal way of reporting the results of your inferential test statistics,  in which we report the </a:t>
-            </a:r>
-            <a:r>
-              <a:rPr lang="en-GB" sz="2400" b="0" i="1" dirty="0">
-                <a:latin typeface="Calibri"/>
-                <a:cs typeface="Calibri"/>
-              </a:rPr>
-              <a:t>effect</a:t>
-            </a:r>
-            <a:r>
-              <a:rPr lang="en-GB" sz="2400" b="0" dirty="0">
-                <a:latin typeface="Calibri"/>
-                <a:cs typeface="Calibri"/>
-              </a:rPr>
-              <a:t> the independent variable has on the dependent variable – </a:t>
-            </a:r>
-          </a:p>
           <a:p>
             <a:pPr marL="457200" indent="-457200">
               <a:lnSpc>
@@ -6536,11 +6168,18 @@
               <a:buAutoNum type="arabicPeriod"/>
             </a:pPr>
             <a:r>
+              <a:rPr lang="en-GB" sz="2000" b="0" dirty="0" smtClean="0">
+                <a:latin typeface="Arial"/>
+                <a:cs typeface="Arial"/>
+              </a:rPr>
+              <a:t>Null </a:t>
+            </a:r>
+            <a:r>
               <a:rPr lang="en-GB" sz="2000" b="0" dirty="0">
                 <a:latin typeface="Arial"/>
                 <a:cs typeface="Arial"/>
               </a:rPr>
-              <a:t>Null hypothesis (H</a:t>
+              <a:t>hypothesis (H</a:t>
             </a:r>
             <a:r>
               <a:rPr lang="en-GB" sz="2000" b="0" baseline="-25000" dirty="0">
@@ -6578,65 +6217,158 @@
               </a:lnSpc>
             </a:pPr>
             <a:r>
-              <a:rPr lang="en-GB" sz="2000" b="0" dirty="0">
+              <a:rPr lang="en-GB" sz="2000" b="0" dirty="0" smtClean="0">
                 <a:solidFill>
-                  <a:srgbClr val="FF0000"/>
+                  <a:schemeClr val="accent2">
+                    <a:lumMod val="60000"/>
+                    <a:lumOff val="40000"/>
+                  </a:schemeClr>
                 </a:solidFill>
                 <a:latin typeface="Arial"/>
                 <a:cs typeface="Arial"/>
               </a:rPr>
-              <a:t>Null hypothesis (H</a:t>
-            </a:r>
-            <a:r>
-              <a:rPr lang="en-GB" sz="2000" b="0" baseline="-25000" dirty="0">
+              <a:t>Null </a:t>
+            </a:r>
+            <a:r>
+              <a:rPr lang="en-GB" sz="2000" b="0" dirty="0">
                 <a:solidFill>
-                  <a:srgbClr val="FF0000"/>
+                  <a:schemeClr val="accent2">
+                    <a:lumMod val="60000"/>
+                    <a:lumOff val="40000"/>
+                  </a:schemeClr>
                 </a:solidFill>
                 <a:latin typeface="Arial"/>
                 <a:cs typeface="Arial"/>
               </a:rPr>
-              <a:t>0</a:t>
-            </a:r>
-            <a:r>
-              <a:rPr lang="en-GB" sz="2000" b="0" dirty="0">
+              <a:t>hypothesis (H</a:t>
+            </a:r>
+            <a:r>
+              <a:rPr lang="en-GB" sz="2000" b="0" baseline="-25000" dirty="0">
                 <a:solidFill>
-                  <a:srgbClr val="FF0000"/>
+                  <a:schemeClr val="accent2">
+                    <a:lumMod val="60000"/>
+                    <a:lumOff val="40000"/>
+                  </a:schemeClr>
                 </a:solidFill>
                 <a:latin typeface="Arial"/>
                 <a:cs typeface="Arial"/>
               </a:rPr>
-              <a:t>): There is </a:t>
-            </a:r>
-            <a:r>
-              <a:rPr lang="en-GB" sz="2000" dirty="0">
+              <a:t>0</a:t>
+            </a:r>
+            <a:r>
+              <a:rPr lang="en-GB" sz="2000" b="0" dirty="0">
                 <a:solidFill>
-                  <a:srgbClr val="FF0000"/>
+                  <a:schemeClr val="accent2">
+                    <a:lumMod val="60000"/>
+                    <a:lumOff val="40000"/>
+                  </a:schemeClr>
                 </a:solidFill>
                 <a:latin typeface="Arial"/>
                 <a:cs typeface="Arial"/>
               </a:rPr>
-              <a:t>no</a:t>
-            </a:r>
-            <a:r>
-              <a:rPr lang="en-GB" sz="2000" b="0" dirty="0">
+              <a:t>): There is </a:t>
+            </a:r>
+            <a:r>
+              <a:rPr lang="en-GB" sz="2000" dirty="0">
                 <a:solidFill>
-                  <a:srgbClr val="FF0000"/>
+                  <a:schemeClr val="accent2">
+                    <a:lumMod val="60000"/>
+                    <a:lumOff val="40000"/>
+                  </a:schemeClr>
                 </a:solidFill>
                 <a:latin typeface="Arial"/>
                 <a:cs typeface="Arial"/>
               </a:rPr>
-              <a:t> difference in the mean/median of the [dependent variable] between/among [subsets of the independent variable].              </a:t>
+              <a:t>no</a:t>
             </a:r>
             <a:r>
               <a:rPr lang="en-GB" sz="2000" b="0" dirty="0">
                 <a:solidFill>
-                  <a:schemeClr val="tx1"/>
+                  <a:schemeClr val="accent2">
+                    <a:lumMod val="60000"/>
+                    <a:lumOff val="40000"/>
+                  </a:schemeClr>
                 </a:solidFill>
                 <a:latin typeface="Arial"/>
                 <a:cs typeface="Arial"/>
               </a:rPr>
-              <a:t>or</a:t>
-            </a:r>
+              <a:t> correlation between </a:t>
+            </a:r>
+            <a:r>
+              <a:rPr lang="en-US" sz="2000" b="0" dirty="0" smtClean="0">
+                <a:solidFill>
+                  <a:schemeClr val="accent2">
+                    <a:lumMod val="60000"/>
+                    <a:lumOff val="40000"/>
+                  </a:schemeClr>
+                </a:solidFill>
+                <a:latin typeface="Calibri"/>
+                <a:cs typeface="Calibri"/>
+              </a:rPr>
+              <a:t>VOLUME</a:t>
+            </a:r>
+            <a:r>
+              <a:rPr lang="en-GB" sz="2000" b="0" dirty="0" smtClean="0">
+                <a:solidFill>
+                  <a:schemeClr val="accent2">
+                    <a:lumMod val="60000"/>
+                    <a:lumOff val="40000"/>
+                  </a:schemeClr>
+                </a:solidFill>
+                <a:latin typeface="Arial"/>
+                <a:cs typeface="Arial"/>
+              </a:rPr>
+              <a:t> </a:t>
+            </a:r>
+            <a:r>
+              <a:rPr lang="en-GB" sz="2000" b="0" dirty="0" smtClean="0">
+                <a:solidFill>
+                  <a:schemeClr val="accent2">
+                    <a:lumMod val="60000"/>
+                    <a:lumOff val="40000"/>
+                  </a:schemeClr>
+                </a:solidFill>
+                <a:latin typeface="Arial"/>
+                <a:cs typeface="Arial"/>
+              </a:rPr>
+              <a:t>and </a:t>
+            </a:r>
+            <a:r>
+              <a:rPr lang="en-US" sz="2000" b="0" dirty="0" smtClean="0">
+                <a:solidFill>
+                  <a:schemeClr val="accent2">
+                    <a:lumMod val="60000"/>
+                    <a:lumOff val="40000"/>
+                  </a:schemeClr>
+                </a:solidFill>
+                <a:latin typeface="Calibri"/>
+                <a:cs typeface="Calibri"/>
+              </a:rPr>
+              <a:t>INTERVAL</a:t>
+            </a:r>
+            <a:r>
+              <a:rPr lang="en-GB" sz="2000" b="0" dirty="0" smtClean="0">
+                <a:solidFill>
+                  <a:schemeClr val="accent2">
+                    <a:lumMod val="60000"/>
+                    <a:lumOff val="40000"/>
+                  </a:schemeClr>
+                </a:solidFill>
+                <a:latin typeface="Arial"/>
+                <a:cs typeface="Arial"/>
+              </a:rPr>
+              <a:t>.</a:t>
+            </a:r>
+            <a:endParaRPr lang="en-GB" sz="2000" b="0" dirty="0">
+              <a:solidFill>
+                <a:schemeClr val="accent2">
+                  <a:lumMod val="60000"/>
+                  <a:lumOff val="40000"/>
+                </a:schemeClr>
+              </a:solidFill>
+              <a:latin typeface="Arial"/>
+              <a:cs typeface="Arial"/>
+            </a:endParaRPr>
           </a:p>
           <a:p>
             <a:pPr>
@@ -6646,63 +6378,52 @@
             </a:pPr>
             <a:r>
               <a:rPr lang="en-GB" sz="2000" b="0" dirty="0">
-                <a:solidFill>
-                  <a:srgbClr val="FF0000"/>
-                </a:solidFill>
                 <a:latin typeface="Arial"/>
                 <a:cs typeface="Arial"/>
               </a:rPr>
-              <a:t>Null hypothesis (H</a:t>
+              <a:t>2. Alternative hypothesis (H</a:t>
             </a:r>
             <a:r>
               <a:rPr lang="en-GB" sz="2000" b="0" baseline="-25000" dirty="0">
-                <a:solidFill>
-                  <a:srgbClr val="FF0000"/>
-                </a:solidFill>
                 <a:latin typeface="Arial"/>
                 <a:cs typeface="Arial"/>
               </a:rPr>
-              <a:t>0</a:t>
+              <a:t>1</a:t>
             </a:r>
             <a:r>
               <a:rPr lang="en-GB" sz="2000" b="0" dirty="0">
-                <a:solidFill>
-                  <a:srgbClr val="FF0000"/>
-                </a:solidFill>
                 <a:latin typeface="Arial"/>
                 <a:cs typeface="Arial"/>
               </a:rPr>
-              <a:t>):  There is </a:t>
-            </a:r>
-            <a:r>
-              <a:rPr lang="en-GB" sz="2000" dirty="0">
-                <a:solidFill>
-                  <a:srgbClr val="FF0000"/>
-                </a:solidFill>
+              <a:t>):  There appears to be an effect on the population – so you </a:t>
+            </a:r>
+            <a:r>
+              <a:rPr lang="en-GB" sz="2000" b="0" dirty="0" smtClean="0">
                 <a:latin typeface="Arial"/>
                 <a:cs typeface="Arial"/>
               </a:rPr>
-              <a:t>no</a:t>
+              <a:t>copy </a:t>
             </a:r>
             <a:r>
               <a:rPr lang="en-GB" sz="2000" b="0" dirty="0">
-                <a:solidFill>
-                  <a:srgbClr val="FF0000"/>
-                </a:solidFill>
                 <a:latin typeface="Arial"/>
                 <a:cs typeface="Arial"/>
               </a:rPr>
-              <a:t> difference in the proportions(s)of [subset(s) of dependent variable] between/among [subsets of independent variable].                     </a:t>
-            </a:r>
-            <a:r>
-              <a:rPr lang="en-GB" sz="2000" b="0" dirty="0">
-                <a:solidFill>
-                  <a:schemeClr val="tx1"/>
-                </a:solidFill>
+              <a:t>what you wrote for the Null hypothesis but remove the ‘no’ and replace with ‘</a:t>
+            </a:r>
+            <a:r>
+              <a:rPr lang="en-GB" sz="2000" dirty="0">
                 <a:latin typeface="Arial"/>
                 <a:cs typeface="Arial"/>
               </a:rPr>
-              <a:t>or</a:t>
+              <a:t>a’  </a:t>
+            </a:r>
+            <a:r>
+              <a:rPr lang="en-GB" sz="2000" b="0" dirty="0">
+                <a:latin typeface="Arial"/>
+                <a:cs typeface="Arial"/>
+              </a:rPr>
+              <a:t>For example:</a:t>
             </a:r>
           </a:p>
           <a:p>
@@ -6714,27 +6435,36 @@
             <a:r>
               <a:rPr lang="en-GB" sz="2000" b="0" dirty="0">
                 <a:solidFill>
-                  <a:srgbClr val="FF0000"/>
+                  <a:schemeClr val="accent2">
+                    <a:lumMod val="60000"/>
+                    <a:lumOff val="40000"/>
+                  </a:schemeClr>
                 </a:solidFill>
                 <a:latin typeface="Arial"/>
                 <a:cs typeface="Arial"/>
               </a:rPr>
-              <a:t>Null hypothesis (H</a:t>
+              <a:t>Alt hypothesis (H</a:t>
             </a:r>
             <a:r>
               <a:rPr lang="en-GB" sz="2000" b="0" baseline="-25000" dirty="0">
                 <a:solidFill>
-                  <a:srgbClr val="FF0000"/>
+                  <a:schemeClr val="accent2">
+                    <a:lumMod val="60000"/>
+                    <a:lumOff val="40000"/>
+                  </a:schemeClr>
                 </a:solidFill>
                 <a:latin typeface="Arial"/>
                 <a:cs typeface="Arial"/>
               </a:rPr>
-              <a:t>0</a:t>
+              <a:t>1</a:t>
             </a:r>
             <a:r>
               <a:rPr lang="en-GB" sz="2000" b="0" dirty="0">
                 <a:solidFill>
-                  <a:srgbClr val="FF0000"/>
+                  <a:schemeClr val="accent2">
+                    <a:lumMod val="60000"/>
+                    <a:lumOff val="40000"/>
+                  </a:schemeClr>
                 </a:solidFill>
                 <a:latin typeface="Arial"/>
                 <a:cs typeface="Arial"/>
@@ -6744,122 +6474,91 @@
             <a:r>
               <a:rPr lang="en-GB" sz="2000" dirty="0">
                 <a:solidFill>
-                  <a:srgbClr val="FF0000"/>
+                  <a:schemeClr val="accent2">
+                    <a:lumMod val="60000"/>
+                    <a:lumOff val="40000"/>
+                  </a:schemeClr>
                 </a:solidFill>
                 <a:latin typeface="Arial"/>
                 <a:cs typeface="Arial"/>
               </a:rPr>
-              <a:t>no</a:t>
+              <a:t>a</a:t>
             </a:r>
             <a:r>
               <a:rPr lang="en-GB" sz="2000" b="0" dirty="0">
                 <a:solidFill>
-                  <a:srgbClr val="FF0000"/>
+                  <a:schemeClr val="accent2">
+                    <a:lumMod val="60000"/>
+                    <a:lumOff val="40000"/>
+                  </a:schemeClr>
                 </a:solidFill>
                 <a:latin typeface="Arial"/>
                 <a:cs typeface="Arial"/>
               </a:rPr>
-              <a:t> correlation between [dependent variable] and [independent variable].</a:t>
-            </a:r>
-          </a:p>
-          <a:p>
-            <a:pPr>
-              <a:lnSpc>
-                <a:spcPct val="100000"/>
-              </a:lnSpc>
-            </a:pPr>
-            <a:r>
-              <a:rPr lang="en-GB" sz="2000" b="0" dirty="0">
-                <a:latin typeface="Arial"/>
-                <a:cs typeface="Arial"/>
-              </a:rPr>
-              <a:t>2. Alternative hypothesis (H</a:t>
-            </a:r>
-            <a:r>
-              <a:rPr lang="en-GB" sz="2000" b="0" baseline="-25000" dirty="0">
-                <a:latin typeface="Arial"/>
-                <a:cs typeface="Arial"/>
-              </a:rPr>
-              <a:t>1</a:t>
-            </a:r>
-            <a:r>
-              <a:rPr lang="en-GB" sz="2000" b="0" dirty="0">
-                <a:latin typeface="Arial"/>
-                <a:cs typeface="Arial"/>
-              </a:rPr>
-              <a:t>):  There appears to be an effect on the population – so you copy what you wrote for the Null hypothesis but remove the ‘no’ and replace with ‘</a:t>
-            </a:r>
-            <a:r>
-              <a:rPr lang="en-GB" sz="2000" dirty="0">
-                <a:latin typeface="Arial"/>
-                <a:cs typeface="Arial"/>
-              </a:rPr>
-              <a:t>a’  </a:t>
-            </a:r>
-            <a:r>
-              <a:rPr lang="en-GB" sz="2000" b="0" dirty="0">
-                <a:latin typeface="Arial"/>
-                <a:cs typeface="Arial"/>
-              </a:rPr>
-              <a:t>For example:</a:t>
-            </a:r>
-          </a:p>
-          <a:p>
-            <a:pPr>
-              <a:lnSpc>
-                <a:spcPct val="100000"/>
-              </a:lnSpc>
-            </a:pPr>
+              <a:t> correlation between </a:t>
+            </a:r>
             <a:r>
               <a:rPr lang="en-GB" sz="2000" b="0" dirty="0">
                 <a:solidFill>
-                  <a:srgbClr val="FF0000"/>
+                  <a:schemeClr val="accent2">
+                    <a:lumMod val="60000"/>
+                    <a:lumOff val="40000"/>
+                  </a:schemeClr>
+                </a:solidFill>
+                <a:latin typeface="Calibri"/>
+                <a:cs typeface="Calibri"/>
+              </a:rPr>
+              <a:t>VOLUME</a:t>
+            </a:r>
+            <a:r>
+              <a:rPr lang="en-GB" sz="2000" b="0" dirty="0" smtClean="0">
+                <a:solidFill>
+                  <a:schemeClr val="accent2">
+                    <a:lumMod val="60000"/>
+                    <a:lumOff val="40000"/>
+                  </a:schemeClr>
                 </a:solidFill>
                 <a:latin typeface="Arial"/>
                 <a:cs typeface="Arial"/>
               </a:rPr>
-              <a:t>Alt hypothesis (H</a:t>
-            </a:r>
-            <a:r>
-              <a:rPr lang="en-GB" sz="2000" b="0" baseline="-25000" dirty="0">
+              <a:t> and </a:t>
+            </a:r>
+            <a:r>
+              <a:rPr lang="en-US" sz="2000" b="0" dirty="0" smtClean="0">
                 <a:solidFill>
-                  <a:srgbClr val="FF0000"/>
+                  <a:schemeClr val="accent2">
+                    <a:lumMod val="60000"/>
+                    <a:lumOff val="40000"/>
+                  </a:schemeClr>
+                </a:solidFill>
+                <a:latin typeface="Calibri"/>
+                <a:cs typeface="Calibri"/>
+              </a:rPr>
+              <a:t>INTERVAL</a:t>
+            </a:r>
+            <a:r>
+              <a:rPr lang="en-GB" sz="2000" b="0" dirty="0" smtClean="0">
+                <a:solidFill>
+                  <a:schemeClr val="accent2">
+                    <a:lumMod val="60000"/>
+                    <a:lumOff val="40000"/>
+                  </a:schemeClr>
                 </a:solidFill>
                 <a:latin typeface="Arial"/>
                 <a:cs typeface="Arial"/>
               </a:rPr>
-              <a:t>1</a:t>
-            </a:r>
-            <a:r>
-              <a:rPr lang="en-GB" sz="2000" b="0" dirty="0">
-                <a:solidFill>
-                  <a:srgbClr val="FF0000"/>
-                </a:solidFill>
-                <a:latin typeface="Arial"/>
-                <a:cs typeface="Arial"/>
-              </a:rPr>
-              <a:t>): There is </a:t>
-            </a:r>
-            <a:r>
-              <a:rPr lang="en-GB" sz="2000" dirty="0">
-                <a:solidFill>
-                  <a:srgbClr val="FF0000"/>
-                </a:solidFill>
-                <a:latin typeface="Arial"/>
-                <a:cs typeface="Arial"/>
-              </a:rPr>
-              <a:t>a</a:t>
-            </a:r>
-            <a:r>
-              <a:rPr lang="en-GB" sz="2000" b="0" dirty="0">
-                <a:solidFill>
-                  <a:srgbClr val="FF0000"/>
-                </a:solidFill>
-                <a:latin typeface="Arial"/>
-                <a:cs typeface="Arial"/>
-              </a:rPr>
-              <a:t> correlation between [dependent variable] and [independent variable].</a:t>
-            </a:r>
+              <a:t>.</a:t>
+            </a:r>
+            <a:endParaRPr lang="en-GB" sz="2000" b="0" dirty="0">
+              <a:solidFill>
+                <a:schemeClr val="accent2">
+                  <a:lumMod val="60000"/>
+                  <a:lumOff val="40000"/>
+                </a:schemeClr>
+              </a:solidFill>
+              <a:latin typeface="Arial"/>
+              <a:cs typeface="Arial"/>
+            </a:endParaRPr>
           </a:p>
         </p:txBody>
       </p:sp>
@@ -6868,7 +6567,7 @@
           <p:cNvPr id="4" name="Slide Number Placeholder 3">
             <a:extLst>
               <a:ext uri="{FF2B5EF4-FFF2-40B4-BE49-F238E27FC236}">
-                <a16:creationId xmlns:a16="http://schemas.microsoft.com/office/drawing/2014/main" id="{FF7EDF94-2B89-A21D-BBC0-E455C2D9893B}"/>
+                <a16:creationId xmlns:a16="http://schemas.microsoft.com/office/drawing/2014/main" xmlns="" id="{FF7EDF94-2B89-A21D-BBC0-E455C2D9893B}"/>
               </a:ext>
             </a:extLst>
           </p:cNvPr>
@@ -6894,92 +6593,6 @@
               <a:t>4</a:t>
             </a:r>
             <a:endParaRPr lang="en-GB" dirty="0"/>
-          </a:p>
-        </p:txBody>
-      </p:sp>
-      <p:sp>
-        <p:nvSpPr>
-          <p:cNvPr id="6" name="TextBox 5">
-            <a:extLst>
-              <a:ext uri="{FF2B5EF4-FFF2-40B4-BE49-F238E27FC236}">
-                <a16:creationId xmlns:a16="http://schemas.microsoft.com/office/drawing/2014/main" id="{1841CE34-1B2E-88D5-0C3F-506E8C37BB7B}"/>
-              </a:ext>
-            </a:extLst>
-          </p:cNvPr>
-          <p:cNvSpPr txBox="1"/>
-          <p:nvPr/>
-        </p:nvSpPr>
-        <p:spPr>
-          <a:xfrm>
-            <a:off x="3356146" y="5298491"/>
-            <a:ext cx="7811780" cy="1477328"/>
-          </a:xfrm>
-          <a:prstGeom prst="rect">
-            <a:avLst/>
-          </a:prstGeom>
-          <a:noFill/>
-        </p:spPr>
-        <p:txBody>
-          <a:bodyPr wrap="square" lIns="91440" tIns="45720" rIns="91440" bIns="45720" anchor="t">
-            <a:spAutoFit/>
-          </a:bodyPr>
-          <a:lstStyle/>
-          <a:p>
-            <a:r>
-              <a:rPr lang="en-GB" dirty="0"/>
-              <a:t>L</a:t>
-            </a:r>
-            <a:r>
-              <a:rPr lang="en-GB" sz="1800" b="0" dirty="0"/>
-              <a:t>eave the hypotheses as </a:t>
-            </a:r>
-            <a:r>
-              <a:rPr lang="en-GB" dirty="0"/>
-              <a:t>two </a:t>
-            </a:r>
-            <a:r>
-              <a:rPr lang="en-GB" sz="1800" b="0" dirty="0"/>
-              <a:t>statements for now – after your </a:t>
-            </a:r>
-            <a:r>
-              <a:rPr lang="en-GB" dirty="0"/>
-              <a:t>statistical </a:t>
-            </a:r>
-            <a:r>
-              <a:rPr lang="en-GB" sz="1800" b="0" dirty="0"/>
-              <a:t>analysis </a:t>
-            </a:r>
-            <a:r>
-              <a:rPr lang="en-GB" dirty="0"/>
-              <a:t>test, </a:t>
-            </a:r>
-            <a:r>
-              <a:rPr lang="en-GB" sz="1800" b="0" dirty="0"/>
-              <a:t>you </a:t>
-            </a:r>
-            <a:r>
-              <a:rPr lang="en-GB" dirty="0"/>
-              <a:t>will </a:t>
-            </a:r>
-            <a:r>
-              <a:rPr lang="en-GB" sz="1800" b="0" dirty="0"/>
-              <a:t>choose one or the other.</a:t>
-            </a:r>
-            <a:r>
-              <a:rPr lang="en-GB" dirty="0"/>
-              <a:t> (</a:t>
-            </a:r>
-            <a:r>
-              <a:rPr lang="en-GB" i="1" dirty="0"/>
-              <a:t>You will report: "We fail to reject the null hypothesis" with no significant result, or if you do have significance [p-value = &lt; 0.05] you can state "We reject the null hypothesis".   More guidance on hypothesis testing is given in the lectures</a:t>
-            </a:r>
-            <a:r>
-              <a:rPr lang="en-GB" dirty="0"/>
-              <a:t>.)</a:t>
-            </a:r>
-            <a:endParaRPr lang="en-GB" dirty="0">
-              <a:cs typeface="Arial"/>
-            </a:endParaRPr>
           </a:p>
         </p:txBody>
       </p:sp>
@@ -6993,6 +6606,13 @@
   <p:clrMapOvr>
     <a:masterClrMapping/>
   </p:clrMapOvr>
+  <p:timing>
+    <p:tnLst>
+      <p:par>
+        <p:cTn id="1" dur="indefinite" restart="never" nodeType="tmRoot"/>
+      </p:par>
+    </p:tnLst>
+  </p:timing>
 </p:sld>
 </file>
 
@@ -7848,23 +7468,6 @@
 </file>
 
 <file path=customXml/item1.xml><?xml version="1.0" encoding="utf-8"?>
-<p:properties xmlns:p="http://schemas.microsoft.com/office/2006/metadata/properties" xmlns:xsi="http://www.w3.org/2001/XMLSchema-instance" xmlns:pc="http://schemas.microsoft.com/office/infopath/2007/PartnerControls">
-  <documentManagement>
-    <Information xmlns="4ad138b4-2b68-4b70-945d-07f8f18b1c9a" xsi:nil="true"/>
-  </documentManagement>
-</p:properties>
-</file>
-
-<file path=customXml/item2.xml><?xml version="1.0" encoding="utf-8"?>
-<?mso-contentType ?>
-<FormTemplates xmlns="http://schemas.microsoft.com/sharepoint/v3/contenttype/forms">
-  <Display>DocumentLibraryForm</Display>
-  <Edit>DocumentLibraryForm</Edit>
-  <New>DocumentLibraryForm</New>
-</FormTemplates>
-</file>
-
-<file path=customXml/item3.xml><?xml version="1.0" encoding="utf-8"?>
 <ct:contentTypeSchema xmlns:ct="http://schemas.microsoft.com/office/2006/metadata/contentType" xmlns:ma="http://schemas.microsoft.com/office/2006/metadata/properties/metaAttributes" ct:_="" ma:_="" ma:contentTypeName="Document" ma:contentTypeID="0x01010026DBA85F447B164191BB36C258697B67" ma:contentTypeVersion="14" ma:contentTypeDescription="Create a new document." ma:contentTypeScope="" ma:versionID="ea511d05ca7f895fe9556935b5c9af34">
   <xsd:schema xmlns:xsd="http://www.w3.org/2001/XMLSchema" xmlns:xs="http://www.w3.org/2001/XMLSchema" xmlns:p="http://schemas.microsoft.com/office/2006/metadata/properties" xmlns:ns2="4ad138b4-2b68-4b70-945d-07f8f18b1c9a" xmlns:ns3="3c474641-ec36-472f-b125-6b1b0910eaa4" targetNamespace="http://schemas.microsoft.com/office/2006/metadata/properties" ma:root="true" ma:fieldsID="662270106d7a7e100bcac2c5f8d29899" ns2:_="" ns3:_="">
     <xsd:import namespace="4ad138b4-2b68-4b70-945d-07f8f18b1c9a"/>
@@ -8089,32 +7692,24 @@
 </ct:contentTypeSchema>
 </file>
 
-<file path=customXml/itemProps1.xml><?xml version="1.0" encoding="utf-8"?>
-<ds:datastoreItem xmlns:ds="http://schemas.openxmlformats.org/officeDocument/2006/customXml" ds:itemID="{EDD1FC41-23C7-41B0-B5F9-BF4CD38AD2ED}">
-  <ds:schemaRefs>
-    <ds:schemaRef ds:uri="http://schemas.microsoft.com/office/infopath/2007/PartnerControls"/>
-    <ds:schemaRef ds:uri="3c474641-ec36-472f-b125-6b1b0910eaa4"/>
-    <ds:schemaRef ds:uri="http://purl.org/dc/terms/"/>
-    <ds:schemaRef ds:uri="http://schemas.microsoft.com/office/2006/documentManagement/types"/>
-    <ds:schemaRef ds:uri="http://www.w3.org/XML/1998/namespace"/>
-    <ds:schemaRef ds:uri="http://purl.org/dc/elements/1.1/"/>
-    <ds:schemaRef ds:uri="http://schemas.openxmlformats.org/package/2006/metadata/core-properties"/>
-    <ds:schemaRef ds:uri="4ad138b4-2b68-4b70-945d-07f8f18b1c9a"/>
-    <ds:schemaRef ds:uri="http://schemas.microsoft.com/office/2006/metadata/properties"/>
-    <ds:schemaRef ds:uri="http://purl.org/dc/dcmitype/"/>
-  </ds:schemaRefs>
-</ds:datastoreItem>
+<file path=customXml/item2.xml><?xml version="1.0" encoding="utf-8"?>
+<?mso-contentType ?>
+<FormTemplates xmlns="http://schemas.microsoft.com/sharepoint/v3/contenttype/forms">
+  <Display>DocumentLibraryForm</Display>
+  <Edit>DocumentLibraryForm</Edit>
+  <New>DocumentLibraryForm</New>
+</FormTemplates>
 </file>
 
-<file path=customXml/itemProps2.xml><?xml version="1.0" encoding="utf-8"?>
-<ds:datastoreItem xmlns:ds="http://schemas.openxmlformats.org/officeDocument/2006/customXml" ds:itemID="{91C521DD-2673-4EE6-BB9B-DC5C3320FFBB}">
-  <ds:schemaRefs>
-    <ds:schemaRef ds:uri="http://schemas.microsoft.com/sharepoint/v3/contenttype/forms"/>
-  </ds:schemaRefs>
-</ds:datastoreItem>
+<file path=customXml/item3.xml><?xml version="1.0" encoding="utf-8"?>
+<p:properties xmlns:p="http://schemas.microsoft.com/office/2006/metadata/properties" xmlns:xsi="http://www.w3.org/2001/XMLSchema-instance" xmlns:pc="http://schemas.microsoft.com/office/infopath/2007/PartnerControls">
+  <documentManagement>
+    <Information xmlns="4ad138b4-2b68-4b70-945d-07f8f18b1c9a" xsi:nil="true"/>
+  </documentManagement>
+</p:properties>
 </file>
 
-<file path=customXml/itemProps3.xml><?xml version="1.0" encoding="utf-8"?>
+<file path=customXml/itemProps1.xml><?xml version="1.0" encoding="utf-8"?>
 <ds:datastoreItem xmlns:ds="http://schemas.openxmlformats.org/officeDocument/2006/customXml" ds:itemID="{421B8C57-903D-4D0E-8336-7B512F760CD1}">
   <ds:schemaRefs>
     <ds:schemaRef ds:uri="http://schemas.microsoft.com/office/2006/metadata/contentType"/>
@@ -8131,4 +7726,29 @@
     <ds:schemaRef ds:uri="http://schemas.microsoft.com/internal/obd"/>
   </ds:schemaRefs>
 </ds:datastoreItem>
+</file>
+
+<file path=customXml/itemProps2.xml><?xml version="1.0" encoding="utf-8"?>
+<ds:datastoreItem xmlns:ds="http://schemas.openxmlformats.org/officeDocument/2006/customXml" ds:itemID="{91C521DD-2673-4EE6-BB9B-DC5C3320FFBB}">
+  <ds:schemaRefs>
+    <ds:schemaRef ds:uri="http://schemas.microsoft.com/sharepoint/v3/contenttype/forms"/>
+  </ds:schemaRefs>
+</ds:datastoreItem>
+</file>
+
+<file path=customXml/itemProps3.xml><?xml version="1.0" encoding="utf-8"?>
+<ds:datastoreItem xmlns:ds="http://schemas.openxmlformats.org/officeDocument/2006/customXml" ds:itemID="{EDD1FC41-23C7-41B0-B5F9-BF4CD38AD2ED}">
+  <ds:schemaRefs>
+    <ds:schemaRef ds:uri="http://schemas.microsoft.com/office/infopath/2007/PartnerControls"/>
+    <ds:schemaRef ds:uri="3c474641-ec36-472f-b125-6b1b0910eaa4"/>
+    <ds:schemaRef ds:uri="http://purl.org/dc/terms/"/>
+    <ds:schemaRef ds:uri="http://schemas.microsoft.com/office/2006/documentManagement/types"/>
+    <ds:schemaRef ds:uri="http://www.w3.org/XML/1998/namespace"/>
+    <ds:schemaRef ds:uri="http://purl.org/dc/elements/1.1/"/>
+    <ds:schemaRef ds:uri="http://schemas.openxmlformats.org/package/2006/metadata/core-properties"/>
+    <ds:schemaRef ds:uri="4ad138b4-2b68-4b70-945d-07f8f18b1c9a"/>
+    <ds:schemaRef ds:uri="http://schemas.microsoft.com/office/2006/metadata/properties"/>
+    <ds:schemaRef ds:uri="http://purl.org/dc/dcmitype/"/>
+  </ds:schemaRefs>
+</ds:datastoreItem>
 </file>
</xml_diff>

<commit_message>
Research Question PTT Changes - Abinaya
</commit_message>
<xml_diff>
--- a/reseach_question_presentation_template.pptx
+++ b/reseach_question_presentation_template.pptx
@@ -179,7 +179,7 @@
           <p:cNvPr id="2" name="Header Placeholder 1">
             <a:extLst>
               <a:ext uri="{FF2B5EF4-FFF2-40B4-BE49-F238E27FC236}">
-                <a16:creationId xmlns:a16="http://schemas.microsoft.com/office/drawing/2014/main" xmlns="" id="{898966F2-21A1-4B2B-ADA6-AD0BB447B7CB}"/>
+                <a16:creationId xmlns:a16="http://schemas.microsoft.com/office/drawing/2014/main" id="{898966F2-21A1-4B2B-ADA6-AD0BB447B7CB}"/>
               </a:ext>
             </a:extLst>
           </p:cNvPr>
@@ -216,7 +216,7 @@
           <p:cNvPr id="3" name="Date Placeholder 2">
             <a:extLst>
               <a:ext uri="{FF2B5EF4-FFF2-40B4-BE49-F238E27FC236}">
-                <a16:creationId xmlns:a16="http://schemas.microsoft.com/office/drawing/2014/main" xmlns="" id="{751468BB-CDF2-4507-B4EF-7B369D307A4D}"/>
+                <a16:creationId xmlns:a16="http://schemas.microsoft.com/office/drawing/2014/main" id="{751468BB-CDF2-4507-B4EF-7B369D307A4D}"/>
               </a:ext>
             </a:extLst>
           </p:cNvPr>
@@ -247,7 +247,7 @@
             <a:fld id="{93FAAC3A-BD1F-4A00-9099-74B95789FE00}" type="datetimeFigureOut">
               <a:rPr lang="en-GB" smtClean="0"/>
               <a:pPr/>
-              <a:t>10/11/2024</a:t>
+              <a:t>11/11/2024</a:t>
             </a:fld>
             <a:endParaRPr lang="en-GB"/>
           </a:p>
@@ -258,7 +258,7 @@
           <p:cNvPr id="4" name="Footer Placeholder 3">
             <a:extLst>
               <a:ext uri="{FF2B5EF4-FFF2-40B4-BE49-F238E27FC236}">
-                <a16:creationId xmlns:a16="http://schemas.microsoft.com/office/drawing/2014/main" xmlns="" id="{904BCF7D-6037-48D3-84E5-56B8B0552143}"/>
+                <a16:creationId xmlns:a16="http://schemas.microsoft.com/office/drawing/2014/main" id="{904BCF7D-6037-48D3-84E5-56B8B0552143}"/>
               </a:ext>
             </a:extLst>
           </p:cNvPr>
@@ -295,7 +295,7 @@
           <p:cNvPr id="5" name="Slide Number Placeholder 4">
             <a:extLst>
               <a:ext uri="{FF2B5EF4-FFF2-40B4-BE49-F238E27FC236}">
-                <a16:creationId xmlns:a16="http://schemas.microsoft.com/office/drawing/2014/main" xmlns="" id="{D619E732-656C-4BB5-ACCB-1568C5C66DD7}"/>
+                <a16:creationId xmlns:a16="http://schemas.microsoft.com/office/drawing/2014/main" id="{D619E732-656C-4BB5-ACCB-1568C5C66DD7}"/>
               </a:ext>
             </a:extLst>
           </p:cNvPr>
@@ -426,7 +426,7 @@
             <a:fld id="{8E359C8A-39F6-4045-9163-4042C4C26B15}" type="datetimeFigureOut">
               <a:rPr lang="en-GB" smtClean="0"/>
               <a:pPr/>
-              <a:t>10/11/2024</a:t>
+              <a:t>11/11/2024</a:t>
             </a:fld>
             <a:endParaRPr lang="en-GB"/>
           </a:p>
@@ -1006,7 +1006,7 @@
           <p:cNvPr id="4" name="Picture 3" descr="University of Hertfordshire logo">
             <a:extLst>
               <a:ext uri="{FF2B5EF4-FFF2-40B4-BE49-F238E27FC236}">
-                <a16:creationId xmlns:a16="http://schemas.microsoft.com/office/drawing/2014/main" xmlns="" id="{16E4BB13-0D32-AA4A-BF91-2B76A7C18242}"/>
+                <a16:creationId xmlns:a16="http://schemas.microsoft.com/office/drawing/2014/main" id="{16E4BB13-0D32-AA4A-BF91-2B76A7C18242}"/>
               </a:ext>
             </a:extLst>
           </p:cNvPr>
@@ -1080,7 +1080,7 @@
           <p:cNvPr id="3" name="Picture Placeholder 2">
             <a:extLst>
               <a:ext uri="{FF2B5EF4-FFF2-40B4-BE49-F238E27FC236}">
-                <a16:creationId xmlns:a16="http://schemas.microsoft.com/office/drawing/2014/main" xmlns="" id="{A307C322-846C-9045-AD91-A93C82FC5AAF}"/>
+                <a16:creationId xmlns:a16="http://schemas.microsoft.com/office/drawing/2014/main" id="{A307C322-846C-9045-AD91-A93C82FC5AAF}"/>
               </a:ext>
             </a:extLst>
           </p:cNvPr>
@@ -1159,7 +1159,7 @@
           <p:cNvPr id="9" name="Media Placeholder 8">
             <a:extLst>
               <a:ext uri="{FF2B5EF4-FFF2-40B4-BE49-F238E27FC236}">
-                <a16:creationId xmlns:a16="http://schemas.microsoft.com/office/drawing/2014/main" xmlns="" id="{9ABCF9A5-761F-434B-BBB5-D788CB1E79D8}"/>
+                <a16:creationId xmlns:a16="http://schemas.microsoft.com/office/drawing/2014/main" id="{9ABCF9A5-761F-434B-BBB5-D788CB1E79D8}"/>
               </a:ext>
             </a:extLst>
           </p:cNvPr>
@@ -1230,7 +1230,7 @@
           <p:cNvPr id="5" name="Footer Placeholder 4">
             <a:extLst>
               <a:ext uri="{FF2B5EF4-FFF2-40B4-BE49-F238E27FC236}">
-                <a16:creationId xmlns:a16="http://schemas.microsoft.com/office/drawing/2014/main" xmlns="" id="{962B6D5D-0892-4B4E-86D9-894852B1242C}"/>
+                <a16:creationId xmlns:a16="http://schemas.microsoft.com/office/drawing/2014/main" id="{962B6D5D-0892-4B4E-86D9-894852B1242C}"/>
               </a:ext>
             </a:extLst>
           </p:cNvPr>
@@ -1258,7 +1258,7 @@
           <p:cNvPr id="6" name="Slide Number Placeholder 5">
             <a:extLst>
               <a:ext uri="{FF2B5EF4-FFF2-40B4-BE49-F238E27FC236}">
-                <a16:creationId xmlns:a16="http://schemas.microsoft.com/office/drawing/2014/main" xmlns="" id="{3B7428FC-C061-4730-9EA5-A52A00413991}"/>
+                <a16:creationId xmlns:a16="http://schemas.microsoft.com/office/drawing/2014/main" id="{3B7428FC-C061-4730-9EA5-A52A00413991}"/>
               </a:ext>
             </a:extLst>
           </p:cNvPr>
@@ -1288,7 +1288,7 @@
           <p:cNvPr id="7" name="Rectangle 6">
             <a:extLst>
               <a:ext uri="{FF2B5EF4-FFF2-40B4-BE49-F238E27FC236}">
-                <a16:creationId xmlns:a16="http://schemas.microsoft.com/office/drawing/2014/main" xmlns="" id="{850AA271-B0BA-42CD-A544-17AAB1FA2EEA}"/>
+                <a16:creationId xmlns:a16="http://schemas.microsoft.com/office/drawing/2014/main" id="{850AA271-B0BA-42CD-A544-17AAB1FA2EEA}"/>
               </a:ext>
             </a:extLst>
           </p:cNvPr>
@@ -1340,7 +1340,7 @@
           <p:cNvPr id="16" name="Content Placeholder 2">
             <a:extLst>
               <a:ext uri="{FF2B5EF4-FFF2-40B4-BE49-F238E27FC236}">
-                <a16:creationId xmlns:a16="http://schemas.microsoft.com/office/drawing/2014/main" xmlns="" id="{699880E3-4DE3-A642-9738-DF49DDCC9AC5}"/>
+                <a16:creationId xmlns:a16="http://schemas.microsoft.com/office/drawing/2014/main" id="{699880E3-4DE3-A642-9738-DF49DDCC9AC5}"/>
               </a:ext>
             </a:extLst>
           </p:cNvPr>
@@ -1397,7 +1397,7 @@
           <p:cNvPr id="17" name="Content Placeholder 2">
             <a:extLst>
               <a:ext uri="{FF2B5EF4-FFF2-40B4-BE49-F238E27FC236}">
-                <a16:creationId xmlns:a16="http://schemas.microsoft.com/office/drawing/2014/main" xmlns="" id="{CF37D495-D835-8E4B-A177-5E12F893DDCA}"/>
+                <a16:creationId xmlns:a16="http://schemas.microsoft.com/office/drawing/2014/main" id="{CF37D495-D835-8E4B-A177-5E12F893DDCA}"/>
               </a:ext>
             </a:extLst>
           </p:cNvPr>
@@ -1489,7 +1489,7 @@
           <p:cNvPr id="18" name="Content Placeholder 2">
             <a:extLst>
               <a:ext uri="{FF2B5EF4-FFF2-40B4-BE49-F238E27FC236}">
-                <a16:creationId xmlns:a16="http://schemas.microsoft.com/office/drawing/2014/main" xmlns="" id="{A6804C7E-983C-9246-90C0-AF8A0CE2CA84}"/>
+                <a16:creationId xmlns:a16="http://schemas.microsoft.com/office/drawing/2014/main" id="{A6804C7E-983C-9246-90C0-AF8A0CE2CA84}"/>
               </a:ext>
             </a:extLst>
           </p:cNvPr>
@@ -1580,7 +1580,7 @@
           <p:cNvPr id="8" name="Picture Placeholder 7">
             <a:extLst>
               <a:ext uri="{FF2B5EF4-FFF2-40B4-BE49-F238E27FC236}">
-                <a16:creationId xmlns:a16="http://schemas.microsoft.com/office/drawing/2014/main" xmlns="" id="{84410427-8F1D-7541-9C05-AFDD3531678D}"/>
+                <a16:creationId xmlns:a16="http://schemas.microsoft.com/office/drawing/2014/main" id="{84410427-8F1D-7541-9C05-AFDD3531678D}"/>
               </a:ext>
             </a:extLst>
           </p:cNvPr>
@@ -1610,7 +1610,7 @@
           <p:cNvPr id="20" name="Picture Placeholder 7">
             <a:extLst>
               <a:ext uri="{FF2B5EF4-FFF2-40B4-BE49-F238E27FC236}">
-                <a16:creationId xmlns:a16="http://schemas.microsoft.com/office/drawing/2014/main" xmlns="" id="{8B7D5964-7A97-5742-8717-CCB747F84A08}"/>
+                <a16:creationId xmlns:a16="http://schemas.microsoft.com/office/drawing/2014/main" id="{8B7D5964-7A97-5742-8717-CCB747F84A08}"/>
               </a:ext>
             </a:extLst>
           </p:cNvPr>
@@ -1640,7 +1640,7 @@
           <p:cNvPr id="21" name="Picture Placeholder 7">
             <a:extLst>
               <a:ext uri="{FF2B5EF4-FFF2-40B4-BE49-F238E27FC236}">
-                <a16:creationId xmlns:a16="http://schemas.microsoft.com/office/drawing/2014/main" xmlns="" id="{344933FE-A401-A841-9AC3-B75285AA32D2}"/>
+                <a16:creationId xmlns:a16="http://schemas.microsoft.com/office/drawing/2014/main" id="{344933FE-A401-A841-9AC3-B75285AA32D2}"/>
               </a:ext>
             </a:extLst>
           </p:cNvPr>
@@ -1708,7 +1708,7 @@
           <p:cNvPr id="7" name="Picture 6">
             <a:extLst>
               <a:ext uri="{FF2B5EF4-FFF2-40B4-BE49-F238E27FC236}">
-                <a16:creationId xmlns:a16="http://schemas.microsoft.com/office/drawing/2014/main" xmlns="" id="{EE2CE188-32E7-4242-9E44-E8055FC030CC}"/>
+                <a16:creationId xmlns:a16="http://schemas.microsoft.com/office/drawing/2014/main" id="{EE2CE188-32E7-4242-9E44-E8055FC030CC}"/>
               </a:ext>
             </a:extLst>
           </p:cNvPr>
@@ -1743,7 +1743,7 @@
           <p:cNvPr id="2" name="Title 1">
             <a:extLst>
               <a:ext uri="{FF2B5EF4-FFF2-40B4-BE49-F238E27FC236}">
-                <a16:creationId xmlns:a16="http://schemas.microsoft.com/office/drawing/2014/main" xmlns="" id="{7381B53D-9933-445F-9B68-E730EB38A5A9}"/>
+                <a16:creationId xmlns:a16="http://schemas.microsoft.com/office/drawing/2014/main" id="{7381B53D-9933-445F-9B68-E730EB38A5A9}"/>
               </a:ext>
             </a:extLst>
           </p:cNvPr>
@@ -1795,7 +1795,7 @@
           <p:cNvPr id="5" name="Footer Placeholder 4">
             <a:extLst>
               <a:ext uri="{FF2B5EF4-FFF2-40B4-BE49-F238E27FC236}">
-                <a16:creationId xmlns:a16="http://schemas.microsoft.com/office/drawing/2014/main" xmlns="" id="{CA2BE80A-BFEC-E24A-B510-73A571F1F04F}"/>
+                <a16:creationId xmlns:a16="http://schemas.microsoft.com/office/drawing/2014/main" id="{CA2BE80A-BFEC-E24A-B510-73A571F1F04F}"/>
               </a:ext>
             </a:extLst>
           </p:cNvPr>
@@ -1843,7 +1843,7 @@
           <p:cNvPr id="6" name="Slide Number Placeholder 5">
             <a:extLst>
               <a:ext uri="{FF2B5EF4-FFF2-40B4-BE49-F238E27FC236}">
-                <a16:creationId xmlns:a16="http://schemas.microsoft.com/office/drawing/2014/main" xmlns="" id="{8E5B25B4-144A-5B4A-8EAD-2022412DF2F1}"/>
+                <a16:creationId xmlns:a16="http://schemas.microsoft.com/office/drawing/2014/main" id="{8E5B25B4-144A-5B4A-8EAD-2022412DF2F1}"/>
               </a:ext>
             </a:extLst>
           </p:cNvPr>
@@ -1926,7 +1926,7 @@
           <p:cNvPr id="2" name="Title 1">
             <a:extLst>
               <a:ext uri="{FF2B5EF4-FFF2-40B4-BE49-F238E27FC236}">
-                <a16:creationId xmlns:a16="http://schemas.microsoft.com/office/drawing/2014/main" xmlns="" id="{7381B53D-9933-445F-9B68-E730EB38A5A9}"/>
+                <a16:creationId xmlns:a16="http://schemas.microsoft.com/office/drawing/2014/main" id="{7381B53D-9933-445F-9B68-E730EB38A5A9}"/>
               </a:ext>
             </a:extLst>
           </p:cNvPr>
@@ -1973,7 +1973,7 @@
           <p:cNvPr id="3" name="Subtitle 2">
             <a:extLst>
               <a:ext uri="{FF2B5EF4-FFF2-40B4-BE49-F238E27FC236}">
-                <a16:creationId xmlns:a16="http://schemas.microsoft.com/office/drawing/2014/main" xmlns="" id="{E2C6B9F5-608F-4534-96F0-C3A5E1A638A6}"/>
+                <a16:creationId xmlns:a16="http://schemas.microsoft.com/office/drawing/2014/main" id="{E2C6B9F5-608F-4534-96F0-C3A5E1A638A6}"/>
               </a:ext>
             </a:extLst>
           </p:cNvPr>
@@ -2050,7 +2050,7 @@
           <p:cNvPr id="5" name="Footer Placeholder 4">
             <a:extLst>
               <a:ext uri="{FF2B5EF4-FFF2-40B4-BE49-F238E27FC236}">
-                <a16:creationId xmlns:a16="http://schemas.microsoft.com/office/drawing/2014/main" xmlns="" id="{0540E7B9-9AC6-4E42-A931-6FF91E6494A1}"/>
+                <a16:creationId xmlns:a16="http://schemas.microsoft.com/office/drawing/2014/main" id="{0540E7B9-9AC6-4E42-A931-6FF91E6494A1}"/>
               </a:ext>
             </a:extLst>
           </p:cNvPr>
@@ -2098,7 +2098,7 @@
           <p:cNvPr id="6" name="Slide Number Placeholder 5">
             <a:extLst>
               <a:ext uri="{FF2B5EF4-FFF2-40B4-BE49-F238E27FC236}">
-                <a16:creationId xmlns:a16="http://schemas.microsoft.com/office/drawing/2014/main" xmlns="" id="{FB16D645-6420-4785-8316-43EF780FA589}"/>
+                <a16:creationId xmlns:a16="http://schemas.microsoft.com/office/drawing/2014/main" id="{FB16D645-6420-4785-8316-43EF780FA589}"/>
               </a:ext>
             </a:extLst>
           </p:cNvPr>
@@ -2143,7 +2143,7 @@
           <p:cNvPr id="8" name="Picture 7" descr="A picture containing drawing&#10;&#10;Description automatically generated">
             <a:extLst>
               <a:ext uri="{FF2B5EF4-FFF2-40B4-BE49-F238E27FC236}">
-                <a16:creationId xmlns:a16="http://schemas.microsoft.com/office/drawing/2014/main" xmlns="" id="{BCCF2CA0-CCE3-4304-8F31-4D1CC50BCBDE}"/>
+                <a16:creationId xmlns:a16="http://schemas.microsoft.com/office/drawing/2014/main" id="{BCCF2CA0-CCE3-4304-8F31-4D1CC50BCBDE}"/>
               </a:ext>
             </a:extLst>
           </p:cNvPr>
@@ -2217,7 +2217,7 @@
           <p:cNvPr id="3" name="Subtitle 2">
             <a:extLst>
               <a:ext uri="{FF2B5EF4-FFF2-40B4-BE49-F238E27FC236}">
-                <a16:creationId xmlns:a16="http://schemas.microsoft.com/office/drawing/2014/main" xmlns="" id="{E2C6B9F5-608F-4534-96F0-C3A5E1A638A6}"/>
+                <a16:creationId xmlns:a16="http://schemas.microsoft.com/office/drawing/2014/main" id="{E2C6B9F5-608F-4534-96F0-C3A5E1A638A6}"/>
               </a:ext>
             </a:extLst>
           </p:cNvPr>
@@ -2294,7 +2294,7 @@
           <p:cNvPr id="5" name="Footer Placeholder 4">
             <a:extLst>
               <a:ext uri="{FF2B5EF4-FFF2-40B4-BE49-F238E27FC236}">
-                <a16:creationId xmlns:a16="http://schemas.microsoft.com/office/drawing/2014/main" xmlns="" id="{0540E7B9-9AC6-4E42-A931-6FF91E6494A1}"/>
+                <a16:creationId xmlns:a16="http://schemas.microsoft.com/office/drawing/2014/main" id="{0540E7B9-9AC6-4E42-A931-6FF91E6494A1}"/>
               </a:ext>
             </a:extLst>
           </p:cNvPr>
@@ -2337,7 +2337,7 @@
           <p:cNvPr id="6" name="Slide Number Placeholder 5">
             <a:extLst>
               <a:ext uri="{FF2B5EF4-FFF2-40B4-BE49-F238E27FC236}">
-                <a16:creationId xmlns:a16="http://schemas.microsoft.com/office/drawing/2014/main" xmlns="" id="{FB16D645-6420-4785-8316-43EF780FA589}"/>
+                <a16:creationId xmlns:a16="http://schemas.microsoft.com/office/drawing/2014/main" id="{FB16D645-6420-4785-8316-43EF780FA589}"/>
               </a:ext>
             </a:extLst>
           </p:cNvPr>
@@ -2382,7 +2382,7 @@
           <p:cNvPr id="9" name="Title 1">
             <a:extLst>
               <a:ext uri="{FF2B5EF4-FFF2-40B4-BE49-F238E27FC236}">
-                <a16:creationId xmlns:a16="http://schemas.microsoft.com/office/drawing/2014/main" xmlns="" id="{E9449821-0D0D-644D-97A3-D56097A9C6DA}"/>
+                <a16:creationId xmlns:a16="http://schemas.microsoft.com/office/drawing/2014/main" id="{E9449821-0D0D-644D-97A3-D56097A9C6DA}"/>
               </a:ext>
             </a:extLst>
           </p:cNvPr>
@@ -2429,7 +2429,7 @@
           <p:cNvPr id="10" name="Rectangle 9">
             <a:extLst>
               <a:ext uri="{FF2B5EF4-FFF2-40B4-BE49-F238E27FC236}">
-                <a16:creationId xmlns:a16="http://schemas.microsoft.com/office/drawing/2014/main" xmlns="" id="{44F6EB17-8019-7B4E-B53C-76B057A7C31F}"/>
+                <a16:creationId xmlns:a16="http://schemas.microsoft.com/office/drawing/2014/main" id="{44F6EB17-8019-7B4E-B53C-76B057A7C31F}"/>
               </a:ext>
             </a:extLst>
           </p:cNvPr>
@@ -2485,7 +2485,7 @@
           <p:cNvPr id="11" name="Picture 10">
             <a:extLst>
               <a:ext uri="{FF2B5EF4-FFF2-40B4-BE49-F238E27FC236}">
-                <a16:creationId xmlns:a16="http://schemas.microsoft.com/office/drawing/2014/main" xmlns="" id="{0503EF50-F00F-9643-BE53-F0A5272FC4B2}"/>
+                <a16:creationId xmlns:a16="http://schemas.microsoft.com/office/drawing/2014/main" id="{0503EF50-F00F-9643-BE53-F0A5272FC4B2}"/>
               </a:ext>
             </a:extLst>
           </p:cNvPr>
@@ -2553,7 +2553,7 @@
           <p:cNvPr id="2" name="Title 1">
             <a:extLst>
               <a:ext uri="{FF2B5EF4-FFF2-40B4-BE49-F238E27FC236}">
-                <a16:creationId xmlns:a16="http://schemas.microsoft.com/office/drawing/2014/main" xmlns="" id="{A1AAFE49-0143-472F-897B-A7DAB87AB4E4}"/>
+                <a16:creationId xmlns:a16="http://schemas.microsoft.com/office/drawing/2014/main" id="{A1AAFE49-0143-472F-897B-A7DAB87AB4E4}"/>
               </a:ext>
             </a:extLst>
           </p:cNvPr>
@@ -2582,7 +2582,7 @@
           <p:cNvPr id="3" name="Content Placeholder 2">
             <a:extLst>
               <a:ext uri="{FF2B5EF4-FFF2-40B4-BE49-F238E27FC236}">
-                <a16:creationId xmlns:a16="http://schemas.microsoft.com/office/drawing/2014/main" xmlns="" id="{981FBDFA-876B-4255-A301-F62F1EDD8D66}"/>
+                <a16:creationId xmlns:a16="http://schemas.microsoft.com/office/drawing/2014/main" id="{981FBDFA-876B-4255-A301-F62F1EDD8D66}"/>
               </a:ext>
             </a:extLst>
           </p:cNvPr>
@@ -2642,7 +2642,7 @@
           <p:cNvPr id="4" name="Content Placeholder 3">
             <a:extLst>
               <a:ext uri="{FF2B5EF4-FFF2-40B4-BE49-F238E27FC236}">
-                <a16:creationId xmlns:a16="http://schemas.microsoft.com/office/drawing/2014/main" xmlns="" id="{46F0C709-1F3D-4B13-A290-4041A33FB10E}"/>
+                <a16:creationId xmlns:a16="http://schemas.microsoft.com/office/drawing/2014/main" id="{46F0C709-1F3D-4B13-A290-4041A33FB10E}"/>
               </a:ext>
             </a:extLst>
           </p:cNvPr>
@@ -2733,7 +2733,7 @@
           <p:cNvPr id="6" name="Footer Placeholder 5">
             <a:extLst>
               <a:ext uri="{FF2B5EF4-FFF2-40B4-BE49-F238E27FC236}">
-                <a16:creationId xmlns:a16="http://schemas.microsoft.com/office/drawing/2014/main" xmlns="" id="{60A8C9C5-E913-47B9-82DE-196768E6D657}"/>
+                <a16:creationId xmlns:a16="http://schemas.microsoft.com/office/drawing/2014/main" id="{60A8C9C5-E913-47B9-82DE-196768E6D657}"/>
               </a:ext>
             </a:extLst>
           </p:cNvPr>
@@ -2761,7 +2761,7 @@
           <p:cNvPr id="7" name="Slide Number Placeholder 6">
             <a:extLst>
               <a:ext uri="{FF2B5EF4-FFF2-40B4-BE49-F238E27FC236}">
-                <a16:creationId xmlns:a16="http://schemas.microsoft.com/office/drawing/2014/main" xmlns="" id="{E1558F66-ECA3-4B00-A383-8D2B86217C93}"/>
+                <a16:creationId xmlns:a16="http://schemas.microsoft.com/office/drawing/2014/main" id="{E1558F66-ECA3-4B00-A383-8D2B86217C93}"/>
               </a:ext>
             </a:extLst>
           </p:cNvPr>
@@ -2791,7 +2791,7 @@
           <p:cNvPr id="8" name="Rectangle 7">
             <a:extLst>
               <a:ext uri="{FF2B5EF4-FFF2-40B4-BE49-F238E27FC236}">
-                <a16:creationId xmlns:a16="http://schemas.microsoft.com/office/drawing/2014/main" xmlns="" id="{62A19DAE-53D8-4F04-A4B9-B6EDFC23886D}"/>
+                <a16:creationId xmlns:a16="http://schemas.microsoft.com/office/drawing/2014/main" id="{62A19DAE-53D8-4F04-A4B9-B6EDFC23886D}"/>
               </a:ext>
             </a:extLst>
           </p:cNvPr>
@@ -2906,7 +2906,7 @@
           <p:cNvPr id="2" name="Title 1">
             <a:extLst>
               <a:ext uri="{FF2B5EF4-FFF2-40B4-BE49-F238E27FC236}">
-                <a16:creationId xmlns:a16="http://schemas.microsoft.com/office/drawing/2014/main" xmlns="" id="{A4DE70B5-BA04-4DB3-853D-A1C05ADF828C}"/>
+                <a16:creationId xmlns:a16="http://schemas.microsoft.com/office/drawing/2014/main" id="{A4DE70B5-BA04-4DB3-853D-A1C05ADF828C}"/>
               </a:ext>
             </a:extLst>
           </p:cNvPr>
@@ -2935,7 +2935,7 @@
           <p:cNvPr id="3" name="Content Placeholder 2">
             <a:extLst>
               <a:ext uri="{FF2B5EF4-FFF2-40B4-BE49-F238E27FC236}">
-                <a16:creationId xmlns:a16="http://schemas.microsoft.com/office/drawing/2014/main" xmlns="" id="{70440712-862D-4568-80A4-86117B896766}"/>
+                <a16:creationId xmlns:a16="http://schemas.microsoft.com/office/drawing/2014/main" id="{70440712-862D-4568-80A4-86117B896766}"/>
               </a:ext>
             </a:extLst>
           </p:cNvPr>
@@ -2992,7 +2992,7 @@
           <p:cNvPr id="5" name="Footer Placeholder 4">
             <a:extLst>
               <a:ext uri="{FF2B5EF4-FFF2-40B4-BE49-F238E27FC236}">
-                <a16:creationId xmlns:a16="http://schemas.microsoft.com/office/drawing/2014/main" xmlns="" id="{962B6D5D-0892-4B4E-86D9-894852B1242C}"/>
+                <a16:creationId xmlns:a16="http://schemas.microsoft.com/office/drawing/2014/main" id="{962B6D5D-0892-4B4E-86D9-894852B1242C}"/>
               </a:ext>
             </a:extLst>
           </p:cNvPr>
@@ -3020,7 +3020,7 @@
           <p:cNvPr id="6" name="Slide Number Placeholder 5">
             <a:extLst>
               <a:ext uri="{FF2B5EF4-FFF2-40B4-BE49-F238E27FC236}">
-                <a16:creationId xmlns:a16="http://schemas.microsoft.com/office/drawing/2014/main" xmlns="" id="{3B7428FC-C061-4730-9EA5-A52A00413991}"/>
+                <a16:creationId xmlns:a16="http://schemas.microsoft.com/office/drawing/2014/main" id="{3B7428FC-C061-4730-9EA5-A52A00413991}"/>
               </a:ext>
             </a:extLst>
           </p:cNvPr>
@@ -3050,7 +3050,7 @@
           <p:cNvPr id="7" name="Rectangle 6">
             <a:extLst>
               <a:ext uri="{FF2B5EF4-FFF2-40B4-BE49-F238E27FC236}">
-                <a16:creationId xmlns:a16="http://schemas.microsoft.com/office/drawing/2014/main" xmlns="" id="{850AA271-B0BA-42CD-A544-17AAB1FA2EEA}"/>
+                <a16:creationId xmlns:a16="http://schemas.microsoft.com/office/drawing/2014/main" id="{850AA271-B0BA-42CD-A544-17AAB1FA2EEA}"/>
               </a:ext>
             </a:extLst>
           </p:cNvPr>
@@ -3140,7 +3140,7 @@
           <p:cNvPr id="2" name="Title 1">
             <a:extLst>
               <a:ext uri="{FF2B5EF4-FFF2-40B4-BE49-F238E27FC236}">
-                <a16:creationId xmlns:a16="http://schemas.microsoft.com/office/drawing/2014/main" xmlns="" id="{A4DE70B5-BA04-4DB3-853D-A1C05ADF828C}"/>
+                <a16:creationId xmlns:a16="http://schemas.microsoft.com/office/drawing/2014/main" id="{A4DE70B5-BA04-4DB3-853D-A1C05ADF828C}"/>
               </a:ext>
             </a:extLst>
           </p:cNvPr>
@@ -3174,7 +3174,7 @@
           <p:cNvPr id="3" name="Content Placeholder 2">
             <a:extLst>
               <a:ext uri="{FF2B5EF4-FFF2-40B4-BE49-F238E27FC236}">
-                <a16:creationId xmlns:a16="http://schemas.microsoft.com/office/drawing/2014/main" xmlns="" id="{70440712-862D-4568-80A4-86117B896766}"/>
+                <a16:creationId xmlns:a16="http://schemas.microsoft.com/office/drawing/2014/main" id="{70440712-862D-4568-80A4-86117B896766}"/>
               </a:ext>
             </a:extLst>
           </p:cNvPr>
@@ -3231,7 +3231,7 @@
           <p:cNvPr id="6" name="Slide Number Placeholder 5">
             <a:extLst>
               <a:ext uri="{FF2B5EF4-FFF2-40B4-BE49-F238E27FC236}">
-                <a16:creationId xmlns:a16="http://schemas.microsoft.com/office/drawing/2014/main" xmlns="" id="{3B7428FC-C061-4730-9EA5-A52A00413991}"/>
+                <a16:creationId xmlns:a16="http://schemas.microsoft.com/office/drawing/2014/main" id="{3B7428FC-C061-4730-9EA5-A52A00413991}"/>
               </a:ext>
             </a:extLst>
           </p:cNvPr>
@@ -3261,7 +3261,7 @@
           <p:cNvPr id="7" name="Rectangle 6">
             <a:extLst>
               <a:ext uri="{FF2B5EF4-FFF2-40B4-BE49-F238E27FC236}">
-                <a16:creationId xmlns:a16="http://schemas.microsoft.com/office/drawing/2014/main" xmlns="" id="{850AA271-B0BA-42CD-A544-17AAB1FA2EEA}"/>
+                <a16:creationId xmlns:a16="http://schemas.microsoft.com/office/drawing/2014/main" id="{850AA271-B0BA-42CD-A544-17AAB1FA2EEA}"/>
               </a:ext>
             </a:extLst>
           </p:cNvPr>
@@ -3351,7 +3351,7 @@
           <p:cNvPr id="6" name="Slide Number Placeholder 5">
             <a:extLst>
               <a:ext uri="{FF2B5EF4-FFF2-40B4-BE49-F238E27FC236}">
-                <a16:creationId xmlns:a16="http://schemas.microsoft.com/office/drawing/2014/main" xmlns="" id="{3B7428FC-C061-4730-9EA5-A52A00413991}"/>
+                <a16:creationId xmlns:a16="http://schemas.microsoft.com/office/drawing/2014/main" id="{3B7428FC-C061-4730-9EA5-A52A00413991}"/>
               </a:ext>
             </a:extLst>
           </p:cNvPr>
@@ -3389,7 +3389,7 @@
           <p:cNvPr id="8" name="Content Placeholder 2">
             <a:extLst>
               <a:ext uri="{FF2B5EF4-FFF2-40B4-BE49-F238E27FC236}">
-                <a16:creationId xmlns:a16="http://schemas.microsoft.com/office/drawing/2014/main" xmlns="" id="{B09D4C03-E8B1-644E-949B-F7AF91181833}"/>
+                <a16:creationId xmlns:a16="http://schemas.microsoft.com/office/drawing/2014/main" id="{B09D4C03-E8B1-644E-949B-F7AF91181833}"/>
               </a:ext>
             </a:extLst>
           </p:cNvPr>
@@ -3462,7 +3462,7 @@
           <p:cNvPr id="5" name="Title 1">
             <a:extLst>
               <a:ext uri="{FF2B5EF4-FFF2-40B4-BE49-F238E27FC236}">
-                <a16:creationId xmlns:a16="http://schemas.microsoft.com/office/drawing/2014/main" xmlns="" id="{02EDA17D-AAE6-954F-93C6-90B8D7B80BD1}"/>
+                <a16:creationId xmlns:a16="http://schemas.microsoft.com/office/drawing/2014/main" id="{02EDA17D-AAE6-954F-93C6-90B8D7B80BD1}"/>
               </a:ext>
             </a:extLst>
           </p:cNvPr>
@@ -3542,7 +3542,7 @@
           <p:cNvPr id="2" name="Title 1">
             <a:extLst>
               <a:ext uri="{FF2B5EF4-FFF2-40B4-BE49-F238E27FC236}">
-                <a16:creationId xmlns:a16="http://schemas.microsoft.com/office/drawing/2014/main" xmlns="" id="{A1AAFE49-0143-472F-897B-A7DAB87AB4E4}"/>
+                <a16:creationId xmlns:a16="http://schemas.microsoft.com/office/drawing/2014/main" id="{A1AAFE49-0143-472F-897B-A7DAB87AB4E4}"/>
               </a:ext>
             </a:extLst>
           </p:cNvPr>
@@ -3571,7 +3571,7 @@
           <p:cNvPr id="4" name="Content Placeholder 3">
             <a:extLst>
               <a:ext uri="{FF2B5EF4-FFF2-40B4-BE49-F238E27FC236}">
-                <a16:creationId xmlns:a16="http://schemas.microsoft.com/office/drawing/2014/main" xmlns="" id="{46F0C709-1F3D-4B13-A290-4041A33FB10E}"/>
+                <a16:creationId xmlns:a16="http://schemas.microsoft.com/office/drawing/2014/main" id="{46F0C709-1F3D-4B13-A290-4041A33FB10E}"/>
               </a:ext>
             </a:extLst>
           </p:cNvPr>
@@ -3632,7 +3632,7 @@
           <p:cNvPr id="6" name="Footer Placeholder 5">
             <a:extLst>
               <a:ext uri="{FF2B5EF4-FFF2-40B4-BE49-F238E27FC236}">
-                <a16:creationId xmlns:a16="http://schemas.microsoft.com/office/drawing/2014/main" xmlns="" id="{60A8C9C5-E913-47B9-82DE-196768E6D657}"/>
+                <a16:creationId xmlns:a16="http://schemas.microsoft.com/office/drawing/2014/main" id="{60A8C9C5-E913-47B9-82DE-196768E6D657}"/>
               </a:ext>
             </a:extLst>
           </p:cNvPr>
@@ -3660,7 +3660,7 @@
           <p:cNvPr id="7" name="Slide Number Placeholder 6">
             <a:extLst>
               <a:ext uri="{FF2B5EF4-FFF2-40B4-BE49-F238E27FC236}">
-                <a16:creationId xmlns:a16="http://schemas.microsoft.com/office/drawing/2014/main" xmlns="" id="{E1558F66-ECA3-4B00-A383-8D2B86217C93}"/>
+                <a16:creationId xmlns:a16="http://schemas.microsoft.com/office/drawing/2014/main" id="{E1558F66-ECA3-4B00-A383-8D2B86217C93}"/>
               </a:ext>
             </a:extLst>
           </p:cNvPr>
@@ -3690,7 +3690,7 @@
           <p:cNvPr id="10" name="Picture Placeholder 9">
             <a:extLst>
               <a:ext uri="{FF2B5EF4-FFF2-40B4-BE49-F238E27FC236}">
-                <a16:creationId xmlns:a16="http://schemas.microsoft.com/office/drawing/2014/main" xmlns="" id="{874043F1-6F14-49BD-83CA-12B559ABC101}"/>
+                <a16:creationId xmlns:a16="http://schemas.microsoft.com/office/drawing/2014/main" id="{874043F1-6F14-49BD-83CA-12B559ABC101}"/>
               </a:ext>
             </a:extLst>
           </p:cNvPr>
@@ -3720,7 +3720,7 @@
           <p:cNvPr id="11" name="Rectangle 10">
             <a:extLst>
               <a:ext uri="{FF2B5EF4-FFF2-40B4-BE49-F238E27FC236}">
-                <a16:creationId xmlns:a16="http://schemas.microsoft.com/office/drawing/2014/main" xmlns="" id="{4B51C537-0174-43E5-8B81-C80AF1D06831}"/>
+                <a16:creationId xmlns:a16="http://schemas.microsoft.com/office/drawing/2014/main" id="{4B51C537-0174-43E5-8B81-C80AF1D06831}"/>
               </a:ext>
             </a:extLst>
           </p:cNvPr>
@@ -3810,7 +3810,7 @@
           <p:cNvPr id="2" name="Title 1">
             <a:extLst>
               <a:ext uri="{FF2B5EF4-FFF2-40B4-BE49-F238E27FC236}">
-                <a16:creationId xmlns:a16="http://schemas.microsoft.com/office/drawing/2014/main" xmlns="" id="{A1AAFE49-0143-472F-897B-A7DAB87AB4E4}"/>
+                <a16:creationId xmlns:a16="http://schemas.microsoft.com/office/drawing/2014/main" id="{A1AAFE49-0143-472F-897B-A7DAB87AB4E4}"/>
               </a:ext>
             </a:extLst>
           </p:cNvPr>
@@ -3839,7 +3839,7 @@
           <p:cNvPr id="6" name="Footer Placeholder 5">
             <a:extLst>
               <a:ext uri="{FF2B5EF4-FFF2-40B4-BE49-F238E27FC236}">
-                <a16:creationId xmlns:a16="http://schemas.microsoft.com/office/drawing/2014/main" xmlns="" id="{60A8C9C5-E913-47B9-82DE-196768E6D657}"/>
+                <a16:creationId xmlns:a16="http://schemas.microsoft.com/office/drawing/2014/main" id="{60A8C9C5-E913-47B9-82DE-196768E6D657}"/>
               </a:ext>
             </a:extLst>
           </p:cNvPr>
@@ -3867,7 +3867,7 @@
           <p:cNvPr id="7" name="Slide Number Placeholder 6">
             <a:extLst>
               <a:ext uri="{FF2B5EF4-FFF2-40B4-BE49-F238E27FC236}">
-                <a16:creationId xmlns:a16="http://schemas.microsoft.com/office/drawing/2014/main" xmlns="" id="{E1558F66-ECA3-4B00-A383-8D2B86217C93}"/>
+                <a16:creationId xmlns:a16="http://schemas.microsoft.com/office/drawing/2014/main" id="{E1558F66-ECA3-4B00-A383-8D2B86217C93}"/>
               </a:ext>
             </a:extLst>
           </p:cNvPr>
@@ -3897,7 +3897,7 @@
           <p:cNvPr id="8" name="Rectangle 7">
             <a:extLst>
               <a:ext uri="{FF2B5EF4-FFF2-40B4-BE49-F238E27FC236}">
-                <a16:creationId xmlns:a16="http://schemas.microsoft.com/office/drawing/2014/main" xmlns="" id="{039FCF96-B7D6-4CCD-A4AE-46A67249D3BD}"/>
+                <a16:creationId xmlns:a16="http://schemas.microsoft.com/office/drawing/2014/main" id="{039FCF96-B7D6-4CCD-A4AE-46A67249D3BD}"/>
               </a:ext>
             </a:extLst>
           </p:cNvPr>
@@ -3949,7 +3949,7 @@
           <p:cNvPr id="10" name="Content Placeholder 9">
             <a:extLst>
               <a:ext uri="{FF2B5EF4-FFF2-40B4-BE49-F238E27FC236}">
-                <a16:creationId xmlns:a16="http://schemas.microsoft.com/office/drawing/2014/main" xmlns="" id="{741F3B7A-B2BF-40FC-8EB2-F1C37D316488}"/>
+                <a16:creationId xmlns:a16="http://schemas.microsoft.com/office/drawing/2014/main" id="{741F3B7A-B2BF-40FC-8EB2-F1C37D316488}"/>
               </a:ext>
             </a:extLst>
           </p:cNvPr>
@@ -4010,7 +4010,7 @@
           <p:cNvPr id="9" name="Content Placeholder 9">
             <a:extLst>
               <a:ext uri="{FF2B5EF4-FFF2-40B4-BE49-F238E27FC236}">
-                <a16:creationId xmlns:a16="http://schemas.microsoft.com/office/drawing/2014/main" xmlns="" id="{75B7A667-B99F-7A41-AAC3-ED24B9B1D92E}"/>
+                <a16:creationId xmlns:a16="http://schemas.microsoft.com/office/drawing/2014/main" id="{75B7A667-B99F-7A41-AAC3-ED24B9B1D92E}"/>
               </a:ext>
             </a:extLst>
           </p:cNvPr>
@@ -4071,7 +4071,7 @@
           <p:cNvPr id="11" name="Content Placeholder 9">
             <a:extLst>
               <a:ext uri="{FF2B5EF4-FFF2-40B4-BE49-F238E27FC236}">
-                <a16:creationId xmlns:a16="http://schemas.microsoft.com/office/drawing/2014/main" xmlns="" id="{93C1FF47-695D-B348-AF37-1ADF5736FA9E}"/>
+                <a16:creationId xmlns:a16="http://schemas.microsoft.com/office/drawing/2014/main" id="{93C1FF47-695D-B348-AF37-1ADF5736FA9E}"/>
               </a:ext>
             </a:extLst>
           </p:cNvPr>
@@ -4167,7 +4167,7 @@
           <p:cNvPr id="2" name="Title Placeholder 1">
             <a:extLst>
               <a:ext uri="{FF2B5EF4-FFF2-40B4-BE49-F238E27FC236}">
-                <a16:creationId xmlns:a16="http://schemas.microsoft.com/office/drawing/2014/main" xmlns="" id="{DB1A62CF-E2B4-496D-829D-DCE37260977D}"/>
+                <a16:creationId xmlns:a16="http://schemas.microsoft.com/office/drawing/2014/main" id="{DB1A62CF-E2B4-496D-829D-DCE37260977D}"/>
               </a:ext>
             </a:extLst>
           </p:cNvPr>
@@ -4206,7 +4206,7 @@
           <p:cNvPr id="3" name="Text Placeholder 2">
             <a:extLst>
               <a:ext uri="{FF2B5EF4-FFF2-40B4-BE49-F238E27FC236}">
-                <a16:creationId xmlns:a16="http://schemas.microsoft.com/office/drawing/2014/main" xmlns="" id="{DFD84EF4-0E07-4BF3-A4AB-3E8632AA79AD}"/>
+                <a16:creationId xmlns:a16="http://schemas.microsoft.com/office/drawing/2014/main" id="{DFD84EF4-0E07-4BF3-A4AB-3E8632AA79AD}"/>
               </a:ext>
             </a:extLst>
           </p:cNvPr>
@@ -4274,7 +4274,7 @@
           <p:cNvPr id="5" name="Footer Placeholder 4">
             <a:extLst>
               <a:ext uri="{FF2B5EF4-FFF2-40B4-BE49-F238E27FC236}">
-                <a16:creationId xmlns:a16="http://schemas.microsoft.com/office/drawing/2014/main" xmlns="" id="{3B527A5D-B761-4C2F-97E6-5D8254424B8B}"/>
+                <a16:creationId xmlns:a16="http://schemas.microsoft.com/office/drawing/2014/main" id="{3B527A5D-B761-4C2F-97E6-5D8254424B8B}"/>
               </a:ext>
             </a:extLst>
           </p:cNvPr>
@@ -4322,7 +4322,7 @@
           <p:cNvPr id="6" name="Slide Number Placeholder 5">
             <a:extLst>
               <a:ext uri="{FF2B5EF4-FFF2-40B4-BE49-F238E27FC236}">
-                <a16:creationId xmlns:a16="http://schemas.microsoft.com/office/drawing/2014/main" xmlns="" id="{9CD661B1-4E4B-4F85-ACA3-C34023D70282}"/>
+                <a16:creationId xmlns:a16="http://schemas.microsoft.com/office/drawing/2014/main" id="{9CD661B1-4E4B-4F85-ACA3-C34023D70282}"/>
               </a:ext>
             </a:extLst>
           </p:cNvPr>
@@ -4751,7 +4751,7 @@
           <p:cNvPr id="2" name="Subtitle 1">
             <a:extLst>
               <a:ext uri="{FF2B5EF4-FFF2-40B4-BE49-F238E27FC236}">
-                <a16:creationId xmlns:a16="http://schemas.microsoft.com/office/drawing/2014/main" xmlns="" id="{6A29D8FC-E32A-5566-0930-02B99F5763A6}"/>
+                <a16:creationId xmlns:a16="http://schemas.microsoft.com/office/drawing/2014/main" id="{6A29D8FC-E32A-5566-0930-02B99F5763A6}"/>
               </a:ext>
             </a:extLst>
           </p:cNvPr>
@@ -4784,7 +4784,7 @@
           <p:cNvPr id="4" name="Slide Number Placeholder 3">
             <a:extLst>
               <a:ext uri="{FF2B5EF4-FFF2-40B4-BE49-F238E27FC236}">
-                <a16:creationId xmlns:a16="http://schemas.microsoft.com/office/drawing/2014/main" xmlns="" id="{E143B824-C7FA-8427-0A8B-E8B5D7787B83}"/>
+                <a16:creationId xmlns:a16="http://schemas.microsoft.com/office/drawing/2014/main" id="{E143B824-C7FA-8427-0A8B-E8B5D7787B83}"/>
               </a:ext>
             </a:extLst>
           </p:cNvPr>
@@ -4814,7 +4814,7 @@
           <p:cNvPr id="6" name="TextBox 5">
             <a:extLst>
               <a:ext uri="{FF2B5EF4-FFF2-40B4-BE49-F238E27FC236}">
-                <a16:creationId xmlns:a16="http://schemas.microsoft.com/office/drawing/2014/main" xmlns="" id="{6DD9461E-8553-F8C3-E23F-FB71330E931F}"/>
+                <a16:creationId xmlns:a16="http://schemas.microsoft.com/office/drawing/2014/main" id="{6DD9461E-8553-F8C3-E23F-FB71330E931F}"/>
               </a:ext>
             </a:extLst>
           </p:cNvPr>
@@ -4894,21 +4894,6 @@
   <p:clrMapOvr>
     <a:masterClrMapping/>
   </p:clrMapOvr>
-  <mc:AlternateContent xmlns:mc="http://schemas.openxmlformats.org/markup-compatibility/2006">
-    <mc:Choice xmlns:p14="http://schemas.microsoft.com/office/powerpoint/2010/main" Requires="p14">
-      <p:transition spd="slow" p14:dur="2000"/>
-    </mc:Choice>
-    <mc:Fallback>
-      <p:transition spd="slow"/>
-    </mc:Fallback>
-  </mc:AlternateContent>
-  <p:timing>
-    <p:tnLst>
-      <p:par>
-        <p:cTn id="1" dur="indefinite" restart="never" nodeType="tmRoot"/>
-      </p:par>
-    </p:tnLst>
-  </p:timing>
 </p:sld>
 </file>
 
@@ -4948,7 +4933,7 @@
           <p:cNvPr id="2" name="Title 1">
             <a:extLst>
               <a:ext uri="{FF2B5EF4-FFF2-40B4-BE49-F238E27FC236}">
-                <a16:creationId xmlns:a16="http://schemas.microsoft.com/office/drawing/2014/main" xmlns="" id="{3440AEE4-CC66-FE42-B0C3-2CC7AFD37D1C}"/>
+                <a16:creationId xmlns:a16="http://schemas.microsoft.com/office/drawing/2014/main" id="{3440AEE4-CC66-FE42-B0C3-2CC7AFD37D1C}"/>
               </a:ext>
             </a:extLst>
           </p:cNvPr>
@@ -4984,10 +4969,6 @@
               <a:rPr lang="en-US" sz="2200" dirty="0"/>
               <a:t>Date: </a:t>
             </a:r>
-            <a:r>
-              <a:rPr lang="en-US" sz="8000" dirty="0"/>
-              <a:t/>
-            </a:r>
             <a:br>
               <a:rPr lang="en-US" sz="8000" dirty="0"/>
             </a:br>
@@ -5000,7 +4981,7 @@
           <p:cNvPr id="3" name="Subtitle 2">
             <a:extLst>
               <a:ext uri="{FF2B5EF4-FFF2-40B4-BE49-F238E27FC236}">
-                <a16:creationId xmlns:a16="http://schemas.microsoft.com/office/drawing/2014/main" xmlns="" id="{8275DA97-5166-7F4B-BC83-F50AC8BEDCD7}"/>
+                <a16:creationId xmlns:a16="http://schemas.microsoft.com/office/drawing/2014/main" id="{8275DA97-5166-7F4B-BC83-F50AC8BEDCD7}"/>
               </a:ext>
             </a:extLst>
           </p:cNvPr>
@@ -5025,23 +5006,15 @@
               <a:t>A246</a:t>
             </a:r>
             <a:r>
-              <a:rPr lang="en-US" sz="2000" dirty="0" smtClean="0"/>
-              <a:t>                                Name </a:t>
-            </a:r>
-            <a:r>
               <a:rPr lang="en-US" sz="2000" dirty="0"/>
-              <a:t>of Student </a:t>
-            </a:r>
-            <a:r>
-              <a:rPr lang="en-US" sz="2000" dirty="0" smtClean="0"/>
-              <a:t>Presenting: </a:t>
-            </a:r>
-            <a:r>
-              <a:rPr lang="en-GB" sz="2000" dirty="0" smtClean="0"/>
+              <a:t>                                Name of Student Presenting: </a:t>
+            </a:r>
+            <a:r>
+              <a:rPr lang="en-GB" sz="2000" dirty="0"/>
               <a:t>Tilakeaswar </a:t>
             </a:r>
             <a:r>
-              <a:rPr lang="en-GB" sz="2000" dirty="0" err="1" smtClean="0"/>
+              <a:rPr lang="en-GB" sz="2000" dirty="0" err="1"/>
               <a:t>Balamurugan</a:t>
             </a:r>
             <a:endParaRPr lang="en-GB" sz="2000" dirty="0"/>
@@ -5056,7 +5029,7 @@
           <p:cNvPr id="4" name="Footer Placeholder 3">
             <a:extLst>
               <a:ext uri="{FF2B5EF4-FFF2-40B4-BE49-F238E27FC236}">
-                <a16:creationId xmlns:a16="http://schemas.microsoft.com/office/drawing/2014/main" xmlns="" id="{6E7F4D14-5620-EC41-A86C-6CC3CFD691B4}"/>
+                <a16:creationId xmlns:a16="http://schemas.microsoft.com/office/drawing/2014/main" id="{6E7F4D14-5620-EC41-A86C-6CC3CFD691B4}"/>
               </a:ext>
             </a:extLst>
           </p:cNvPr>
@@ -5126,13 +5099,6 @@
   <p:clrMapOvr>
     <a:masterClrMapping/>
   </p:clrMapOvr>
-  <p:timing>
-    <p:tnLst>
-      <p:par>
-        <p:cTn id="1" dur="indefinite" restart="never" nodeType="tmRoot"/>
-      </p:par>
-    </p:tnLst>
-  </p:timing>
 </p:sld>
 </file>
 
@@ -5158,7 +5124,7 @@
           <p:cNvPr id="2" name="Subtitle 1">
             <a:extLst>
               <a:ext uri="{FF2B5EF4-FFF2-40B4-BE49-F238E27FC236}">
-                <a16:creationId xmlns:a16="http://schemas.microsoft.com/office/drawing/2014/main" xmlns="" id="{6EDF47CE-5D5A-6104-A73A-4C8E09C48DA4}"/>
+                <a16:creationId xmlns:a16="http://schemas.microsoft.com/office/drawing/2014/main" id="{6EDF47CE-5D5A-6104-A73A-4C8E09C48DA4}"/>
               </a:ext>
             </a:extLst>
           </p:cNvPr>
@@ -5171,7 +5137,7 @@
         </p:nvSpPr>
         <p:spPr>
           <a:xfrm>
-            <a:off x="954000" y="2019168"/>
+            <a:off x="965289" y="5549918"/>
             <a:ext cx="9769418" cy="230832"/>
           </a:xfrm>
         </p:spPr>
@@ -5179,36 +5145,10 @@
           <a:bodyPr/>
           <a:lstStyle/>
           <a:p>
+            <a:pPr algn="r"/>
             <a:r>
               <a:rPr lang="en-GB" dirty="0"/>
-              <a:t>Include a snippet of your dataset, to include </a:t>
-            </a:r>
-          </a:p>
-          <a:p>
-            <a:pPr marL="742950" indent="-742950">
-              <a:buAutoNum type="arabicPeriod"/>
-            </a:pPr>
-            <a:r>
-              <a:rPr lang="en-GB" dirty="0"/>
-              <a:t>The columns/variables you are using in your research question</a:t>
-            </a:r>
-          </a:p>
-          <a:p>
-            <a:pPr marL="742950" indent="-742950">
-              <a:buAutoNum type="arabicPeriod"/>
-            </a:pPr>
-            <a:r>
-              <a:rPr lang="en-GB" dirty="0"/>
-              <a:t>At least 5 rows of the data</a:t>
-            </a:r>
-          </a:p>
-          <a:p>
-            <a:pPr marL="742950" indent="-742950">
-              <a:buAutoNum type="arabicPeriod"/>
-            </a:pPr>
-            <a:r>
-              <a:rPr lang="en-GB" dirty="0"/>
-              <a:t>Tell us how many rows your dataset has.</a:t>
+              <a:t>Dimension : 2166 x 7</a:t>
             </a:r>
           </a:p>
         </p:txBody>
@@ -5218,7 +5158,7 @@
           <p:cNvPr id="3" name="Footer Placeholder 2">
             <a:extLst>
               <a:ext uri="{FF2B5EF4-FFF2-40B4-BE49-F238E27FC236}">
-                <a16:creationId xmlns:a16="http://schemas.microsoft.com/office/drawing/2014/main" xmlns="" id="{E6EB5BD4-BD08-7B73-D9D9-2582DDE1B3D9}"/>
+                <a16:creationId xmlns:a16="http://schemas.microsoft.com/office/drawing/2014/main" id="{E6EB5BD4-BD08-7B73-D9D9-2582DDE1B3D9}"/>
               </a:ext>
             </a:extLst>
           </p:cNvPr>
@@ -5247,7 +5187,7 @@
           <p:cNvPr id="4" name="Slide Number Placeholder 3">
             <a:extLst>
               <a:ext uri="{FF2B5EF4-FFF2-40B4-BE49-F238E27FC236}">
-                <a16:creationId xmlns:a16="http://schemas.microsoft.com/office/drawing/2014/main" xmlns="" id="{D1098E3C-BAB5-8478-26BA-5CDF4FAEFC64}"/>
+                <a16:creationId xmlns:a16="http://schemas.microsoft.com/office/drawing/2014/main" id="{D1098E3C-BAB5-8478-26BA-5CDF4FAEFC64}"/>
               </a:ext>
             </a:extLst>
           </p:cNvPr>
@@ -5269,6 +5209,234 @@
               <a:t>3</a:t>
             </a:fld>
             <a:endParaRPr lang="en-GB" dirty="0"/>
+          </a:p>
+        </p:txBody>
+      </p:sp>
+      <p:pic>
+        <p:nvPicPr>
+          <p:cNvPr id="6" name="Picture 5" descr="A number of numbers and letters&#10;&#10;Description automatically generated with medium confidence">
+            <a:extLst>
+              <a:ext uri="{FF2B5EF4-FFF2-40B4-BE49-F238E27FC236}">
+                <a16:creationId xmlns:a16="http://schemas.microsoft.com/office/drawing/2014/main" id="{026C393E-F2AF-5C71-3C2E-889DE5322E39}"/>
+              </a:ext>
+            </a:extLst>
+          </p:cNvPr>
+          <p:cNvPicPr>
+            <a:picLocks noChangeAspect="1"/>
+          </p:cNvPicPr>
+          <p:nvPr/>
+        </p:nvPicPr>
+        <p:blipFill>
+          <a:blip r:embed="rId2">
+            <a:extLst>
+              <a:ext uri="{28A0092B-C50C-407E-A947-70E740481C1C}">
+                <a14:useLocalDpi xmlns:a14="http://schemas.microsoft.com/office/drawing/2010/main" val="0"/>
+              </a:ext>
+            </a:extLst>
+          </a:blip>
+          <a:stretch>
+            <a:fillRect/>
+          </a:stretch>
+        </p:blipFill>
+        <p:spPr>
+          <a:xfrm>
+            <a:off x="965289" y="1192666"/>
+            <a:ext cx="5598797" cy="1224737"/>
+          </a:xfrm>
+          <a:prstGeom prst="rect">
+            <a:avLst/>
+          </a:prstGeom>
+        </p:spPr>
+      </p:pic>
+      <p:pic>
+        <p:nvPicPr>
+          <p:cNvPr id="8" name="Picture 7" descr="A computer screen shot of a code&#10;&#10;Description automatically generated">
+            <a:extLst>
+              <a:ext uri="{FF2B5EF4-FFF2-40B4-BE49-F238E27FC236}">
+                <a16:creationId xmlns:a16="http://schemas.microsoft.com/office/drawing/2014/main" id="{2DFDFAAF-FB7C-32CC-483F-CD3206A4563C}"/>
+              </a:ext>
+            </a:extLst>
+          </p:cNvPr>
+          <p:cNvPicPr>
+            <a:picLocks noChangeAspect="1"/>
+          </p:cNvPicPr>
+          <p:nvPr/>
+        </p:nvPicPr>
+        <p:blipFill>
+          <a:blip r:embed="rId3">
+            <a:extLst>
+              <a:ext uri="{28A0092B-C50C-407E-A947-70E740481C1C}">
+                <a14:useLocalDpi xmlns:a14="http://schemas.microsoft.com/office/drawing/2010/main" val="0"/>
+              </a:ext>
+            </a:extLst>
+          </a:blip>
+          <a:srcRect t="3394" b="5015"/>
+          <a:stretch/>
+        </p:blipFill>
+        <p:spPr>
+          <a:xfrm>
+            <a:off x="7072110" y="2033013"/>
+            <a:ext cx="3662597" cy="1710663"/>
+          </a:xfrm>
+          <a:prstGeom prst="rect">
+            <a:avLst/>
+          </a:prstGeom>
+        </p:spPr>
+      </p:pic>
+      <p:pic>
+        <p:nvPicPr>
+          <p:cNvPr id="12" name="Picture 11" descr="A close-up of numbers&#10;&#10;Description automatically generated">
+            <a:extLst>
+              <a:ext uri="{FF2B5EF4-FFF2-40B4-BE49-F238E27FC236}">
+                <a16:creationId xmlns:a16="http://schemas.microsoft.com/office/drawing/2014/main" id="{0424E0D8-500E-AAB3-1D48-ECCD0ADBBAC0}"/>
+              </a:ext>
+            </a:extLst>
+          </p:cNvPr>
+          <p:cNvPicPr>
+            <a:picLocks noChangeAspect="1"/>
+          </p:cNvPicPr>
+          <p:nvPr/>
+        </p:nvPicPr>
+        <p:blipFill>
+          <a:blip r:embed="rId4">
+            <a:extLst>
+              <a:ext uri="{28A0092B-C50C-407E-A947-70E740481C1C}">
+                <a14:useLocalDpi xmlns:a14="http://schemas.microsoft.com/office/drawing/2010/main" val="0"/>
+              </a:ext>
+            </a:extLst>
+          </a:blip>
+          <a:stretch>
+            <a:fillRect/>
+          </a:stretch>
+        </p:blipFill>
+        <p:spPr>
+          <a:xfrm>
+            <a:off x="965289" y="3755571"/>
+            <a:ext cx="7297420" cy="1494652"/>
+          </a:xfrm>
+          <a:prstGeom prst="rect">
+            <a:avLst/>
+          </a:prstGeom>
+        </p:spPr>
+      </p:pic>
+      <p:cxnSp>
+        <p:nvCxnSpPr>
+          <p:cNvPr id="16" name="Connector: Elbow 15">
+            <a:extLst>
+              <a:ext uri="{FF2B5EF4-FFF2-40B4-BE49-F238E27FC236}">
+                <a16:creationId xmlns:a16="http://schemas.microsoft.com/office/drawing/2014/main" id="{62B81CC2-4152-48AA-7495-CFC333012573}"/>
+              </a:ext>
+            </a:extLst>
+          </p:cNvPr>
+          <p:cNvCxnSpPr>
+            <a:cxnSpLocks/>
+            <a:stCxn id="6" idx="3"/>
+            <a:endCxn id="8" idx="0"/>
+          </p:cNvCxnSpPr>
+          <p:nvPr/>
+        </p:nvCxnSpPr>
+        <p:spPr>
+          <a:xfrm>
+            <a:off x="6564086" y="1805035"/>
+            <a:ext cx="2339323" cy="227978"/>
+          </a:xfrm>
+          <a:prstGeom prst="bentConnector2">
+            <a:avLst/>
+          </a:prstGeom>
+          <a:ln>
+            <a:tailEnd type="triangle"/>
+          </a:ln>
+        </p:spPr>
+        <p:style>
+          <a:lnRef idx="1">
+            <a:schemeClr val="accent1"/>
+          </a:lnRef>
+          <a:fillRef idx="0">
+            <a:schemeClr val="accent1"/>
+          </a:fillRef>
+          <a:effectRef idx="0">
+            <a:schemeClr val="accent1"/>
+          </a:effectRef>
+          <a:fontRef idx="minor">
+            <a:schemeClr val="tx1"/>
+          </a:fontRef>
+        </p:style>
+      </p:cxnSp>
+      <p:cxnSp>
+        <p:nvCxnSpPr>
+          <p:cNvPr id="21" name="Connector: Elbow 20">
+            <a:extLst>
+              <a:ext uri="{FF2B5EF4-FFF2-40B4-BE49-F238E27FC236}">
+                <a16:creationId xmlns:a16="http://schemas.microsoft.com/office/drawing/2014/main" id="{84925D30-4AFB-F1FA-FABA-CDFD522D29B4}"/>
+              </a:ext>
+            </a:extLst>
+          </p:cNvPr>
+          <p:cNvCxnSpPr>
+            <a:cxnSpLocks/>
+            <a:stCxn id="8" idx="2"/>
+            <a:endCxn id="12" idx="3"/>
+          </p:cNvCxnSpPr>
+          <p:nvPr/>
+        </p:nvCxnSpPr>
+        <p:spPr>
+          <a:xfrm rot="5400000">
+            <a:off x="8203449" y="3802936"/>
+            <a:ext cx="759221" cy="640700"/>
+          </a:xfrm>
+          <a:prstGeom prst="bentConnector2">
+            <a:avLst/>
+          </a:prstGeom>
+          <a:ln>
+            <a:tailEnd type="triangle"/>
+          </a:ln>
+        </p:spPr>
+        <p:style>
+          <a:lnRef idx="1">
+            <a:schemeClr val="accent1"/>
+          </a:lnRef>
+          <a:fillRef idx="0">
+            <a:schemeClr val="accent1"/>
+          </a:fillRef>
+          <a:effectRef idx="0">
+            <a:schemeClr val="accent1"/>
+          </a:effectRef>
+          <a:fontRef idx="minor">
+            <a:schemeClr val="tx1"/>
+          </a:fontRef>
+        </p:style>
+      </p:cxnSp>
+      <p:sp>
+        <p:nvSpPr>
+          <p:cNvPr id="23" name="TextBox 22">
+            <a:extLst>
+              <a:ext uri="{FF2B5EF4-FFF2-40B4-BE49-F238E27FC236}">
+                <a16:creationId xmlns:a16="http://schemas.microsoft.com/office/drawing/2014/main" id="{CA32AFE6-B17F-1C2C-96D5-2C8572B3009E}"/>
+              </a:ext>
+            </a:extLst>
+          </p:cNvPr>
+          <p:cNvSpPr txBox="1"/>
+          <p:nvPr/>
+        </p:nvSpPr>
+        <p:spPr>
+          <a:xfrm>
+            <a:off x="7456651" y="1423111"/>
+            <a:ext cx="2467407" cy="369332"/>
+          </a:xfrm>
+          <a:prstGeom prst="rect">
+            <a:avLst/>
+          </a:prstGeom>
+          <a:noFill/>
+        </p:spPr>
+        <p:txBody>
+          <a:bodyPr wrap="none" rtlCol="0">
+            <a:spAutoFit/>
+          </a:bodyPr>
+          <a:lstStyle/>
+          <a:p>
+            <a:r>
+              <a:rPr lang="en-GB" dirty="0"/>
+              <a:t>Creating SMA Column</a:t>
+            </a:r>
           </a:p>
         </p:txBody>
       </p:sp>
@@ -5282,13 +5450,6 @@
   <p:clrMapOvr>
     <a:masterClrMapping/>
   </p:clrMapOvr>
-  <p:timing>
-    <p:tnLst>
-      <p:par>
-        <p:cTn id="1" dur="indefinite" restart="never" nodeType="tmRoot"/>
-      </p:par>
-    </p:tnLst>
-  </p:timing>
 </p:sld>
 </file>
 
@@ -5314,7 +5475,7 @@
           <p:cNvPr id="2" name="Subtitle 1">
             <a:extLst>
               <a:ext uri="{FF2B5EF4-FFF2-40B4-BE49-F238E27FC236}">
-                <a16:creationId xmlns:a16="http://schemas.microsoft.com/office/drawing/2014/main" xmlns="" id="{7D9D8228-727F-1E46-B5AD-91D158B8255E}"/>
+                <a16:creationId xmlns:a16="http://schemas.microsoft.com/office/drawing/2014/main" id="{7D9D8228-727F-1E46-B5AD-91D158B8255E}"/>
               </a:ext>
             </a:extLst>
           </p:cNvPr>
@@ -5369,28 +5530,6 @@
               <a:t> </a:t>
             </a:r>
             <a:r>
-              <a:rPr lang="en-US" sz="2400" dirty="0" smtClean="0">
-                <a:solidFill>
-                  <a:schemeClr val="accent2">
-                    <a:lumMod val="60000"/>
-                    <a:lumOff val="40000"/>
-                  </a:schemeClr>
-                </a:solidFill>
-              </a:rPr>
-              <a:t>(DS327- </a:t>
-            </a:r>
-            <a:r>
-              <a:rPr lang="en-US" sz="2400" dirty="0" smtClean="0">
-                <a:solidFill>
-                  <a:schemeClr val="accent2">
-                    <a:lumMod val="60000"/>
-                    <a:lumOff val="40000"/>
-                  </a:schemeClr>
-                </a:solidFill>
-              </a:rPr>
-              <a:t>005380.KS</a:t>
-            </a:r>
-            <a:r>
               <a:rPr lang="en-US" sz="2400" dirty="0">
                 <a:solidFill>
                   <a:schemeClr val="accent2">
@@ -5399,16 +5538,8 @@
                   </a:schemeClr>
                 </a:solidFill>
               </a:rPr>
-              <a:t>)</a:t>
-            </a:r>
-            <a:endParaRPr lang="en-US" sz="2400" dirty="0">
-              <a:solidFill>
-                <a:schemeClr val="accent2">
-                  <a:lumMod val="60000"/>
-                  <a:lumOff val="40000"/>
-                </a:schemeClr>
-              </a:solidFill>
-            </a:endParaRPr>
+              <a:t>(DS327- 005380.KS)</a:t>
+            </a:r>
           </a:p>
         </p:txBody>
       </p:sp>
@@ -5417,7 +5548,7 @@
           <p:cNvPr id="3" name="Footer Placeholder 2">
             <a:extLst>
               <a:ext uri="{FF2B5EF4-FFF2-40B4-BE49-F238E27FC236}">
-                <a16:creationId xmlns:a16="http://schemas.microsoft.com/office/drawing/2014/main" xmlns="" id="{00EBC183-8AA5-EC44-9987-D65F5C1892A1}"/>
+                <a16:creationId xmlns:a16="http://schemas.microsoft.com/office/drawing/2014/main" id="{00EBC183-8AA5-EC44-9987-D65F5C1892A1}"/>
               </a:ext>
             </a:extLst>
           </p:cNvPr>
@@ -5440,45 +5571,8 @@
           <a:p>
             <a:r>
               <a:rPr lang="en-GB" dirty="0"/>
-              <a:t>7COM1079-2024  Student Group No: </a:t>
-            </a:r>
-            <a:r>
-              <a:rPr lang="en-GB" dirty="0"/>
-              <a:t>A246                 </a:t>
-            </a:r>
-            <a:r>
-              <a:rPr lang="en-GB" dirty="0"/>
-              <a:t>Names of Student Group Attendees: </a:t>
-            </a:r>
-            <a:r>
-              <a:rPr lang="en-GB" dirty="0"/>
-              <a:t>Abinaya Sri Arunkumar							     </a:t>
-            </a:r>
-            <a:r>
-              <a:rPr lang="en-GB" dirty="0" smtClean="0"/>
-              <a:t>                                    </a:t>
-            </a:r>
-            <a:r>
-              <a:rPr lang="en-GB" dirty="0"/>
-              <a:t>John Paul Chirstopher Yesudian							  </a:t>
-            </a:r>
-            <a:r>
-              <a:rPr lang="en-GB" dirty="0" smtClean="0"/>
-              <a:t>                      </a:t>
-            </a:r>
-            <a:r>
-              <a:rPr lang="en-GB" dirty="0"/>
-              <a:t>Vishnuvardhan Parasuraman							     </a:t>
-            </a:r>
-            <a:r>
-              <a:rPr lang="en-GB" dirty="0" smtClean="0"/>
-              <a:t>                   </a:t>
-            </a:r>
-            <a:r>
-              <a:rPr lang="en-GB" dirty="0"/>
-              <a:t>Mahesh Ramasubramania</a:t>
-            </a:r>
-            <a:endParaRPr lang="en-GB" dirty="0"/>
+              <a:t>7COM1079-2024  Student Group No: A246                 Names of Student Group Attendees: Abinaya Sri Arunkumar							                                         John Paul Chirstopher Yesudian							                        Vishnuvardhan Parasuraman							                        Mahesh Ramasubramania</a:t>
+            </a:r>
           </a:p>
         </p:txBody>
       </p:sp>
@@ -5487,7 +5581,7 @@
           <p:cNvPr id="4" name="Slide Number Placeholder 3">
             <a:extLst>
               <a:ext uri="{FF2B5EF4-FFF2-40B4-BE49-F238E27FC236}">
-                <a16:creationId xmlns:a16="http://schemas.microsoft.com/office/drawing/2014/main" xmlns="" id="{CC9D9611-42EE-7840-81EE-DD6B1A99CD7B}"/>
+                <a16:creationId xmlns:a16="http://schemas.microsoft.com/office/drawing/2014/main" id="{CC9D9611-42EE-7840-81EE-DD6B1A99CD7B}"/>
               </a:ext>
             </a:extLst>
           </p:cNvPr>
@@ -5521,7 +5615,7 @@
           <p:cNvPr id="5" name="Title 4">
             <a:extLst>
               <a:ext uri="{FF2B5EF4-FFF2-40B4-BE49-F238E27FC236}">
-                <a16:creationId xmlns:a16="http://schemas.microsoft.com/office/drawing/2014/main" xmlns="" id="{B3FA3829-F12C-214D-8FBA-7E1A740F65CA}"/>
+                <a16:creationId xmlns:a16="http://schemas.microsoft.com/office/drawing/2014/main" id="{B3FA3829-F12C-214D-8FBA-7E1A740F65CA}"/>
               </a:ext>
             </a:extLst>
           </p:cNvPr>
@@ -5549,81 +5643,18 @@
                 <a:spcPct val="100000"/>
               </a:lnSpc>
             </a:pPr>
-            <a:r>
-              <a:rPr lang="en-US" sz="2400" b="0" dirty="0" smtClean="0">
-                <a:latin typeface="Calibri"/>
-                <a:cs typeface="Calibri"/>
-              </a:rPr>
-              <a:t/>
-            </a:r>
             <a:br>
-              <a:rPr lang="en-US" sz="2400" b="0" dirty="0" smtClean="0">
+              <a:rPr lang="en-US" sz="2400" b="0" dirty="0">
                 <a:latin typeface="Calibri"/>
                 <a:cs typeface="Calibri"/>
               </a:rPr>
             </a:br>
             <a:r>
-              <a:rPr lang="en-US" sz="2400" b="0" dirty="0" smtClean="0">
-                <a:latin typeface="Calibri"/>
-                <a:cs typeface="Calibri"/>
-              </a:rPr>
-              <a:t>This </a:t>
-            </a:r>
-            <a:r>
               <a:rPr lang="en-US" sz="2400" b="0" dirty="0">
                 <a:latin typeface="Calibri"/>
                 <a:cs typeface="Calibri"/>
               </a:rPr>
-              <a:t>dataset is interesting to us because Hyundai's stock data provides insights into </a:t>
-            </a:r>
-            <a:r>
-              <a:rPr lang="en-US" sz="2400" b="0" dirty="0">
-                <a:latin typeface="Calibri"/>
-                <a:cs typeface="Calibri"/>
-              </a:rPr>
-              <a:t>G</a:t>
-            </a:r>
-            <a:r>
-              <a:rPr lang="en-US" sz="2400" b="0" dirty="0" smtClean="0">
-                <a:latin typeface="Calibri"/>
-                <a:cs typeface="Calibri"/>
-              </a:rPr>
-              <a:t>lobal </a:t>
-            </a:r>
-            <a:r>
-              <a:rPr lang="en-US" sz="2400" b="0" dirty="0">
-                <a:latin typeface="Calibri"/>
-                <a:cs typeface="Calibri"/>
-              </a:rPr>
-              <a:t>financial market </a:t>
-            </a:r>
-            <a:r>
-              <a:rPr lang="en-US" sz="2400" b="0" dirty="0">
-                <a:latin typeface="Calibri"/>
-                <a:cs typeface="Calibri"/>
-              </a:rPr>
-              <a:t>A</a:t>
-            </a:r>
-            <a:r>
-              <a:rPr lang="en-US" sz="2400" b="0" dirty="0" smtClean="0">
-                <a:latin typeface="Calibri"/>
-                <a:cs typeface="Calibri"/>
-              </a:rPr>
-              <a:t>nalysis</a:t>
-            </a:r>
-            <a:r>
-              <a:rPr lang="en-US" sz="2400" b="0" dirty="0">
-                <a:latin typeface="Calibri"/>
-                <a:cs typeface="Calibri"/>
-              </a:rPr>
-              <a:t>.</a:t>
-            </a:r>
-            <a:r>
-              <a:rPr lang="en-US" sz="2400" b="0" dirty="0">
-                <a:latin typeface="Calibri" panose="020F0502020204030204" pitchFamily="34" charset="0"/>
-                <a:cs typeface="Calibri" panose="020F0502020204030204" pitchFamily="34" charset="0"/>
-              </a:rPr>
-              <a:t/>
+              <a:t>This dataset is interesting to us because Hyundai's stock data provides insights into Global financial market Analysis.</a:t>
             </a:r>
             <a:br>
               <a:rPr lang="en-US" sz="2400" b="0" dirty="0">
@@ -5631,26 +5662,12 @@
                 <a:cs typeface="Calibri" panose="020F0502020204030204" pitchFamily="34" charset="0"/>
               </a:rPr>
             </a:br>
-            <a:r>
-              <a:rPr lang="en-US" sz="2400" b="0" dirty="0">
-                <a:latin typeface="Calibri" panose="020F0502020204030204" pitchFamily="34" charset="0"/>
-                <a:cs typeface="Calibri" panose="020F0502020204030204" pitchFamily="34" charset="0"/>
-              </a:rPr>
-              <a:t/>
-            </a:r>
             <a:br>
               <a:rPr lang="en-US" sz="2400" b="0" dirty="0">
                 <a:latin typeface="Calibri" panose="020F0502020204030204" pitchFamily="34" charset="0"/>
                 <a:cs typeface="Calibri" panose="020F0502020204030204" pitchFamily="34" charset="0"/>
               </a:rPr>
             </a:br>
-            <a:r>
-              <a:rPr lang="en-US" sz="2400" b="0" dirty="0">
-                <a:latin typeface="Calibri" panose="020F0502020204030204" pitchFamily="34" charset="0"/>
-                <a:cs typeface="Calibri" panose="020F0502020204030204" pitchFamily="34" charset="0"/>
-              </a:rPr>
-              <a:t/>
-            </a:r>
             <a:br>
               <a:rPr lang="en-US" sz="2400" b="0" dirty="0">
                 <a:latin typeface="Calibri" panose="020F0502020204030204" pitchFamily="34" charset="0"/>
@@ -5662,28 +5679,7 @@
                 <a:latin typeface="Calibri"/>
                 <a:cs typeface="Calibri"/>
               </a:rPr>
-              <a:t>Our  Independent variable </a:t>
-            </a:r>
-            <a:r>
-              <a:rPr lang="en-US" sz="2400" b="0" dirty="0" smtClean="0">
-                <a:latin typeface="Calibri"/>
-                <a:cs typeface="Calibri"/>
-              </a:rPr>
-              <a:t>is CLOSE</a:t>
-            </a:r>
-            <a:r>
-              <a:rPr lang="en-US" sz="2400" b="0" dirty="0" smtClean="0">
-                <a:latin typeface="Calibri"/>
-                <a:cs typeface="Calibri"/>
-              </a:rPr>
-              <a:t> (SIMPLE MOVING AVERAGE)</a:t>
-            </a:r>
-            <a:r>
-              <a:rPr lang="en-US" sz="2400" b="0" dirty="0">
-                <a:latin typeface="Calibri" panose="020F0502020204030204" pitchFamily="34" charset="0"/>
-                <a:cs typeface="Calibri" panose="020F0502020204030204" pitchFamily="34" charset="0"/>
-              </a:rPr>
-              <a:t/>
+              <a:t>Our  Independent variable is CLOSE (SIMPLE MOVING AVERAGE)</a:t>
             </a:r>
             <a:br>
               <a:rPr lang="en-US" sz="2400" b="0" dirty="0">
@@ -5706,28 +5702,7 @@
                 <a:latin typeface="Calibri"/>
                 <a:cs typeface="Calibri"/>
               </a:rPr>
-              <a:t>This  Independent variable datatype is </a:t>
-            </a:r>
-            <a:r>
-              <a:rPr lang="en-US" sz="2400" b="0" dirty="0">
-                <a:latin typeface="Calibri"/>
-                <a:cs typeface="Calibri"/>
-              </a:rPr>
-              <a:t>:</a:t>
-            </a:r>
-            <a:r>
-              <a:rPr lang="en-US" sz="2400" b="0" dirty="0" smtClean="0">
-                <a:latin typeface="Calibri"/>
-                <a:cs typeface="Calibri"/>
-              </a:rPr>
-              <a:t> INTERVAL</a:t>
-            </a:r>
-            <a:r>
-              <a:rPr lang="en-US" sz="2400" b="0" dirty="0">
-                <a:latin typeface="Calibri" panose="020F0502020204030204" pitchFamily="34" charset="0"/>
-                <a:cs typeface="Calibri" panose="020F0502020204030204" pitchFamily="34" charset="0"/>
-              </a:rPr>
-              <a:t/>
+              <a:t>This  Independent variable datatype is : INTERVAL</a:t>
             </a:r>
             <a:br>
               <a:rPr lang="en-US" sz="2400" b="0" dirty="0">
@@ -5740,21 +5715,7 @@
                 <a:latin typeface="Calibri"/>
                 <a:cs typeface="Calibri"/>
               </a:rPr>
-              <a:t>Our Dependent variable is: </a:t>
-            </a:r>
-            <a:r>
-              <a:rPr lang="en-US" sz="2400" b="0" dirty="0" smtClean="0">
-                <a:latin typeface="Calibri"/>
-                <a:cs typeface="Calibri"/>
-              </a:rPr>
-              <a:t>VOLUME</a:t>
-            </a:r>
-            <a:r>
-              <a:rPr lang="en-US" sz="2400" b="0" dirty="0">
-                <a:latin typeface="Calibri" panose="020F0502020204030204" pitchFamily="34" charset="0"/>
-                <a:cs typeface="Calibri" panose="020F0502020204030204" pitchFamily="34" charset="0"/>
-              </a:rPr>
-              <a:t/>
+              <a:t>Our Dependent variable is: VOLUME</a:t>
             </a:r>
             <a:br>
               <a:rPr lang="en-US" sz="2400" b="0" dirty="0">
@@ -5777,21 +5738,7 @@
                 <a:latin typeface="Calibri"/>
                 <a:cs typeface="Calibri"/>
               </a:rPr>
-              <a:t>This Dependent variable datatype is  </a:t>
-            </a:r>
-            <a:r>
-              <a:rPr lang="en-US" sz="2400" b="0" dirty="0" smtClean="0">
-                <a:latin typeface="Calibri"/>
-                <a:cs typeface="Calibri"/>
-              </a:rPr>
-              <a:t>: </a:t>
-            </a:r>
-            <a:r>
-              <a:rPr lang="en-US" sz="2400" b="0" dirty="0">
-                <a:latin typeface="Calibri"/>
-                <a:cs typeface="Calibri"/>
-              </a:rPr>
-              <a:t>INTERVAL</a:t>
+              <a:t>This Dependent variable datatype is  : INTERVAL</a:t>
             </a:r>
             <a:endParaRPr lang="en-US" sz="2400" b="0" dirty="0">
               <a:solidFill>
@@ -5813,13 +5760,6 @@
   <p:clrMapOvr>
     <a:masterClrMapping/>
   </p:clrMapOvr>
-  <p:timing>
-    <p:tnLst>
-      <p:par>
-        <p:cTn id="1" dur="indefinite" restart="never" nodeType="tmRoot"/>
-      </p:par>
-    </p:tnLst>
-  </p:timing>
 </p:sld>
 </file>
 
@@ -5845,7 +5785,7 @@
           <p:cNvPr id="2" name="Subtitle 1">
             <a:extLst>
               <a:ext uri="{FF2B5EF4-FFF2-40B4-BE49-F238E27FC236}">
-                <a16:creationId xmlns:a16="http://schemas.microsoft.com/office/drawing/2014/main" xmlns="" id="{8E3CD731-5ACF-B002-247D-243F6E2149EC}"/>
+                <a16:creationId xmlns:a16="http://schemas.microsoft.com/office/drawing/2014/main" id="{8E3CD731-5ACF-B002-247D-243F6E2149EC}"/>
               </a:ext>
             </a:extLst>
           </p:cNvPr>
@@ -5873,11 +5813,7 @@
             </a:pPr>
             <a:r>
               <a:rPr lang="en-GB" dirty="0"/>
-              <a:t>Our Research Question </a:t>
-            </a:r>
-            <a:r>
-              <a:rPr lang="en-GB" dirty="0" smtClean="0"/>
-              <a:t>is</a:t>
+              <a:t>Our Research Question is</a:t>
             </a:r>
             <a:endParaRPr lang="en-GB" sz="1800" dirty="0">
               <a:solidFill>
@@ -5892,7 +5828,7 @@
           <p:cNvPr id="3" name="Footer Placeholder 2">
             <a:extLst>
               <a:ext uri="{FF2B5EF4-FFF2-40B4-BE49-F238E27FC236}">
-                <a16:creationId xmlns:a16="http://schemas.microsoft.com/office/drawing/2014/main" xmlns="" id="{3C4D431B-7665-75B0-2D73-5BD588DCB766}"/>
+                <a16:creationId xmlns:a16="http://schemas.microsoft.com/office/drawing/2014/main" id="{3C4D431B-7665-75B0-2D73-5BD588DCB766}"/>
               </a:ext>
             </a:extLst>
           </p:cNvPr>
@@ -5910,13 +5846,8 @@
           <a:p>
             <a:r>
               <a:rPr lang="en-GB" dirty="0"/>
-              <a:t>PRE 7COM1079-2024  Student Group No: </a:t>
-            </a:r>
-            <a:r>
-              <a:rPr lang="en-GB" dirty="0"/>
-              <a:t>A246 </a:t>
-            </a:r>
-            <a:endParaRPr lang="en-GB" dirty="0"/>
+              <a:t>PRE 7COM1079-2024  Student Group No: A246 </a:t>
+            </a:r>
           </a:p>
         </p:txBody>
       </p:sp>
@@ -5925,7 +5856,7 @@
           <p:cNvPr id="4" name="Slide Number Placeholder 3">
             <a:extLst>
               <a:ext uri="{FF2B5EF4-FFF2-40B4-BE49-F238E27FC236}">
-                <a16:creationId xmlns:a16="http://schemas.microsoft.com/office/drawing/2014/main" xmlns="" id="{1625FA15-B17F-387B-E383-5505647ABB89}"/>
+                <a16:creationId xmlns:a16="http://schemas.microsoft.com/office/drawing/2014/main" id="{1625FA15-B17F-387B-E383-5505647ABB89}"/>
               </a:ext>
             </a:extLst>
           </p:cNvPr>
@@ -5959,7 +5890,7 @@
           <p:cNvPr id="5" name="Title 4">
             <a:extLst>
               <a:ext uri="{FF2B5EF4-FFF2-40B4-BE49-F238E27FC236}">
-                <a16:creationId xmlns:a16="http://schemas.microsoft.com/office/drawing/2014/main" xmlns="" id="{3440DA25-F620-152B-DE9E-776F7B74DFF0}"/>
+                <a16:creationId xmlns:a16="http://schemas.microsoft.com/office/drawing/2014/main" id="{3440DA25-F620-152B-DE9E-776F7B74DFF0}"/>
               </a:ext>
             </a:extLst>
           </p:cNvPr>
@@ -5988,34 +5919,7 @@
               </a:lnSpc>
             </a:pPr>
             <a:r>
-              <a:rPr lang="en-IE" sz="2400" dirty="0">
-                <a:effectLst/>
-                <a:latin typeface="Calibri" panose="020F0502020204030204" pitchFamily="34" charset="0"/>
-                <a:ea typeface="Calibri" panose="020F0502020204030204" pitchFamily="34" charset="0"/>
-                <a:cs typeface="Times New Roman" panose="02020603050405020304" pitchFamily="18" charset="0"/>
-              </a:rPr>
-              <a:t>Template </a:t>
-            </a:r>
-            <a:r>
-              <a:rPr lang="en-IE" sz="2400" baseline="30000" dirty="0">
-                <a:effectLst/>
-                <a:latin typeface="Calibri" panose="020F0502020204030204" pitchFamily="34" charset="0"/>
-                <a:ea typeface="Calibri" panose="020F0502020204030204" pitchFamily="34" charset="0"/>
-                <a:cs typeface="Times New Roman" panose="02020603050405020304" pitchFamily="18" charset="0"/>
-              </a:rPr>
-              <a:t>1</a:t>
-            </a:r>
-            <a:r>
-              <a:rPr lang="en-IE" sz="2400" dirty="0">
-                <a:effectLst/>
-                <a:latin typeface="Calibri" panose="020F0502020204030204" pitchFamily="34" charset="0"/>
-                <a:ea typeface="Calibri" panose="020F0502020204030204" pitchFamily="34" charset="0"/>
-                <a:cs typeface="Times New Roman" panose="02020603050405020304" pitchFamily="18" charset="0"/>
-              </a:rPr>
-              <a:t>: </a:t>
-            </a:r>
-            <a:r>
-              <a:rPr lang="en-IE" sz="2400" b="0" dirty="0">
+              <a:rPr lang="en-IE" sz="2800" b="0" dirty="0">
                 <a:effectLst/>
                 <a:latin typeface="Calibri" panose="020F0502020204030204" pitchFamily="34" charset="0"/>
                 <a:ea typeface="Calibri" panose="020F0502020204030204" pitchFamily="34" charset="0"/>
@@ -6024,7 +5928,7 @@
               <a:t>Interval/Ordinal vs Interval/Ordinal: “Is there a correlation between </a:t>
             </a:r>
             <a:r>
-              <a:rPr lang="en-IE" sz="2400" b="0" dirty="0" smtClean="0">
+              <a:rPr lang="en-IE" sz="2800" dirty="0">
                 <a:solidFill>
                   <a:srgbClr val="0070C0"/>
                 </a:solidFill>
@@ -6032,19 +5936,10 @@
                 <a:ea typeface="Calibri" panose="020F0502020204030204" pitchFamily="34" charset="0"/>
                 <a:cs typeface="Times New Roman" panose="02020603050405020304" pitchFamily="18" charset="0"/>
               </a:rPr>
-              <a:t>simple moving average of Close </a:t>
-            </a:r>
-            <a:r>
-              <a:rPr lang="en-IE" sz="2400" b="0" dirty="0" smtClean="0">
-                <a:effectLst/>
-                <a:latin typeface="Calibri" panose="020F0502020204030204" pitchFamily="34" charset="0"/>
-                <a:ea typeface="Calibri" panose="020F0502020204030204" pitchFamily="34" charset="0"/>
-                <a:cs typeface="Times New Roman" panose="02020603050405020304" pitchFamily="18" charset="0"/>
-              </a:rPr>
-              <a:t>and </a:t>
-            </a:r>
-            <a:r>
-              <a:rPr lang="en-IE" sz="2400" b="0" dirty="0" smtClean="0">
+              <a:t>Simple Moving Average of Close</a:t>
+            </a:r>
+            <a:r>
+              <a:rPr lang="en-IE" sz="2800" b="0" dirty="0">
                 <a:solidFill>
                   <a:srgbClr val="0070C0"/>
                 </a:solidFill>
@@ -6052,43 +5947,56 @@
                 <a:ea typeface="Calibri" panose="020F0502020204030204" pitchFamily="34" charset="0"/>
                 <a:cs typeface="Times New Roman" panose="02020603050405020304" pitchFamily="18" charset="0"/>
               </a:rPr>
-              <a:t>volume </a:t>
-            </a:r>
-            <a:r>
-              <a:rPr lang="en-IE" sz="2400" dirty="0">
+              <a:t> </a:t>
+            </a:r>
+            <a:r>
+              <a:rPr lang="en-IE" sz="2800" b="0" dirty="0">
                 <a:effectLst/>
                 <a:latin typeface="Calibri" panose="020F0502020204030204" pitchFamily="34" charset="0"/>
                 <a:ea typeface="Calibri" panose="020F0502020204030204" pitchFamily="34" charset="0"/>
                 <a:cs typeface="Times New Roman" panose="02020603050405020304" pitchFamily="18" charset="0"/>
               </a:rPr>
-              <a:t/>
+              <a:t>and </a:t>
+            </a:r>
+            <a:r>
+              <a:rPr lang="en-IE" sz="2800" dirty="0">
+                <a:solidFill>
+                  <a:srgbClr val="0070C0"/>
+                </a:solidFill>
+                <a:latin typeface="Calibri" panose="020F0502020204030204" pitchFamily="34" charset="0"/>
+                <a:ea typeface="Calibri" panose="020F0502020204030204" pitchFamily="34" charset="0"/>
+                <a:cs typeface="Times New Roman" panose="02020603050405020304" pitchFamily="18" charset="0"/>
+              </a:rPr>
+              <a:t>Volume</a:t>
+            </a:r>
+            <a:r>
+              <a:rPr lang="en-IE" sz="2800" b="0" dirty="0">
+                <a:solidFill>
+                  <a:srgbClr val="0070C0"/>
+                </a:solidFill>
+                <a:latin typeface="Calibri" panose="020F0502020204030204" pitchFamily="34" charset="0"/>
+                <a:ea typeface="Calibri" panose="020F0502020204030204" pitchFamily="34" charset="0"/>
+                <a:cs typeface="Times New Roman" panose="02020603050405020304" pitchFamily="18" charset="0"/>
+              </a:rPr>
+              <a:t> </a:t>
             </a:r>
             <a:br>
-              <a:rPr lang="en-IE" sz="2400" dirty="0">
+              <a:rPr lang="en-IE" sz="2800" dirty="0">
                 <a:effectLst/>
                 <a:latin typeface="Calibri" panose="020F0502020204030204" pitchFamily="34" charset="0"/>
                 <a:ea typeface="Calibri" panose="020F0502020204030204" pitchFamily="34" charset="0"/>
                 <a:cs typeface="Times New Roman" panose="02020603050405020304" pitchFamily="18" charset="0"/>
               </a:rPr>
             </a:br>
-            <a:r>
-              <a:rPr lang="en-GB" sz="2400" dirty="0">
-                <a:effectLst/>
-                <a:latin typeface="Calibri" panose="020F0502020204030204" pitchFamily="34" charset="0"/>
-                <a:ea typeface="Calibri" panose="020F0502020204030204" pitchFamily="34" charset="0"/>
-                <a:cs typeface="Times New Roman" panose="02020603050405020304" pitchFamily="18" charset="0"/>
-              </a:rPr>
-              <a:t/>
-            </a:r>
             <a:br>
-              <a:rPr lang="en-GB" sz="2400" dirty="0">
+              <a:rPr lang="en-GB" sz="2800" dirty="0">
                 <a:effectLst/>
                 <a:latin typeface="Calibri" panose="020F0502020204030204" pitchFamily="34" charset="0"/>
                 <a:ea typeface="Calibri" panose="020F0502020204030204" pitchFamily="34" charset="0"/>
                 <a:cs typeface="Times New Roman" panose="02020603050405020304" pitchFamily="18" charset="0"/>
               </a:rPr>
             </a:br>
-            <a:endParaRPr lang="en-GB" sz="2400" dirty="0">
+            <a:endParaRPr lang="en-GB" sz="2800" dirty="0">
               <a:solidFill>
                 <a:srgbClr val="FF0000"/>
               </a:solidFill>
@@ -6106,13 +6014,6 @@
   <p:clrMapOvr>
     <a:masterClrMapping/>
   </p:clrMapOvr>
-  <p:timing>
-    <p:tnLst>
-      <p:par>
-        <p:cTn id="1" dur="indefinite" restart="never" nodeType="tmRoot"/>
-      </p:par>
-    </p:tnLst>
-  </p:timing>
 </p:sld>
 </file>
 
@@ -6138,7 +6039,7 @@
           <p:cNvPr id="2" name="Subtitle 1">
             <a:extLst>
               <a:ext uri="{FF2B5EF4-FFF2-40B4-BE49-F238E27FC236}">
-                <a16:creationId xmlns:a16="http://schemas.microsoft.com/office/drawing/2014/main" xmlns="" id="{6B64221B-D6D4-E382-A91A-99FF908D5475}"/>
+                <a16:creationId xmlns:a16="http://schemas.microsoft.com/office/drawing/2014/main" id="{6B64221B-D6D4-E382-A91A-99FF908D5475}"/>
               </a:ext>
             </a:extLst>
           </p:cNvPr>
@@ -6161,404 +6062,202 @@
           </a:bodyPr>
           <a:lstStyle/>
           <a:p>
-            <a:pPr marL="457200" indent="-457200">
-              <a:lnSpc>
-                <a:spcPct val="100000"/>
-              </a:lnSpc>
-              <a:buAutoNum type="arabicPeriod"/>
-            </a:pPr>
-            <a:r>
-              <a:rPr lang="en-GB" sz="2000" b="0" dirty="0" smtClean="0">
-                <a:latin typeface="Arial"/>
-                <a:cs typeface="Arial"/>
-              </a:rPr>
-              <a:t>Null </a:t>
-            </a:r>
-            <a:r>
-              <a:rPr lang="en-GB" sz="2000" b="0" dirty="0">
-                <a:latin typeface="Arial"/>
-                <a:cs typeface="Arial"/>
-              </a:rPr>
-              <a:t>hypothesis (H</a:t>
-            </a:r>
-            <a:r>
-              <a:rPr lang="en-GB" sz="2000" b="0" baseline="-25000" dirty="0">
-                <a:latin typeface="Arial"/>
-                <a:cs typeface="Arial"/>
-              </a:rPr>
-              <a:t>0</a:t>
-            </a:r>
-            <a:r>
-              <a:rPr lang="en-GB" sz="2000" b="0" dirty="0">
-                <a:latin typeface="Arial"/>
-                <a:cs typeface="Arial"/>
-              </a:rPr>
-              <a:t>): There is </a:t>
-            </a:r>
-            <a:r>
-              <a:rPr lang="en-GB" sz="2000" dirty="0">
-                <a:latin typeface="Arial"/>
-                <a:cs typeface="Arial"/>
-              </a:rPr>
-              <a:t>no </a:t>
-            </a:r>
-            <a:r>
-              <a:rPr lang="en-GB" sz="2000" b="0" dirty="0">
-                <a:latin typeface="Arial"/>
-                <a:cs typeface="Arial"/>
-              </a:rPr>
-              <a:t>effect on the population – so you write one of the following:  </a:t>
-            </a:r>
-          </a:p>
-          <a:p>
-            <a:pPr>
+            <a:pPr algn="just">
               <a:lnSpc>
                 <a:spcPct val="100000"/>
               </a:lnSpc>
             </a:pPr>
             <a:r>
-              <a:rPr lang="en-GB" sz="2000" b="0" dirty="0" smtClean="0">
+              <a:rPr lang="en-GB" sz="2400" dirty="0">
                 <a:solidFill>
                   <a:schemeClr val="accent2">
-                    <a:lumMod val="60000"/>
-                    <a:lumOff val="40000"/>
+                    <a:lumMod val="75000"/>
                   </a:schemeClr>
                 </a:solidFill>
-                <a:latin typeface="Arial"/>
+                <a:latin typeface="+mj-lt"/>
                 <a:cs typeface="Arial"/>
               </a:rPr>
-              <a:t>Null </a:t>
-            </a:r>
-            <a:r>
-              <a:rPr lang="en-GB" sz="2000" b="0" dirty="0">
+              <a:t>Null Hypothesis (H</a:t>
+            </a:r>
+            <a:r>
+              <a:rPr lang="en-GB" sz="2400" baseline="-25000" dirty="0">
                 <a:solidFill>
                   <a:schemeClr val="accent2">
-                    <a:lumMod val="60000"/>
-                    <a:lumOff val="40000"/>
+                    <a:lumMod val="75000"/>
                   </a:schemeClr>
                 </a:solidFill>
-                <a:latin typeface="Arial"/>
-                <a:cs typeface="Arial"/>
-              </a:rPr>
-              <a:t>hypothesis (H</a:t>
-            </a:r>
-            <a:r>
-              <a:rPr lang="en-GB" sz="2000" b="0" baseline="-25000" dirty="0">
-                <a:solidFill>
-                  <a:schemeClr val="accent2">
-                    <a:lumMod val="60000"/>
-                    <a:lumOff val="40000"/>
-                  </a:schemeClr>
-                </a:solidFill>
-                <a:latin typeface="Arial"/>
+                <a:latin typeface="+mj-lt"/>
                 <a:cs typeface="Arial"/>
               </a:rPr>
               <a:t>0</a:t>
             </a:r>
             <a:r>
-              <a:rPr lang="en-GB" sz="2000" b="0" dirty="0">
+              <a:rPr lang="en-GB" sz="2400" dirty="0">
                 <a:solidFill>
                   <a:schemeClr val="accent2">
-                    <a:lumMod val="60000"/>
-                    <a:lumOff val="40000"/>
+                    <a:lumMod val="75000"/>
                   </a:schemeClr>
                 </a:solidFill>
-                <a:latin typeface="Arial"/>
+                <a:latin typeface="+mj-lt"/>
                 <a:cs typeface="Arial"/>
               </a:rPr>
-              <a:t>): There is </a:t>
-            </a:r>
-            <a:r>
-              <a:rPr lang="en-GB" sz="2000" dirty="0">
+              <a:t>): There Is No Correlation Between </a:t>
+            </a:r>
+            <a:r>
+              <a:rPr lang="en-US" sz="2400" dirty="0">
                 <a:solidFill>
                   <a:schemeClr val="accent2">
-                    <a:lumMod val="60000"/>
-                    <a:lumOff val="40000"/>
+                    <a:lumMod val="75000"/>
                   </a:schemeClr>
                 </a:solidFill>
-                <a:latin typeface="Arial"/>
-                <a:cs typeface="Arial"/>
-              </a:rPr>
-              <a:t>no</a:t>
-            </a:r>
-            <a:r>
-              <a:rPr lang="en-GB" sz="2000" b="0" dirty="0">
-                <a:solidFill>
-                  <a:schemeClr val="accent2">
-                    <a:lumMod val="60000"/>
-                    <a:lumOff val="40000"/>
-                  </a:schemeClr>
-                </a:solidFill>
-                <a:latin typeface="Arial"/>
-                <a:cs typeface="Arial"/>
-              </a:rPr>
-              <a:t> correlation between </a:t>
-            </a:r>
-            <a:r>
-              <a:rPr lang="en-US" sz="2000" b="0" dirty="0" smtClean="0">
-                <a:solidFill>
-                  <a:schemeClr val="accent2">
-                    <a:lumMod val="60000"/>
-                    <a:lumOff val="40000"/>
-                  </a:schemeClr>
-                </a:solidFill>
-                <a:latin typeface="Calibri"/>
+                <a:latin typeface="+mj-lt"/>
                 <a:cs typeface="Calibri"/>
               </a:rPr>
               <a:t>VOLUME</a:t>
             </a:r>
             <a:r>
-              <a:rPr lang="en-GB" sz="2000" b="0" dirty="0" smtClean="0">
+              <a:rPr lang="en-GB" sz="2400" dirty="0">
                 <a:solidFill>
                   <a:schemeClr val="accent2">
-                    <a:lumMod val="60000"/>
-                    <a:lumOff val="40000"/>
+                    <a:lumMod val="75000"/>
                   </a:schemeClr>
                 </a:solidFill>
-                <a:latin typeface="Arial"/>
+                <a:latin typeface="+mj-lt"/>
                 <a:cs typeface="Arial"/>
               </a:rPr>
-              <a:t> </a:t>
-            </a:r>
-            <a:r>
-              <a:rPr lang="en-GB" sz="2000" b="0" dirty="0" smtClean="0">
+              <a:t> And </a:t>
+            </a:r>
+            <a:r>
+              <a:rPr lang="en-US" sz="2400" dirty="0">
                 <a:solidFill>
                   <a:schemeClr val="accent2">
-                    <a:lumMod val="60000"/>
-                    <a:lumOff val="40000"/>
+                    <a:lumMod val="75000"/>
                   </a:schemeClr>
                 </a:solidFill>
-                <a:latin typeface="Arial"/>
-                <a:cs typeface="Arial"/>
-              </a:rPr>
-              <a:t>and </a:t>
-            </a:r>
-            <a:r>
-              <a:rPr lang="en-US" sz="2000" b="0" dirty="0" smtClean="0">
-                <a:solidFill>
-                  <a:schemeClr val="accent2">
-                    <a:lumMod val="60000"/>
-                    <a:lumOff val="40000"/>
-                  </a:schemeClr>
-                </a:solidFill>
-                <a:latin typeface="Calibri"/>
+                <a:latin typeface="+mj-lt"/>
                 <a:cs typeface="Calibri"/>
               </a:rPr>
               <a:t>INTERVAL</a:t>
             </a:r>
             <a:r>
-              <a:rPr lang="en-GB" sz="2000" b="0" dirty="0" smtClean="0">
+              <a:rPr lang="en-GB" sz="2400" dirty="0">
                 <a:solidFill>
                   <a:schemeClr val="accent2">
-                    <a:lumMod val="60000"/>
-                    <a:lumOff val="40000"/>
+                    <a:lumMod val="75000"/>
                   </a:schemeClr>
                 </a:solidFill>
-                <a:latin typeface="Arial"/>
+                <a:latin typeface="+mj-lt"/>
                 <a:cs typeface="Arial"/>
               </a:rPr>
               <a:t>.</a:t>
             </a:r>
-            <a:endParaRPr lang="en-GB" sz="2000" b="0" dirty="0">
-              <a:solidFill>
-                <a:schemeClr val="accent2">
-                  <a:lumMod val="60000"/>
-                  <a:lumOff val="40000"/>
-                </a:schemeClr>
-              </a:solidFill>
-              <a:latin typeface="Arial"/>
-              <a:cs typeface="Arial"/>
-            </a:endParaRPr>
-          </a:p>
-          <a:p>
-            <a:pPr>
+          </a:p>
+          <a:p>
+            <a:pPr algn="just">
               <a:lnSpc>
                 <a:spcPct val="100000"/>
               </a:lnSpc>
             </a:pPr>
-            <a:r>
-              <a:rPr lang="en-GB" sz="2000" b="0" dirty="0">
-                <a:latin typeface="Arial"/>
-                <a:cs typeface="Arial"/>
-              </a:rPr>
-              <a:t>2. Alternative hypothesis (H</a:t>
-            </a:r>
-            <a:r>
-              <a:rPr lang="en-GB" sz="2000" b="0" baseline="-25000" dirty="0">
-                <a:latin typeface="Arial"/>
-                <a:cs typeface="Arial"/>
-              </a:rPr>
-              <a:t>1</a:t>
-            </a:r>
-            <a:r>
-              <a:rPr lang="en-GB" sz="2000" b="0" dirty="0">
-                <a:latin typeface="Arial"/>
-                <a:cs typeface="Arial"/>
-              </a:rPr>
-              <a:t>):  There appears to be an effect on the population – so you </a:t>
-            </a:r>
-            <a:r>
-              <a:rPr lang="en-GB" sz="2000" b="0" dirty="0" smtClean="0">
-                <a:latin typeface="Arial"/>
-                <a:cs typeface="Arial"/>
-              </a:rPr>
-              <a:t>copy </a:t>
-            </a:r>
-            <a:r>
-              <a:rPr lang="en-GB" sz="2000" b="0" dirty="0">
-                <a:latin typeface="Arial"/>
-                <a:cs typeface="Arial"/>
-              </a:rPr>
-              <a:t>what you wrote for the Null hypothesis but remove the ‘no’ and replace with ‘</a:t>
-            </a:r>
-            <a:r>
-              <a:rPr lang="en-GB" sz="2000" dirty="0">
-                <a:latin typeface="Arial"/>
-                <a:cs typeface="Arial"/>
-              </a:rPr>
-              <a:t>a’  </a:t>
-            </a:r>
-            <a:r>
-              <a:rPr lang="en-GB" sz="2000" b="0" dirty="0">
-                <a:latin typeface="Arial"/>
-                <a:cs typeface="Arial"/>
-              </a:rPr>
-              <a:t>For example:</a:t>
-            </a:r>
-          </a:p>
-          <a:p>
-            <a:pPr>
+            <a:endParaRPr lang="en-GB" sz="2400" dirty="0">
+              <a:solidFill>
+                <a:schemeClr val="accent2">
+                  <a:lumMod val="75000"/>
+                </a:schemeClr>
+              </a:solidFill>
+              <a:latin typeface="+mj-lt"/>
+              <a:cs typeface="Arial"/>
+            </a:endParaRPr>
+          </a:p>
+          <a:p>
+            <a:pPr algn="just">
               <a:lnSpc>
                 <a:spcPct val="100000"/>
               </a:lnSpc>
             </a:pPr>
             <a:r>
-              <a:rPr lang="en-GB" sz="2000" b="0" dirty="0">
+              <a:rPr lang="en-GB" sz="2400" dirty="0">
                 <a:solidFill>
                   <a:schemeClr val="accent2">
-                    <a:lumMod val="60000"/>
-                    <a:lumOff val="40000"/>
+                    <a:lumMod val="75000"/>
                   </a:schemeClr>
                 </a:solidFill>
-                <a:latin typeface="Arial"/>
+                <a:latin typeface="+mj-lt"/>
                 <a:cs typeface="Arial"/>
               </a:rPr>
-              <a:t>Alt hypothesis (H</a:t>
-            </a:r>
-            <a:r>
-              <a:rPr lang="en-GB" sz="2000" b="0" baseline="-25000" dirty="0">
+              <a:t>Alt Hypothesis (H</a:t>
+            </a:r>
+            <a:r>
+              <a:rPr lang="en-GB" sz="2400" baseline="-25000" dirty="0">
                 <a:solidFill>
                   <a:schemeClr val="accent2">
-                    <a:lumMod val="60000"/>
-                    <a:lumOff val="40000"/>
+                    <a:lumMod val="75000"/>
                   </a:schemeClr>
                 </a:solidFill>
-                <a:latin typeface="Arial"/>
+                <a:latin typeface="+mj-lt"/>
                 <a:cs typeface="Arial"/>
               </a:rPr>
               <a:t>1</a:t>
             </a:r>
             <a:r>
-              <a:rPr lang="en-GB" sz="2000" b="0" dirty="0">
+              <a:rPr lang="en-GB" sz="2400" dirty="0">
                 <a:solidFill>
                   <a:schemeClr val="accent2">
-                    <a:lumMod val="60000"/>
-                    <a:lumOff val="40000"/>
+                    <a:lumMod val="75000"/>
                   </a:schemeClr>
                 </a:solidFill>
-                <a:latin typeface="Arial"/>
+                <a:latin typeface="+mj-lt"/>
                 <a:cs typeface="Arial"/>
               </a:rPr>
-              <a:t>): There is </a:t>
-            </a:r>
-            <a:r>
-              <a:rPr lang="en-GB" sz="2000" dirty="0">
+              <a:t>): There Is A Correlation Between </a:t>
+            </a:r>
+            <a:r>
+              <a:rPr lang="en-GB" sz="2400" dirty="0">
                 <a:solidFill>
                   <a:schemeClr val="accent2">
-                    <a:lumMod val="60000"/>
-                    <a:lumOff val="40000"/>
+                    <a:lumMod val="75000"/>
                   </a:schemeClr>
                 </a:solidFill>
-                <a:latin typeface="Arial"/>
-                <a:cs typeface="Arial"/>
-              </a:rPr>
-              <a:t>a</a:t>
-            </a:r>
-            <a:r>
-              <a:rPr lang="en-GB" sz="2000" b="0" dirty="0">
-                <a:solidFill>
-                  <a:schemeClr val="accent2">
-                    <a:lumMod val="60000"/>
-                    <a:lumOff val="40000"/>
-                  </a:schemeClr>
-                </a:solidFill>
-                <a:latin typeface="Arial"/>
-                <a:cs typeface="Arial"/>
-              </a:rPr>
-              <a:t> correlation between </a:t>
-            </a:r>
-            <a:r>
-              <a:rPr lang="en-GB" sz="2000" b="0" dirty="0">
-                <a:solidFill>
-                  <a:schemeClr val="accent2">
-                    <a:lumMod val="60000"/>
-                    <a:lumOff val="40000"/>
-                  </a:schemeClr>
-                </a:solidFill>
-                <a:latin typeface="Calibri"/>
+                <a:latin typeface="+mj-lt"/>
                 <a:cs typeface="Calibri"/>
               </a:rPr>
               <a:t>VOLUME</a:t>
             </a:r>
             <a:r>
-              <a:rPr lang="en-GB" sz="2000" b="0" dirty="0" smtClean="0">
+              <a:rPr lang="en-GB" sz="2400" dirty="0">
                 <a:solidFill>
                   <a:schemeClr val="accent2">
-                    <a:lumMod val="60000"/>
-                    <a:lumOff val="40000"/>
+                    <a:lumMod val="75000"/>
                   </a:schemeClr>
                 </a:solidFill>
-                <a:latin typeface="Arial"/>
+                <a:latin typeface="+mj-lt"/>
                 <a:cs typeface="Arial"/>
               </a:rPr>
-              <a:t> and </a:t>
-            </a:r>
-            <a:r>
-              <a:rPr lang="en-US" sz="2000" b="0" dirty="0" smtClean="0">
+              <a:t> And </a:t>
+            </a:r>
+            <a:r>
+              <a:rPr lang="en-US" sz="2400" dirty="0">
                 <a:solidFill>
                   <a:schemeClr val="accent2">
-                    <a:lumMod val="60000"/>
-                    <a:lumOff val="40000"/>
+                    <a:lumMod val="75000"/>
                   </a:schemeClr>
                 </a:solidFill>
-                <a:latin typeface="Calibri"/>
+                <a:latin typeface="+mj-lt"/>
                 <a:cs typeface="Calibri"/>
               </a:rPr>
               <a:t>INTERVAL</a:t>
             </a:r>
             <a:r>
-              <a:rPr lang="en-GB" sz="2000" b="0" dirty="0" smtClean="0">
+              <a:rPr lang="en-GB" sz="2400" dirty="0">
                 <a:solidFill>
                   <a:schemeClr val="accent2">
-                    <a:lumMod val="60000"/>
-                    <a:lumOff val="40000"/>
+                    <a:lumMod val="75000"/>
                   </a:schemeClr>
                 </a:solidFill>
-                <a:latin typeface="Arial"/>
+                <a:latin typeface="+mj-lt"/>
                 <a:cs typeface="Arial"/>
               </a:rPr>
               <a:t>.</a:t>
             </a:r>
-            <a:endParaRPr lang="en-GB" sz="2000" b="0" dirty="0">
-              <a:solidFill>
-                <a:schemeClr val="accent2">
-                  <a:lumMod val="60000"/>
-                  <a:lumOff val="40000"/>
-                </a:schemeClr>
-              </a:solidFill>
-              <a:latin typeface="Arial"/>
-              <a:cs typeface="Arial"/>
-            </a:endParaRPr>
           </a:p>
         </p:txBody>
       </p:sp>
@@ -6567,7 +6266,7 @@
           <p:cNvPr id="4" name="Slide Number Placeholder 3">
             <a:extLst>
               <a:ext uri="{FF2B5EF4-FFF2-40B4-BE49-F238E27FC236}">
-                <a16:creationId xmlns:a16="http://schemas.microsoft.com/office/drawing/2014/main" xmlns="" id="{FF7EDF94-2B89-A21D-BBC0-E455C2D9893B}"/>
+                <a16:creationId xmlns:a16="http://schemas.microsoft.com/office/drawing/2014/main" id="{FF7EDF94-2B89-A21D-BBC0-E455C2D9893B}"/>
               </a:ext>
             </a:extLst>
           </p:cNvPr>
@@ -6606,13 +6305,6 @@
   <p:clrMapOvr>
     <a:masterClrMapping/>
   </p:clrMapOvr>
-  <p:timing>
-    <p:tnLst>
-      <p:par>
-        <p:cTn id="1" dur="indefinite" restart="never" nodeType="tmRoot"/>
-      </p:par>
-    </p:tnLst>
-  </p:timing>
 </p:sld>
 </file>
 
@@ -7693,20 +7385,20 @@
 </file>
 
 <file path=customXml/item2.xml><?xml version="1.0" encoding="utf-8"?>
+<p:properties xmlns:p="http://schemas.microsoft.com/office/2006/metadata/properties" xmlns:xsi="http://www.w3.org/2001/XMLSchema-instance" xmlns:pc="http://schemas.microsoft.com/office/infopath/2007/PartnerControls">
+  <documentManagement>
+    <Information xmlns="4ad138b4-2b68-4b70-945d-07f8f18b1c9a" xsi:nil="true"/>
+  </documentManagement>
+</p:properties>
+</file>
+
+<file path=customXml/item3.xml><?xml version="1.0" encoding="utf-8"?>
 <?mso-contentType ?>
 <FormTemplates xmlns="http://schemas.microsoft.com/sharepoint/v3/contenttype/forms">
   <Display>DocumentLibraryForm</Display>
   <Edit>DocumentLibraryForm</Edit>
   <New>DocumentLibraryForm</New>
 </FormTemplates>
-</file>
-
-<file path=customXml/item3.xml><?xml version="1.0" encoding="utf-8"?>
-<p:properties xmlns:p="http://schemas.microsoft.com/office/2006/metadata/properties" xmlns:xsi="http://www.w3.org/2001/XMLSchema-instance" xmlns:pc="http://schemas.microsoft.com/office/infopath/2007/PartnerControls">
-  <documentManagement>
-    <Information xmlns="4ad138b4-2b68-4b70-945d-07f8f18b1c9a" xsi:nil="true"/>
-  </documentManagement>
-</p:properties>
 </file>
 
 <file path=customXml/itemProps1.xml><?xml version="1.0" encoding="utf-8"?>
@@ -7729,14 +7421,6 @@
 </file>
 
 <file path=customXml/itemProps2.xml><?xml version="1.0" encoding="utf-8"?>
-<ds:datastoreItem xmlns:ds="http://schemas.openxmlformats.org/officeDocument/2006/customXml" ds:itemID="{91C521DD-2673-4EE6-BB9B-DC5C3320FFBB}">
-  <ds:schemaRefs>
-    <ds:schemaRef ds:uri="http://schemas.microsoft.com/sharepoint/v3/contenttype/forms"/>
-  </ds:schemaRefs>
-</ds:datastoreItem>
-</file>
-
-<file path=customXml/itemProps3.xml><?xml version="1.0" encoding="utf-8"?>
 <ds:datastoreItem xmlns:ds="http://schemas.openxmlformats.org/officeDocument/2006/customXml" ds:itemID="{EDD1FC41-23C7-41B0-B5F9-BF4CD38AD2ED}">
   <ds:schemaRefs>
     <ds:schemaRef ds:uri="http://schemas.microsoft.com/office/infopath/2007/PartnerControls"/>
@@ -7751,4 +7435,12 @@
     <ds:schemaRef ds:uri="http://purl.org/dc/dcmitype/"/>
   </ds:schemaRefs>
 </ds:datastoreItem>
+</file>
+
+<file path=customXml/itemProps3.xml><?xml version="1.0" encoding="utf-8"?>
+<ds:datastoreItem xmlns:ds="http://schemas.openxmlformats.org/officeDocument/2006/customXml" ds:itemID="{91C521DD-2673-4EE6-BB9B-DC5C3320FFBB}">
+  <ds:schemaRefs>
+    <ds:schemaRef ds:uri="http://schemas.microsoft.com/sharepoint/v3/contenttype/forms"/>
+  </ds:schemaRefs>
+</ds:datastoreItem>
 </file>
</xml_diff>